<commit_message>
Updating mind map for RQ1
</commit_message>
<xml_diff>
--- a/Presentations/Supervisor Meetings/2024/20240301.pptx
+++ b/Presentations/Supervisor Meetings/2024/20240301.pptx
@@ -10,9 +10,8 @@
     <p:sldId id="266" r:id="rId4"/>
     <p:sldId id="262" r:id="rId5"/>
     <p:sldId id="267" r:id="rId6"/>
-    <p:sldId id="268" r:id="rId7"/>
-    <p:sldId id="265" r:id="rId8"/>
-    <p:sldId id="269" r:id="rId9"/>
+    <p:sldId id="265" r:id="rId7"/>
+    <p:sldId id="269" r:id="rId8"/>
   </p:sldIdLst>
   <p:sldSz cx="12192000" cy="6858000"/>
   <p:notesSz cx="6858000" cy="9144000"/>
@@ -122,7 +121,7 @@
 <file path=ppt/revisionInfo.xml><?xml version="1.0" encoding="utf-8"?>
 <p1510:revInfo xmlns:a="http://schemas.openxmlformats.org/drawingml/2006/main" xmlns:r="http://schemas.openxmlformats.org/officeDocument/2006/relationships" xmlns:p1510="http://schemas.microsoft.com/office/powerpoint/2015/10/main">
   <p1510:revLst>
-    <p1510:client id="{B7574C7C-3686-460F-9B9F-2A9122AA95F8}" v="70" dt="2024-02-25T21:07:13.962"/>
+    <p1510:client id="{B7574C7C-3686-460F-9B9F-2A9122AA95F8}" v="72" dt="2024-02-26T21:28:07.868"/>
   </p1510:revLst>
 </p1510:revInfo>
 </file>
@@ -1483,7 +1482,7 @@
   <pc:docChgLst>
     <pc:chgData name="Sean O Fithcheallaigh" userId="47659c31-a575-4792-8be3-61268c4ee0d6" providerId="ADAL" clId="{B7574C7C-3686-460F-9B9F-2A9122AA95F8}"/>
     <pc:docChg chg="undo custSel addSld delSld modSld modMainMaster">
-      <pc:chgData name="Sean O Fithcheallaigh" userId="47659c31-a575-4792-8be3-61268c4ee0d6" providerId="ADAL" clId="{B7574C7C-3686-460F-9B9F-2A9122AA95F8}" dt="2024-02-25T21:07:37.360" v="2800" actId="20577"/>
+      <pc:chgData name="Sean O Fithcheallaigh" userId="47659c31-a575-4792-8be3-61268c4ee0d6" providerId="ADAL" clId="{B7574C7C-3686-460F-9B9F-2A9122AA95F8}" dt="2024-02-26T21:28:18.337" v="2822" actId="1076"/>
       <pc:docMkLst>
         <pc:docMk/>
       </pc:docMkLst>
@@ -1754,7 +1753,7 @@
         </pc:sldMkLst>
       </pc:sldChg>
       <pc:sldChg chg="addSp delSp modSp new mod chgLayout">
-        <pc:chgData name="Sean O Fithcheallaigh" userId="47659c31-a575-4792-8be3-61268c4ee0d6" providerId="ADAL" clId="{B7574C7C-3686-460F-9B9F-2A9122AA95F8}" dt="2024-02-25T20:57:48.821" v="2688" actId="14100"/>
+        <pc:chgData name="Sean O Fithcheallaigh" userId="47659c31-a575-4792-8be3-61268c4ee0d6" providerId="ADAL" clId="{B7574C7C-3686-460F-9B9F-2A9122AA95F8}" dt="2024-02-26T21:28:18.337" v="2822" actId="1076"/>
         <pc:sldMkLst>
           <pc:docMk/>
           <pc:sldMk cId="2974212779" sldId="262"/>
@@ -1919,8 +1918,8 @@
             <ac:graphicFrameMk id="4" creationId="{214AC544-048D-9AC6-C15B-95DB87E65341}"/>
           </ac:graphicFrameMkLst>
         </pc:graphicFrameChg>
-        <pc:picChg chg="add mod">
-          <ac:chgData name="Sean O Fithcheallaigh" userId="47659c31-a575-4792-8be3-61268c4ee0d6" providerId="ADAL" clId="{B7574C7C-3686-460F-9B9F-2A9122AA95F8}" dt="2024-02-25T20:57:48.821" v="2688" actId="14100"/>
+        <pc:picChg chg="add del mod">
+          <ac:chgData name="Sean O Fithcheallaigh" userId="47659c31-a575-4792-8be3-61268c4ee0d6" providerId="ADAL" clId="{B7574C7C-3686-460F-9B9F-2A9122AA95F8}" dt="2024-02-26T21:28:00.819" v="2816" actId="478"/>
           <ac:picMkLst>
             <pc:docMk/>
             <pc:sldMk cId="2974212779" sldId="262"/>
@@ -1933,6 +1932,14 @@
             <pc:docMk/>
             <pc:sldMk cId="2974212779" sldId="262"/>
             <ac:picMk id="4" creationId="{78E2A836-BB30-4A56-2D0C-090F483D8876}"/>
+          </ac:picMkLst>
+        </pc:picChg>
+        <pc:picChg chg="add mod">
+          <ac:chgData name="Sean O Fithcheallaigh" userId="47659c31-a575-4792-8be3-61268c4ee0d6" providerId="ADAL" clId="{B7574C7C-3686-460F-9B9F-2A9122AA95F8}" dt="2024-02-26T21:28:18.337" v="2822" actId="1076"/>
+          <ac:picMkLst>
+            <pc:docMk/>
+            <pc:sldMk cId="2974212779" sldId="262"/>
+            <ac:picMk id="5" creationId="{425E7C17-E2E0-DB91-D1D3-F104D31C823A}"/>
           </ac:picMkLst>
         </pc:picChg>
         <pc:picChg chg="add del mod">
@@ -2301,7 +2308,7 @@
         </pc:spChg>
       </pc:sldChg>
       <pc:sldChg chg="addSp delSp modSp add mod">
-        <pc:chgData name="Sean O Fithcheallaigh" userId="47659c31-a575-4792-8be3-61268c4ee0d6" providerId="ADAL" clId="{B7574C7C-3686-460F-9B9F-2A9122AA95F8}" dt="2024-02-25T20:57:53.504" v="2689" actId="14100"/>
+        <pc:chgData name="Sean O Fithcheallaigh" userId="47659c31-a575-4792-8be3-61268c4ee0d6" providerId="ADAL" clId="{B7574C7C-3686-460F-9B9F-2A9122AA95F8}" dt="2024-02-26T20:32:39.813" v="2815" actId="14100"/>
         <pc:sldMkLst>
           <pc:docMk/>
           <pc:sldMk cId="788743055" sldId="267"/>
@@ -2363,7 +2370,15 @@
           </ac:picMkLst>
         </pc:picChg>
         <pc:picChg chg="add mod">
-          <ac:chgData name="Sean O Fithcheallaigh" userId="47659c31-a575-4792-8be3-61268c4ee0d6" providerId="ADAL" clId="{B7574C7C-3686-460F-9B9F-2A9122AA95F8}" dt="2024-02-25T20:57:53.504" v="2689" actId="14100"/>
+          <ac:chgData name="Sean O Fithcheallaigh" userId="47659c31-a575-4792-8be3-61268c4ee0d6" providerId="ADAL" clId="{B7574C7C-3686-460F-9B9F-2A9122AA95F8}" dt="2024-02-26T20:32:39.813" v="2815" actId="14100"/>
+          <ac:picMkLst>
+            <pc:docMk/>
+            <pc:sldMk cId="788743055" sldId="267"/>
+            <ac:picMk id="4" creationId="{6C8FD7A2-9490-5CDD-B6FB-D1FA5CEEBFAB}"/>
+          </ac:picMkLst>
+        </pc:picChg>
+        <pc:picChg chg="add del mod">
+          <ac:chgData name="Sean O Fithcheallaigh" userId="47659c31-a575-4792-8be3-61268c4ee0d6" providerId="ADAL" clId="{B7574C7C-3686-460F-9B9F-2A9122AA95F8}" dt="2024-02-26T20:30:45.561" v="2804" actId="478"/>
           <ac:picMkLst>
             <pc:docMk/>
             <pc:sldMk cId="788743055" sldId="267"/>
@@ -2379,8 +2394,8 @@
           </ac:picMkLst>
         </pc:picChg>
       </pc:sldChg>
-      <pc:sldChg chg="addSp delSp modSp add mod">
-        <pc:chgData name="Sean O Fithcheallaigh" userId="47659c31-a575-4792-8be3-61268c4ee0d6" providerId="ADAL" clId="{B7574C7C-3686-460F-9B9F-2A9122AA95F8}" dt="2024-02-25T20:59:28.994" v="2731" actId="14100"/>
+      <pc:sldChg chg="addSp delSp modSp add del mod">
+        <pc:chgData name="Sean O Fithcheallaigh" userId="47659c31-a575-4792-8be3-61268c4ee0d6" providerId="ADAL" clId="{B7574C7C-3686-460F-9B9F-2A9122AA95F8}" dt="2024-02-26T20:30:41.201" v="2803" actId="47"/>
         <pc:sldMkLst>
           <pc:docMk/>
           <pc:sldMk cId="3408599131" sldId="268"/>
@@ -3015,7 +3030,7 @@
           <a:p>
             <a:fld id="{0CD94E99-FA29-4EFF-88BE-3447E30E8C4D}" type="datetimeFigureOut">
               <a:rPr lang="en-GB" smtClean="0"/>
-              <a:t>25/02/2024</a:t>
+              <a:t>26/02/2024</a:t>
             </a:fld>
             <a:endParaRPr lang="en-GB"/>
           </a:p>
@@ -3223,7 +3238,7 @@
           <a:p>
             <a:fld id="{0CD94E99-FA29-4EFF-88BE-3447E30E8C4D}" type="datetimeFigureOut">
               <a:rPr lang="en-GB" smtClean="0"/>
-              <a:t>25/02/2024</a:t>
+              <a:t>26/02/2024</a:t>
             </a:fld>
             <a:endParaRPr lang="en-GB"/>
           </a:p>
@@ -3481,7 +3496,7 @@
           <a:p>
             <a:fld id="{0CD94E99-FA29-4EFF-88BE-3447E30E8C4D}" type="datetimeFigureOut">
               <a:rPr lang="en-GB" smtClean="0"/>
-              <a:t>25/02/2024</a:t>
+              <a:t>26/02/2024</a:t>
             </a:fld>
             <a:endParaRPr lang="en-GB"/>
           </a:p>
@@ -3667,7 +3682,7 @@
           <a:p>
             <a:fld id="{0CD94E99-FA29-4EFF-88BE-3447E30E8C4D}" type="datetimeFigureOut">
               <a:rPr lang="en-GB" smtClean="0"/>
-              <a:t>25/02/2024</a:t>
+              <a:t>26/02/2024</a:t>
             </a:fld>
             <a:endParaRPr lang="en-GB"/>
           </a:p>
@@ -4016,7 +4031,7 @@
           <a:p>
             <a:fld id="{0CD94E99-FA29-4EFF-88BE-3447E30E8C4D}" type="datetimeFigureOut">
               <a:rPr lang="en-GB" smtClean="0"/>
-              <a:t>25/02/2024</a:t>
+              <a:t>26/02/2024</a:t>
             </a:fld>
             <a:endParaRPr lang="en-GB"/>
           </a:p>
@@ -4291,7 +4306,7 @@
           <a:p>
             <a:fld id="{0CD94E99-FA29-4EFF-88BE-3447E30E8C4D}" type="datetimeFigureOut">
               <a:rPr lang="en-GB" smtClean="0"/>
-              <a:t>25/02/2024</a:t>
+              <a:t>26/02/2024</a:t>
             </a:fld>
             <a:endParaRPr lang="en-GB"/>
           </a:p>
@@ -4670,7 +4685,7 @@
           <a:p>
             <a:fld id="{0CD94E99-FA29-4EFF-88BE-3447E30E8C4D}" type="datetimeFigureOut">
               <a:rPr lang="en-GB" smtClean="0"/>
-              <a:t>25/02/2024</a:t>
+              <a:t>26/02/2024</a:t>
             </a:fld>
             <a:endParaRPr lang="en-GB"/>
           </a:p>
@@ -4788,7 +4803,7 @@
           <a:p>
             <a:fld id="{0CD94E99-FA29-4EFF-88BE-3447E30E8C4D}" type="datetimeFigureOut">
               <a:rPr lang="en-GB" smtClean="0"/>
-              <a:t>25/02/2024</a:t>
+              <a:t>26/02/2024</a:t>
             </a:fld>
             <a:endParaRPr lang="en-GB"/>
           </a:p>
@@ -4961,7 +4976,7 @@
           <a:p>
             <a:fld id="{0CD94E99-FA29-4EFF-88BE-3447E30E8C4D}" type="datetimeFigureOut">
               <a:rPr lang="en-GB" smtClean="0"/>
-              <a:t>25/02/2024</a:t>
+              <a:t>26/02/2024</a:t>
             </a:fld>
             <a:endParaRPr lang="en-GB"/>
           </a:p>
@@ -5317,7 +5332,7 @@
           <a:p>
             <a:fld id="{0CD94E99-FA29-4EFF-88BE-3447E30E8C4D}" type="datetimeFigureOut">
               <a:rPr lang="en-GB" smtClean="0"/>
-              <a:t>25/02/2024</a:t>
+              <a:t>26/02/2024</a:t>
             </a:fld>
             <a:endParaRPr lang="en-GB"/>
           </a:p>
@@ -5696,7 +5711,7 @@
           <a:p>
             <a:fld id="{0CD94E99-FA29-4EFF-88BE-3447E30E8C4D}" type="datetimeFigureOut">
               <a:rPr lang="en-GB" smtClean="0"/>
-              <a:t>25/02/2024</a:t>
+              <a:t>26/02/2024</a:t>
             </a:fld>
             <a:endParaRPr lang="en-GB"/>
           </a:p>
@@ -5988,7 +6003,7 @@
           <a:p>
             <a:fld id="{0CD94E99-FA29-4EFF-88BE-3447E30E8C4D}" type="datetimeFigureOut">
               <a:rPr lang="en-GB" smtClean="0"/>
-              <a:t>25/02/2024</a:t>
+              <a:t>26/02/2024</a:t>
             </a:fld>
             <a:endParaRPr lang="en-GB"/>
           </a:p>
@@ -7515,42 +7530,6 @@
           </a:p>
         </p:txBody>
       </p:sp>
-      <p:pic>
-        <p:nvPicPr>
-          <p:cNvPr id="4" name="Picture 3" descr="A diagram of a flowchart&#10;&#10;Description automatically generated">
-            <a:extLst>
-              <a:ext uri="{FF2B5EF4-FFF2-40B4-BE49-F238E27FC236}">
-                <a16:creationId xmlns:a16="http://schemas.microsoft.com/office/drawing/2014/main" id="{2B301E7E-DFFF-347D-8886-41B2A3BC9414}"/>
-              </a:ext>
-            </a:extLst>
-          </p:cNvPr>
-          <p:cNvPicPr>
-            <a:picLocks noChangeAspect="1"/>
-          </p:cNvPicPr>
-          <p:nvPr/>
-        </p:nvPicPr>
-        <p:blipFill>
-          <a:blip r:embed="rId2">
-            <a:extLst>
-              <a:ext uri="{28A0092B-C50C-407E-A947-70E740481C1C}">
-                <a14:useLocalDpi xmlns:a14="http://schemas.microsoft.com/office/drawing/2010/main" val="0"/>
-              </a:ext>
-            </a:extLst>
-          </a:blip>
-          <a:stretch>
-            <a:fillRect/>
-          </a:stretch>
-        </p:blipFill>
-        <p:spPr>
-          <a:xfrm>
-            <a:off x="1464815" y="1331651"/>
-            <a:ext cx="9439922" cy="4969252"/>
-          </a:xfrm>
-          <a:prstGeom prst="rect">
-            <a:avLst/>
-          </a:prstGeom>
-        </p:spPr>
-      </p:pic>
       <p:sp>
         <p:nvSpPr>
           <p:cNvPr id="3" name="Title 1">
@@ -7609,6 +7588,42 @@
           </a:p>
         </p:txBody>
       </p:sp>
+      <p:pic>
+        <p:nvPicPr>
+          <p:cNvPr id="5" name="Picture 4" descr="A diagram of a person with text&#10;&#10;Description automatically generated with medium confidence">
+            <a:extLst>
+              <a:ext uri="{FF2B5EF4-FFF2-40B4-BE49-F238E27FC236}">
+                <a16:creationId xmlns:a16="http://schemas.microsoft.com/office/drawing/2014/main" id="{425E7C17-E2E0-DB91-D1D3-F104D31C823A}"/>
+              </a:ext>
+            </a:extLst>
+          </p:cNvPr>
+          <p:cNvPicPr>
+            <a:picLocks noChangeAspect="1"/>
+          </p:cNvPicPr>
+          <p:nvPr/>
+        </p:nvPicPr>
+        <p:blipFill>
+          <a:blip r:embed="rId2">
+            <a:extLst>
+              <a:ext uri="{28A0092B-C50C-407E-A947-70E740481C1C}">
+                <a14:useLocalDpi xmlns:a14="http://schemas.microsoft.com/office/drawing/2010/main" val="0"/>
+              </a:ext>
+            </a:extLst>
+          </a:blip>
+          <a:stretch>
+            <a:fillRect/>
+          </a:stretch>
+        </p:blipFill>
+        <p:spPr>
+          <a:xfrm>
+            <a:off x="2475820" y="1339315"/>
+            <a:ext cx="7240360" cy="4822510"/>
+          </a:xfrm>
+          <a:prstGeom prst="rect">
+            <a:avLst/>
+          </a:prstGeom>
+        </p:spPr>
+      </p:pic>
     </p:spTree>
     <p:extLst>
       <p:ext uri="{BB962C8B-B14F-4D97-AF65-F5344CB8AC3E}">
@@ -7739,42 +7754,6 @@
           </a:p>
         </p:txBody>
       </p:sp>
-      <p:pic>
-        <p:nvPicPr>
-          <p:cNvPr id="5" name="Picture 4" descr="A close-up of a diagram&#10;&#10;Description automatically generated">
-            <a:extLst>
-              <a:ext uri="{FF2B5EF4-FFF2-40B4-BE49-F238E27FC236}">
-                <a16:creationId xmlns:a16="http://schemas.microsoft.com/office/drawing/2014/main" id="{330CED38-880D-1A6E-F2F5-50E784ED0B71}"/>
-              </a:ext>
-            </a:extLst>
-          </p:cNvPr>
-          <p:cNvPicPr>
-            <a:picLocks noChangeAspect="1"/>
-          </p:cNvPicPr>
-          <p:nvPr/>
-        </p:nvPicPr>
-        <p:blipFill>
-          <a:blip r:embed="rId2">
-            <a:extLst>
-              <a:ext uri="{28A0092B-C50C-407E-A947-70E740481C1C}">
-                <a14:useLocalDpi xmlns:a14="http://schemas.microsoft.com/office/drawing/2010/main" val="0"/>
-              </a:ext>
-            </a:extLst>
-          </a:blip>
-          <a:stretch>
-            <a:fillRect/>
-          </a:stretch>
-        </p:blipFill>
-        <p:spPr>
-          <a:xfrm>
-            <a:off x="878440" y="1370264"/>
-            <a:ext cx="10435119" cy="4829425"/>
-          </a:xfrm>
-          <a:prstGeom prst="rect">
-            <a:avLst/>
-          </a:prstGeom>
-        </p:spPr>
-      </p:pic>
       <p:sp>
         <p:nvSpPr>
           <p:cNvPr id="3" name="Title 1">
@@ -7833,138 +7812,12 @@
           </a:p>
         </p:txBody>
       </p:sp>
-    </p:spTree>
-    <p:extLst>
-      <p:ext uri="{BB962C8B-B14F-4D97-AF65-F5344CB8AC3E}">
-        <p14:creationId xmlns:p14="http://schemas.microsoft.com/office/powerpoint/2010/main" val="788743055"/>
-      </p:ext>
-    </p:extLst>
-  </p:cSld>
-  <p:clrMapOvr>
-    <a:masterClrMapping/>
-  </p:clrMapOvr>
-</p:sld>
-</file>
-
-<file path=ppt/slides/slide6.xml><?xml version="1.0" encoding="utf-8"?>
-<p:sld xmlns:a="http://schemas.openxmlformats.org/drawingml/2006/main" xmlns:r="http://schemas.openxmlformats.org/officeDocument/2006/relationships" xmlns:p="http://schemas.openxmlformats.org/presentationml/2006/main">
-  <p:cSld>
-    <p:spTree>
-      <p:nvGrpSpPr>
-        <p:cNvPr id="1" name="">
-          <a:extLst>
-            <a:ext uri="{FF2B5EF4-FFF2-40B4-BE49-F238E27FC236}">
-              <a16:creationId xmlns:a16="http://schemas.microsoft.com/office/drawing/2014/main" id="{25AB105C-AF0D-278A-E4B2-1A113401BAFB}"/>
-            </a:ext>
-          </a:extLst>
-        </p:cNvPr>
-        <p:cNvGrpSpPr/>
-        <p:nvPr/>
-      </p:nvGrpSpPr>
-      <p:grpSpPr>
-        <a:xfrm>
-          <a:off x="0" y="0"/>
-          <a:ext cx="0" cy="0"/>
-          <a:chOff x="0" y="0"/>
-          <a:chExt cx="0" cy="0"/>
-        </a:xfrm>
-      </p:grpSpPr>
-      <p:sp>
-        <p:nvSpPr>
-          <p:cNvPr id="15" name="Rectangle: Rounded Corners 14">
+      <p:pic>
+        <p:nvPicPr>
+          <p:cNvPr id="4" name="Picture 3" descr="A diagram of a diagram&#10;&#10;Description automatically generated with medium confidence">
             <a:extLst>
               <a:ext uri="{FF2B5EF4-FFF2-40B4-BE49-F238E27FC236}">
-                <a16:creationId xmlns:a16="http://schemas.microsoft.com/office/drawing/2014/main" id="{4FC66C9B-35CF-0185-FDAA-B671BF099103}"/>
-              </a:ext>
-            </a:extLst>
-          </p:cNvPr>
-          <p:cNvSpPr/>
-          <p:nvPr/>
-        </p:nvSpPr>
-        <p:spPr>
-          <a:xfrm>
-            <a:off x="5522647" y="267958"/>
-            <a:ext cx="5805997" cy="930696"/>
-          </a:xfrm>
-          <a:prstGeom prst="roundRect">
-            <a:avLst/>
-          </a:prstGeom>
-          <a:noFill/>
-        </p:spPr>
-        <p:style>
-          <a:lnRef idx="2">
-            <a:schemeClr val="accent1">
-              <a:shade val="15000"/>
-            </a:schemeClr>
-          </a:lnRef>
-          <a:fillRef idx="1">
-            <a:schemeClr val="accent1"/>
-          </a:fillRef>
-          <a:effectRef idx="0">
-            <a:schemeClr val="accent1"/>
-          </a:effectRef>
-          <a:fontRef idx="minor">
-            <a:schemeClr val="lt1"/>
-          </a:fontRef>
-        </p:style>
-        <p:txBody>
-          <a:bodyPr rtlCol="0" anchor="ctr"/>
-          <a:lstStyle/>
-          <a:p>
-            <a:pPr algn="ctr"/>
-            <a:endParaRPr lang="en-GB"/>
-          </a:p>
-        </p:txBody>
-      </p:sp>
-      <p:sp>
-        <p:nvSpPr>
-          <p:cNvPr id="19" name="TextBox 18">
-            <a:extLst>
-              <a:ext uri="{FF2B5EF4-FFF2-40B4-BE49-F238E27FC236}">
-                <a16:creationId xmlns:a16="http://schemas.microsoft.com/office/drawing/2014/main" id="{BECE7A34-9052-6E03-7A97-16BF03014EE1}"/>
-              </a:ext>
-            </a:extLst>
-          </p:cNvPr>
-          <p:cNvSpPr txBox="1"/>
-          <p:nvPr/>
-        </p:nvSpPr>
-        <p:spPr>
-          <a:xfrm>
-            <a:off x="5522647" y="267958"/>
-            <a:ext cx="5466429" cy="1033081"/>
-          </a:xfrm>
-          <a:prstGeom prst="rect">
-            <a:avLst/>
-          </a:prstGeom>
-          <a:noFill/>
-        </p:spPr>
-        <p:txBody>
-          <a:bodyPr wrap="square">
-            <a:normAutofit/>
-          </a:bodyPr>
-          <a:lstStyle/>
-          <a:p>
-            <a:pPr algn="ctr"/>
-            <a:r>
-              <a:rPr lang="en-US" b="1" dirty="0"/>
-              <a:t>Can we design efficient aggregation algorithms for FL </a:t>
-            </a:r>
-            <a:r>
-              <a:rPr lang="en-US" dirty="0"/>
-              <a:t>that minimize the data exchange between clients and servers while not reducing the model accuracy?</a:t>
-            </a:r>
-          </a:p>
-          <a:p>
-            <a:endParaRPr lang="en-US" dirty="0"/>
-          </a:p>
-        </p:txBody>
-      </p:sp>
-      <p:pic>
-        <p:nvPicPr>
-          <p:cNvPr id="6" name="Picture 5" descr="A diagram of a diagram&#10;&#10;Description automatically generated">
-            <a:extLst>
-              <a:ext uri="{FF2B5EF4-FFF2-40B4-BE49-F238E27FC236}">
-                <a16:creationId xmlns:a16="http://schemas.microsoft.com/office/drawing/2014/main" id="{F92B1EA3-86C8-9D8D-6A8B-50BE3769FEB7}"/>
+                <a16:creationId xmlns:a16="http://schemas.microsoft.com/office/drawing/2014/main" id="{6C8FD7A2-9490-5CDD-B6FB-D1FA5CEEBFAB}"/>
               </a:ext>
             </a:extLst>
           </p:cNvPr>
@@ -7987,76 +7840,18 @@
         </p:blipFill>
         <p:spPr>
           <a:xfrm>
-            <a:off x="1779973" y="1438184"/>
-            <a:ext cx="8632054" cy="4635318"/>
+            <a:off x="2618913" y="1370264"/>
+            <a:ext cx="5933689" cy="4803589"/>
           </a:xfrm>
           <a:prstGeom prst="rect">
             <a:avLst/>
           </a:prstGeom>
         </p:spPr>
       </p:pic>
-      <p:sp>
-        <p:nvSpPr>
-          <p:cNvPr id="8" name="Title 1">
-            <a:extLst>
-              <a:ext uri="{FF2B5EF4-FFF2-40B4-BE49-F238E27FC236}">
-                <a16:creationId xmlns:a16="http://schemas.microsoft.com/office/drawing/2014/main" id="{F81BE618-FCDB-5266-C293-407EFD814C8B}"/>
-              </a:ext>
-            </a:extLst>
-          </p:cNvPr>
-          <p:cNvSpPr txBox="1">
-            <a:spLocks/>
-          </p:cNvSpPr>
-          <p:nvPr/>
-        </p:nvSpPr>
-        <p:spPr>
-          <a:xfrm>
-            <a:off x="1162975" y="329312"/>
-            <a:ext cx="3959441" cy="719427"/>
-          </a:xfrm>
-          <a:prstGeom prst="rect">
-            <a:avLst/>
-          </a:prstGeom>
-        </p:spPr>
-        <p:txBody>
-          <a:bodyPr vert="horz" lIns="91440" tIns="45720" rIns="91440" bIns="45720" rtlCol="0" anchor="b">
-            <a:normAutofit fontScale="75000" lnSpcReduction="20000"/>
-          </a:bodyPr>
-          <a:lstStyle>
-            <a:lvl1pPr algn="l" defTabSz="914400" rtl="0" eaLnBrk="1" latinLnBrk="0" hangingPunct="1">
-              <a:lnSpc>
-                <a:spcPct val="85000"/>
-              </a:lnSpc>
-              <a:spcBef>
-                <a:spcPct val="0"/>
-              </a:spcBef>
-              <a:buNone/>
-              <a:defRPr sz="4800" kern="1200" spc="-50" baseline="0">
-                <a:solidFill>
-                  <a:schemeClr val="tx1">
-                    <a:lumMod val="75000"/>
-                    <a:lumOff val="25000"/>
-                  </a:schemeClr>
-                </a:solidFill>
-                <a:latin typeface="+mj-lt"/>
-                <a:ea typeface="+mj-ea"/>
-                <a:cs typeface="+mj-cs"/>
-              </a:defRPr>
-            </a:lvl1pPr>
-          </a:lstStyle>
-          <a:p>
-            <a:r>
-              <a:rPr lang="en-US" dirty="0"/>
-              <a:t>Research Question 3</a:t>
-            </a:r>
-            <a:endParaRPr lang="en-GB" dirty="0"/>
-          </a:p>
-        </p:txBody>
-      </p:sp>
     </p:spTree>
     <p:extLst>
       <p:ext uri="{BB962C8B-B14F-4D97-AF65-F5344CB8AC3E}">
-        <p14:creationId xmlns:p14="http://schemas.microsoft.com/office/powerpoint/2010/main" val="3408599131"/>
+        <p14:creationId xmlns:p14="http://schemas.microsoft.com/office/powerpoint/2010/main" val="788743055"/>
       </p:ext>
     </p:extLst>
   </p:cSld>
@@ -8066,7 +7861,7 @@
 </p:sld>
 </file>
 
-<file path=ppt/slides/slide7.xml><?xml version="1.0" encoding="utf-8"?>
+<file path=ppt/slides/slide6.xml><?xml version="1.0" encoding="utf-8"?>
 <p:sld xmlns:a="http://schemas.openxmlformats.org/drawingml/2006/main" xmlns:r="http://schemas.openxmlformats.org/officeDocument/2006/relationships" xmlns:p="http://schemas.openxmlformats.org/presentationml/2006/main">
   <p:cSld>
     <p:spTree>
@@ -8174,7 +7969,7 @@
 </p:sld>
 </file>
 
-<file path=ppt/slides/slide8.xml><?xml version="1.0" encoding="utf-8"?>
+<file path=ppt/slides/slide7.xml><?xml version="1.0" encoding="utf-8"?>
 <p:sld xmlns:a="http://schemas.openxmlformats.org/drawingml/2006/main" xmlns:r="http://schemas.openxmlformats.org/officeDocument/2006/relationships" xmlns:p="http://schemas.openxmlformats.org/presentationml/2006/main">
   <p:cSld>
     <p:spTree>

</xml_diff>

<commit_message>
updated some of the mind maps
</commit_message>
<xml_diff>
--- a/Presentations/Supervisor Meetings/2024/20240301.pptx
+++ b/Presentations/Supervisor Meetings/2024/20240301.pptx
@@ -10,8 +10,10 @@
     <p:sldId id="266" r:id="rId4"/>
     <p:sldId id="262" r:id="rId5"/>
     <p:sldId id="267" r:id="rId6"/>
-    <p:sldId id="265" r:id="rId7"/>
-    <p:sldId id="269" r:id="rId8"/>
+    <p:sldId id="271" r:id="rId7"/>
+    <p:sldId id="270" r:id="rId8"/>
+    <p:sldId id="265" r:id="rId9"/>
+    <p:sldId id="269" r:id="rId10"/>
   </p:sldIdLst>
   <p:sldSz cx="12192000" cy="6858000"/>
   <p:notesSz cx="6858000" cy="9144000"/>
@@ -121,7 +123,7 @@
 <file path=ppt/revisionInfo.xml><?xml version="1.0" encoding="utf-8"?>
 <p1510:revInfo xmlns:a="http://schemas.openxmlformats.org/drawingml/2006/main" xmlns:r="http://schemas.openxmlformats.org/officeDocument/2006/relationships" xmlns:p1510="http://schemas.microsoft.com/office/powerpoint/2015/10/main">
   <p1510:revLst>
-    <p1510:client id="{B7574C7C-3686-460F-9B9F-2A9122AA95F8}" v="72" dt="2024-02-26T21:28:07.868"/>
+    <p1510:client id="{B7574C7C-3686-460F-9B9F-2A9122AA95F8}" v="76" dt="2024-02-29T21:38:38.604"/>
   </p1510:revLst>
 </p1510:revInfo>
 </file>
@@ -1481,8 +1483,8 @@
   </pc:docChgLst>
   <pc:docChgLst>
     <pc:chgData name="Sean O Fithcheallaigh" userId="47659c31-a575-4792-8be3-61268c4ee0d6" providerId="ADAL" clId="{B7574C7C-3686-460F-9B9F-2A9122AA95F8}"/>
-    <pc:docChg chg="undo custSel addSld delSld modSld modMainMaster">
-      <pc:chgData name="Sean O Fithcheallaigh" userId="47659c31-a575-4792-8be3-61268c4ee0d6" providerId="ADAL" clId="{B7574C7C-3686-460F-9B9F-2A9122AA95F8}" dt="2024-02-26T21:28:18.337" v="2822" actId="1076"/>
+    <pc:docChg chg="undo custSel addSld delSld modSld sldOrd modMainMaster">
+      <pc:chgData name="Sean O Fithcheallaigh" userId="47659c31-a575-4792-8be3-61268c4ee0d6" providerId="ADAL" clId="{B7574C7C-3686-460F-9B9F-2A9122AA95F8}" dt="2024-02-29T21:38:50.868" v="2984"/>
       <pc:docMkLst>
         <pc:docMk/>
       </pc:docMkLst>
@@ -1753,7 +1755,7 @@
         </pc:sldMkLst>
       </pc:sldChg>
       <pc:sldChg chg="addSp delSp modSp new mod chgLayout">
-        <pc:chgData name="Sean O Fithcheallaigh" userId="47659c31-a575-4792-8be3-61268c4ee0d6" providerId="ADAL" clId="{B7574C7C-3686-460F-9B9F-2A9122AA95F8}" dt="2024-02-26T21:28:18.337" v="2822" actId="1076"/>
+        <pc:chgData name="Sean O Fithcheallaigh" userId="47659c31-a575-4792-8be3-61268c4ee0d6" providerId="ADAL" clId="{B7574C7C-3686-460F-9B9F-2A9122AA95F8}" dt="2024-02-29T21:20:52.491" v="2834" actId="1076"/>
         <pc:sldMkLst>
           <pc:docMk/>
           <pc:sldMk cId="2974212779" sldId="262"/>
@@ -1935,7 +1937,7 @@
           </ac:picMkLst>
         </pc:picChg>
         <pc:picChg chg="add mod">
-          <ac:chgData name="Sean O Fithcheallaigh" userId="47659c31-a575-4792-8be3-61268c4ee0d6" providerId="ADAL" clId="{B7574C7C-3686-460F-9B9F-2A9122AA95F8}" dt="2024-02-26T21:28:18.337" v="2822" actId="1076"/>
+          <ac:chgData name="Sean O Fithcheallaigh" userId="47659c31-a575-4792-8be3-61268c4ee0d6" providerId="ADAL" clId="{B7574C7C-3686-460F-9B9F-2A9122AA95F8}" dt="2024-02-29T21:20:52.491" v="2834" actId="1076"/>
           <ac:picMkLst>
             <pc:docMk/>
             <pc:sldMk cId="2974212779" sldId="262"/>
@@ -2308,7 +2310,7 @@
         </pc:spChg>
       </pc:sldChg>
       <pc:sldChg chg="addSp delSp modSp add mod">
-        <pc:chgData name="Sean O Fithcheallaigh" userId="47659c31-a575-4792-8be3-61268c4ee0d6" providerId="ADAL" clId="{B7574C7C-3686-460F-9B9F-2A9122AA95F8}" dt="2024-02-26T20:32:39.813" v="2815" actId="14100"/>
+        <pc:chgData name="Sean O Fithcheallaigh" userId="47659c31-a575-4792-8be3-61268c4ee0d6" providerId="ADAL" clId="{B7574C7C-3686-460F-9B9F-2A9122AA95F8}" dt="2024-02-29T21:20:36.444" v="2832" actId="1076"/>
         <pc:sldMkLst>
           <pc:docMk/>
           <pc:sldMk cId="788743055" sldId="267"/>
@@ -2369,8 +2371,8 @@
             <ac:picMk id="4" creationId="{5B56D578-CB51-F8CE-5FB9-835BB51C03E6}"/>
           </ac:picMkLst>
         </pc:picChg>
-        <pc:picChg chg="add mod">
-          <ac:chgData name="Sean O Fithcheallaigh" userId="47659c31-a575-4792-8be3-61268c4ee0d6" providerId="ADAL" clId="{B7574C7C-3686-460F-9B9F-2A9122AA95F8}" dt="2024-02-26T20:32:39.813" v="2815" actId="14100"/>
+        <pc:picChg chg="add del mod">
+          <ac:chgData name="Sean O Fithcheallaigh" userId="47659c31-a575-4792-8be3-61268c4ee0d6" providerId="ADAL" clId="{B7574C7C-3686-460F-9B9F-2A9122AA95F8}" dt="2024-02-29T21:19:41.357" v="2823" actId="478"/>
           <ac:picMkLst>
             <pc:docMk/>
             <pc:sldMk cId="788743055" sldId="267"/>
@@ -2383,6 +2385,14 @@
             <pc:docMk/>
             <pc:sldMk cId="788743055" sldId="267"/>
             <ac:picMk id="5" creationId="{330CED38-880D-1A6E-F2F5-50E784ED0B71}"/>
+          </ac:picMkLst>
+        </pc:picChg>
+        <pc:picChg chg="add mod">
+          <ac:chgData name="Sean O Fithcheallaigh" userId="47659c31-a575-4792-8be3-61268c4ee0d6" providerId="ADAL" clId="{B7574C7C-3686-460F-9B9F-2A9122AA95F8}" dt="2024-02-29T21:20:36.444" v="2832" actId="1076"/>
+          <ac:picMkLst>
+            <pc:docMk/>
+            <pc:sldMk cId="788743055" sldId="267"/>
+            <ac:picMk id="5" creationId="{51F48AE8-C823-16D1-87BC-5F7EEC1A80B6}"/>
           </ac:picMkLst>
         </pc:picChg>
         <pc:picChg chg="del">
@@ -2496,6 +2506,53 @@
           </ac:spMkLst>
         </pc:spChg>
       </pc:sldChg>
+      <pc:sldChg chg="addSp delSp modSp add mod ord">
+        <pc:chgData name="Sean O Fithcheallaigh" userId="47659c31-a575-4792-8be3-61268c4ee0d6" providerId="ADAL" clId="{B7574C7C-3686-460F-9B9F-2A9122AA95F8}" dt="2024-02-29T21:38:50.868" v="2984"/>
+        <pc:sldMkLst>
+          <pc:docMk/>
+          <pc:sldMk cId="1050643754" sldId="270"/>
+        </pc:sldMkLst>
+        <pc:spChg chg="mod">
+          <ac:chgData name="Sean O Fithcheallaigh" userId="47659c31-a575-4792-8be3-61268c4ee0d6" providerId="ADAL" clId="{B7574C7C-3686-460F-9B9F-2A9122AA95F8}" dt="2024-02-29T21:38:22.016" v="2961" actId="27636"/>
+          <ac:spMkLst>
+            <pc:docMk/>
+            <pc:sldMk cId="1050643754" sldId="270"/>
+            <ac:spMk id="3" creationId="{546C1097-9E88-BBC4-17C5-E68E3FDD9D52}"/>
+          </ac:spMkLst>
+        </pc:spChg>
+        <pc:spChg chg="mod">
+          <ac:chgData name="Sean O Fithcheallaigh" userId="47659c31-a575-4792-8be3-61268c4ee0d6" providerId="ADAL" clId="{B7574C7C-3686-460F-9B9F-2A9122AA95F8}" dt="2024-02-29T21:38:30.596" v="2979" actId="20577"/>
+          <ac:spMkLst>
+            <pc:docMk/>
+            <pc:sldMk cId="1050643754" sldId="270"/>
+            <ac:spMk id="8" creationId="{6C0F12F4-24FC-492A-8834-CEBD26CB31E4}"/>
+          </ac:spMkLst>
+        </pc:spChg>
+        <pc:picChg chg="add del mod">
+          <ac:chgData name="Sean O Fithcheallaigh" userId="47659c31-a575-4792-8be3-61268c4ee0d6" providerId="ADAL" clId="{B7574C7C-3686-460F-9B9F-2A9122AA95F8}" dt="2024-02-29T21:38:17.657" v="2957" actId="478"/>
+          <ac:picMkLst>
+            <pc:docMk/>
+            <pc:sldMk cId="1050643754" sldId="270"/>
+            <ac:picMk id="4" creationId="{E71569E2-0665-CFE8-D52C-6E118F663240}"/>
+          </ac:picMkLst>
+        </pc:picChg>
+        <pc:picChg chg="del">
+          <ac:chgData name="Sean O Fithcheallaigh" userId="47659c31-a575-4792-8be3-61268c4ee0d6" providerId="ADAL" clId="{B7574C7C-3686-460F-9B9F-2A9122AA95F8}" dt="2024-02-29T21:35:38.194" v="2942" actId="478"/>
+          <ac:picMkLst>
+            <pc:docMk/>
+            <pc:sldMk cId="1050643754" sldId="270"/>
+            <ac:picMk id="5" creationId="{95285735-7D21-C89D-0CA0-C3ED266053E3}"/>
+          </ac:picMkLst>
+        </pc:picChg>
+        <pc:picChg chg="add mod">
+          <ac:chgData name="Sean O Fithcheallaigh" userId="47659c31-a575-4792-8be3-61268c4ee0d6" providerId="ADAL" clId="{B7574C7C-3686-460F-9B9F-2A9122AA95F8}" dt="2024-02-29T21:38:39.257" v="2982" actId="962"/>
+          <ac:picMkLst>
+            <pc:docMk/>
+            <pc:sldMk cId="1050643754" sldId="270"/>
+            <ac:picMk id="7" creationId="{5C93D92E-D605-444D-144C-ECE7253742D0}"/>
+          </ac:picMkLst>
+        </pc:picChg>
+      </pc:sldChg>
       <pc:sldChg chg="addSp delSp modSp new del mod chgLayout">
         <pc:chgData name="Sean O Fithcheallaigh" userId="47659c31-a575-4792-8be3-61268c4ee0d6" providerId="ADAL" clId="{B7574C7C-3686-460F-9B9F-2A9122AA95F8}" dt="2024-02-19T17:58:21.190" v="2514" actId="2696"/>
         <pc:sldMkLst>
@@ -2550,6 +2607,29 @@
             <ac:spMk id="7" creationId="{C120372E-61A6-C062-A27C-DDD1EEBD1880}"/>
           </ac:spMkLst>
         </pc:spChg>
+      </pc:sldChg>
+      <pc:sldChg chg="addSp delSp modSp add mod">
+        <pc:chgData name="Sean O Fithcheallaigh" userId="47659c31-a575-4792-8be3-61268c4ee0d6" providerId="ADAL" clId="{B7574C7C-3686-460F-9B9F-2A9122AA95F8}" dt="2024-02-29T21:37:58.704" v="2956" actId="478"/>
+        <pc:sldMkLst>
+          <pc:docMk/>
+          <pc:sldMk cId="1816625563" sldId="271"/>
+        </pc:sldMkLst>
+        <pc:picChg chg="mod">
+          <ac:chgData name="Sean O Fithcheallaigh" userId="47659c31-a575-4792-8be3-61268c4ee0d6" providerId="ADAL" clId="{B7574C7C-3686-460F-9B9F-2A9122AA95F8}" dt="2024-02-29T21:36:45.972" v="2951" actId="1076"/>
+          <ac:picMkLst>
+            <pc:docMk/>
+            <pc:sldMk cId="1816625563" sldId="271"/>
+            <ac:picMk id="4" creationId="{52BE103E-19D1-4D2A-5327-9DFA22AD801C}"/>
+          </ac:picMkLst>
+        </pc:picChg>
+        <pc:picChg chg="add del mod">
+          <ac:chgData name="Sean O Fithcheallaigh" userId="47659c31-a575-4792-8be3-61268c4ee0d6" providerId="ADAL" clId="{B7574C7C-3686-460F-9B9F-2A9122AA95F8}" dt="2024-02-29T21:37:58.704" v="2956" actId="478"/>
+          <ac:picMkLst>
+            <pc:docMk/>
+            <pc:sldMk cId="1816625563" sldId="271"/>
+            <ac:picMk id="5" creationId="{6D35CE97-1085-FE36-C16D-0560DE2CF67B}"/>
+          </ac:picMkLst>
+        </pc:picChg>
       </pc:sldChg>
       <pc:sldMasterChg chg="modSp mod setBg modSldLayout">
         <pc:chgData name="Sean O Fithcheallaigh" userId="47659c31-a575-4792-8be3-61268c4ee0d6" providerId="ADAL" clId="{B7574C7C-3686-460F-9B9F-2A9122AA95F8}" dt="2024-02-25T21:07:13.962" v="2790"/>
@@ -3030,7 +3110,7 @@
           <a:p>
             <a:fld id="{0CD94E99-FA29-4EFF-88BE-3447E30E8C4D}" type="datetimeFigureOut">
               <a:rPr lang="en-GB" smtClean="0"/>
-              <a:t>26/02/2024</a:t>
+              <a:t>29/02/2024</a:t>
             </a:fld>
             <a:endParaRPr lang="en-GB"/>
           </a:p>
@@ -3238,7 +3318,7 @@
           <a:p>
             <a:fld id="{0CD94E99-FA29-4EFF-88BE-3447E30E8C4D}" type="datetimeFigureOut">
               <a:rPr lang="en-GB" smtClean="0"/>
-              <a:t>26/02/2024</a:t>
+              <a:t>29/02/2024</a:t>
             </a:fld>
             <a:endParaRPr lang="en-GB"/>
           </a:p>
@@ -3496,7 +3576,7 @@
           <a:p>
             <a:fld id="{0CD94E99-FA29-4EFF-88BE-3447E30E8C4D}" type="datetimeFigureOut">
               <a:rPr lang="en-GB" smtClean="0"/>
-              <a:t>26/02/2024</a:t>
+              <a:t>29/02/2024</a:t>
             </a:fld>
             <a:endParaRPr lang="en-GB"/>
           </a:p>
@@ -3682,7 +3762,7 @@
           <a:p>
             <a:fld id="{0CD94E99-FA29-4EFF-88BE-3447E30E8C4D}" type="datetimeFigureOut">
               <a:rPr lang="en-GB" smtClean="0"/>
-              <a:t>26/02/2024</a:t>
+              <a:t>29/02/2024</a:t>
             </a:fld>
             <a:endParaRPr lang="en-GB"/>
           </a:p>
@@ -4031,7 +4111,7 @@
           <a:p>
             <a:fld id="{0CD94E99-FA29-4EFF-88BE-3447E30E8C4D}" type="datetimeFigureOut">
               <a:rPr lang="en-GB" smtClean="0"/>
-              <a:t>26/02/2024</a:t>
+              <a:t>29/02/2024</a:t>
             </a:fld>
             <a:endParaRPr lang="en-GB"/>
           </a:p>
@@ -4306,7 +4386,7 @@
           <a:p>
             <a:fld id="{0CD94E99-FA29-4EFF-88BE-3447E30E8C4D}" type="datetimeFigureOut">
               <a:rPr lang="en-GB" smtClean="0"/>
-              <a:t>26/02/2024</a:t>
+              <a:t>29/02/2024</a:t>
             </a:fld>
             <a:endParaRPr lang="en-GB"/>
           </a:p>
@@ -4685,7 +4765,7 @@
           <a:p>
             <a:fld id="{0CD94E99-FA29-4EFF-88BE-3447E30E8C4D}" type="datetimeFigureOut">
               <a:rPr lang="en-GB" smtClean="0"/>
-              <a:t>26/02/2024</a:t>
+              <a:t>29/02/2024</a:t>
             </a:fld>
             <a:endParaRPr lang="en-GB"/>
           </a:p>
@@ -4803,7 +4883,7 @@
           <a:p>
             <a:fld id="{0CD94E99-FA29-4EFF-88BE-3447E30E8C4D}" type="datetimeFigureOut">
               <a:rPr lang="en-GB" smtClean="0"/>
-              <a:t>26/02/2024</a:t>
+              <a:t>29/02/2024</a:t>
             </a:fld>
             <a:endParaRPr lang="en-GB"/>
           </a:p>
@@ -4976,7 +5056,7 @@
           <a:p>
             <a:fld id="{0CD94E99-FA29-4EFF-88BE-3447E30E8C4D}" type="datetimeFigureOut">
               <a:rPr lang="en-GB" smtClean="0"/>
-              <a:t>26/02/2024</a:t>
+              <a:t>29/02/2024</a:t>
             </a:fld>
             <a:endParaRPr lang="en-GB"/>
           </a:p>
@@ -5332,7 +5412,7 @@
           <a:p>
             <a:fld id="{0CD94E99-FA29-4EFF-88BE-3447E30E8C4D}" type="datetimeFigureOut">
               <a:rPr lang="en-GB" smtClean="0"/>
-              <a:t>26/02/2024</a:t>
+              <a:t>29/02/2024</a:t>
             </a:fld>
             <a:endParaRPr lang="en-GB"/>
           </a:p>
@@ -5711,7 +5791,7 @@
           <a:p>
             <a:fld id="{0CD94E99-FA29-4EFF-88BE-3447E30E8C4D}" type="datetimeFigureOut">
               <a:rPr lang="en-GB" smtClean="0"/>
-              <a:t>26/02/2024</a:t>
+              <a:t>29/02/2024</a:t>
             </a:fld>
             <a:endParaRPr lang="en-GB"/>
           </a:p>
@@ -6003,7 +6083,7 @@
           <a:p>
             <a:fld id="{0CD94E99-FA29-4EFF-88BE-3447E30E8C4D}" type="datetimeFigureOut">
               <a:rPr lang="en-GB" smtClean="0"/>
-              <a:t>26/02/2024</a:t>
+              <a:t>29/02/2024</a:t>
             </a:fld>
             <a:endParaRPr lang="en-GB"/>
           </a:p>
@@ -7616,8 +7696,8 @@
         </p:blipFill>
         <p:spPr>
           <a:xfrm>
-            <a:off x="2475820" y="1339315"/>
-            <a:ext cx="7240360" cy="4822510"/>
+            <a:off x="1965620" y="1339315"/>
+            <a:ext cx="8260760" cy="4822510"/>
           </a:xfrm>
           <a:prstGeom prst="rect">
             <a:avLst/>
@@ -7814,10 +7894,10 @@
       </p:sp>
       <p:pic>
         <p:nvPicPr>
-          <p:cNvPr id="4" name="Picture 3" descr="A diagram of a diagram&#10;&#10;Description automatically generated with medium confidence">
+          <p:cNvPr id="5" name="Picture 4" descr="A diagram of a company&#10;&#10;Description automatically generated with medium confidence">
             <a:extLst>
               <a:ext uri="{FF2B5EF4-FFF2-40B4-BE49-F238E27FC236}">
-                <a16:creationId xmlns:a16="http://schemas.microsoft.com/office/drawing/2014/main" id="{6C8FD7A2-9490-5CDD-B6FB-D1FA5CEEBFAB}"/>
+                <a16:creationId xmlns:a16="http://schemas.microsoft.com/office/drawing/2014/main" id="{51F48AE8-C823-16D1-87BC-5F7EEC1A80B6}"/>
               </a:ext>
             </a:extLst>
           </p:cNvPr>
@@ -7840,8 +7920,8 @@
         </p:blipFill>
         <p:spPr>
           <a:xfrm>
-            <a:off x="2618913" y="1370264"/>
-            <a:ext cx="5933689" cy="4803589"/>
+            <a:off x="2168295" y="1370264"/>
+            <a:ext cx="7855409" cy="4860668"/>
           </a:xfrm>
           <a:prstGeom prst="rect">
             <a:avLst/>
@@ -7862,6 +7942,438 @@
 </file>
 
 <file path=ppt/slides/slide6.xml><?xml version="1.0" encoding="utf-8"?>
+<p:sld xmlns:a="http://schemas.openxmlformats.org/drawingml/2006/main" xmlns:r="http://schemas.openxmlformats.org/officeDocument/2006/relationships" xmlns:p="http://schemas.openxmlformats.org/presentationml/2006/main">
+  <p:cSld>
+    <p:spTree>
+      <p:nvGrpSpPr>
+        <p:cNvPr id="1" name="">
+          <a:extLst>
+            <a:ext uri="{FF2B5EF4-FFF2-40B4-BE49-F238E27FC236}">
+              <a16:creationId xmlns:a16="http://schemas.microsoft.com/office/drawing/2014/main" id="{CE665F83-FC8F-AD79-1A11-4C9E1BBC1198}"/>
+            </a:ext>
+          </a:extLst>
+        </p:cNvPr>
+        <p:cNvGrpSpPr/>
+        <p:nvPr/>
+      </p:nvGrpSpPr>
+      <p:grpSpPr>
+        <a:xfrm>
+          <a:off x="0" y="0"/>
+          <a:ext cx="0" cy="0"/>
+          <a:chOff x="0" y="0"/>
+          <a:chExt cx="0" cy="0"/>
+        </a:xfrm>
+      </p:grpSpPr>
+      <p:sp>
+        <p:nvSpPr>
+          <p:cNvPr id="15" name="Rectangle: Rounded Corners 14">
+            <a:extLst>
+              <a:ext uri="{FF2B5EF4-FFF2-40B4-BE49-F238E27FC236}">
+                <a16:creationId xmlns:a16="http://schemas.microsoft.com/office/drawing/2014/main" id="{A4606749-4EEB-B3B0-5952-FBE065DCB761}"/>
+              </a:ext>
+            </a:extLst>
+          </p:cNvPr>
+          <p:cNvSpPr/>
+          <p:nvPr/>
+        </p:nvSpPr>
+        <p:spPr>
+          <a:xfrm>
+            <a:off x="5273336" y="132620"/>
+            <a:ext cx="6208897" cy="1112812"/>
+          </a:xfrm>
+          <a:prstGeom prst="roundRect">
+            <a:avLst/>
+          </a:prstGeom>
+          <a:noFill/>
+        </p:spPr>
+        <p:style>
+          <a:lnRef idx="2">
+            <a:schemeClr val="accent1">
+              <a:shade val="15000"/>
+            </a:schemeClr>
+          </a:lnRef>
+          <a:fillRef idx="1">
+            <a:schemeClr val="accent1"/>
+          </a:fillRef>
+          <a:effectRef idx="0">
+            <a:schemeClr val="accent1"/>
+          </a:effectRef>
+          <a:fontRef idx="minor">
+            <a:schemeClr val="lt1"/>
+          </a:fontRef>
+        </p:style>
+        <p:txBody>
+          <a:bodyPr rtlCol="0" anchor="ctr"/>
+          <a:lstStyle/>
+          <a:p>
+            <a:pPr algn="ctr"/>
+            <a:endParaRPr lang="en-GB"/>
+          </a:p>
+        </p:txBody>
+      </p:sp>
+      <p:sp>
+        <p:nvSpPr>
+          <p:cNvPr id="8" name="TextBox 7">
+            <a:extLst>
+              <a:ext uri="{FF2B5EF4-FFF2-40B4-BE49-F238E27FC236}">
+                <a16:creationId xmlns:a16="http://schemas.microsoft.com/office/drawing/2014/main" id="{75270068-906F-74E3-DED9-9B74726E881F}"/>
+              </a:ext>
+            </a:extLst>
+          </p:cNvPr>
+          <p:cNvSpPr txBox="1"/>
+          <p:nvPr/>
+        </p:nvSpPr>
+        <p:spPr>
+          <a:xfrm>
+            <a:off x="5335480" y="257452"/>
+            <a:ext cx="5933689" cy="987980"/>
+          </a:xfrm>
+          <a:prstGeom prst="rect">
+            <a:avLst/>
+          </a:prstGeom>
+          <a:noFill/>
+        </p:spPr>
+        <p:txBody>
+          <a:bodyPr wrap="square">
+            <a:normAutofit/>
+          </a:bodyPr>
+          <a:lstStyle/>
+          <a:p>
+            <a:pPr algn="ctr"/>
+            <a:r>
+              <a:rPr lang="en-US" dirty="0"/>
+              <a:t>Can we design FL systems that work within a distributed multi-task learning system?</a:t>
+            </a:r>
+          </a:p>
+          <a:p>
+            <a:endParaRPr lang="en-US" dirty="0"/>
+          </a:p>
+        </p:txBody>
+      </p:sp>
+      <p:sp>
+        <p:nvSpPr>
+          <p:cNvPr id="3" name="Title 1">
+            <a:extLst>
+              <a:ext uri="{FF2B5EF4-FFF2-40B4-BE49-F238E27FC236}">
+                <a16:creationId xmlns:a16="http://schemas.microsoft.com/office/drawing/2014/main" id="{2D54498E-2E1C-278F-44CE-3BFE5BB6C639}"/>
+              </a:ext>
+            </a:extLst>
+          </p:cNvPr>
+          <p:cNvSpPr txBox="1">
+            <a:spLocks/>
+          </p:cNvSpPr>
+          <p:nvPr/>
+        </p:nvSpPr>
+        <p:spPr>
+          <a:xfrm>
+            <a:off x="1162975" y="329312"/>
+            <a:ext cx="3959441" cy="719427"/>
+          </a:xfrm>
+          <a:prstGeom prst="rect">
+            <a:avLst/>
+          </a:prstGeom>
+        </p:spPr>
+        <p:txBody>
+          <a:bodyPr vert="horz" lIns="91440" tIns="45720" rIns="91440" bIns="45720" rtlCol="0" anchor="b">
+            <a:normAutofit fontScale="75000" lnSpcReduction="20000"/>
+          </a:bodyPr>
+          <a:lstStyle>
+            <a:lvl1pPr algn="l" defTabSz="914400" rtl="0" eaLnBrk="1" latinLnBrk="0" hangingPunct="1">
+              <a:lnSpc>
+                <a:spcPct val="85000"/>
+              </a:lnSpc>
+              <a:spcBef>
+                <a:spcPct val="0"/>
+              </a:spcBef>
+              <a:buNone/>
+              <a:defRPr sz="4800" kern="1200" spc="-50" baseline="0">
+                <a:solidFill>
+                  <a:schemeClr val="tx1">
+                    <a:lumMod val="75000"/>
+                    <a:lumOff val="25000"/>
+                  </a:schemeClr>
+                </a:solidFill>
+                <a:latin typeface="+mj-lt"/>
+                <a:ea typeface="+mj-ea"/>
+                <a:cs typeface="+mj-cs"/>
+              </a:defRPr>
+            </a:lvl1pPr>
+          </a:lstStyle>
+          <a:p>
+            <a:r>
+              <a:rPr lang="en-US" dirty="0"/>
+              <a:t>Research Question 3</a:t>
+            </a:r>
+            <a:endParaRPr lang="en-GB" dirty="0"/>
+          </a:p>
+        </p:txBody>
+      </p:sp>
+      <p:pic>
+        <p:nvPicPr>
+          <p:cNvPr id="4" name="Picture 3" descr="A diagram of a flowchart&#10;&#10;Description automatically generated">
+            <a:extLst>
+              <a:ext uri="{FF2B5EF4-FFF2-40B4-BE49-F238E27FC236}">
+                <a16:creationId xmlns:a16="http://schemas.microsoft.com/office/drawing/2014/main" id="{52BE103E-19D1-4D2A-5327-9DFA22AD801C}"/>
+              </a:ext>
+            </a:extLst>
+          </p:cNvPr>
+          <p:cNvPicPr>
+            <a:picLocks noChangeAspect="1"/>
+          </p:cNvPicPr>
+          <p:nvPr/>
+        </p:nvPicPr>
+        <p:blipFill>
+          <a:blip r:embed="rId2">
+            <a:extLst>
+              <a:ext uri="{28A0092B-C50C-407E-A947-70E740481C1C}">
+                <a14:useLocalDpi xmlns:a14="http://schemas.microsoft.com/office/drawing/2010/main" val="0"/>
+              </a:ext>
+            </a:extLst>
+          </a:blip>
+          <a:stretch>
+            <a:fillRect/>
+          </a:stretch>
+        </p:blipFill>
+        <p:spPr>
+          <a:xfrm>
+            <a:off x="260415" y="1385504"/>
+            <a:ext cx="7668129" cy="4885430"/>
+          </a:xfrm>
+          <a:prstGeom prst="rect">
+            <a:avLst/>
+          </a:prstGeom>
+        </p:spPr>
+      </p:pic>
+    </p:spTree>
+    <p:extLst>
+      <p:ext uri="{BB962C8B-B14F-4D97-AF65-F5344CB8AC3E}">
+        <p14:creationId xmlns:p14="http://schemas.microsoft.com/office/powerpoint/2010/main" val="1816625563"/>
+      </p:ext>
+    </p:extLst>
+  </p:cSld>
+  <p:clrMapOvr>
+    <a:masterClrMapping/>
+  </p:clrMapOvr>
+</p:sld>
+</file>
+
+<file path=ppt/slides/slide7.xml><?xml version="1.0" encoding="utf-8"?>
+<p:sld xmlns:a="http://schemas.openxmlformats.org/drawingml/2006/main" xmlns:r="http://schemas.openxmlformats.org/officeDocument/2006/relationships" xmlns:p="http://schemas.openxmlformats.org/presentationml/2006/main">
+  <p:cSld>
+    <p:spTree>
+      <p:nvGrpSpPr>
+        <p:cNvPr id="1" name="">
+          <a:extLst>
+            <a:ext uri="{FF2B5EF4-FFF2-40B4-BE49-F238E27FC236}">
+              <a16:creationId xmlns:a16="http://schemas.microsoft.com/office/drawing/2014/main" id="{57CDB7E2-D2E6-8925-4F5B-B2741E365FD8}"/>
+            </a:ext>
+          </a:extLst>
+        </p:cNvPr>
+        <p:cNvGrpSpPr/>
+        <p:nvPr/>
+      </p:nvGrpSpPr>
+      <p:grpSpPr>
+        <a:xfrm>
+          <a:off x="0" y="0"/>
+          <a:ext cx="0" cy="0"/>
+          <a:chOff x="0" y="0"/>
+          <a:chExt cx="0" cy="0"/>
+        </a:xfrm>
+      </p:grpSpPr>
+      <p:sp>
+        <p:nvSpPr>
+          <p:cNvPr id="15" name="Rectangle: Rounded Corners 14">
+            <a:extLst>
+              <a:ext uri="{FF2B5EF4-FFF2-40B4-BE49-F238E27FC236}">
+                <a16:creationId xmlns:a16="http://schemas.microsoft.com/office/drawing/2014/main" id="{A8E7C9D0-73CD-6E5F-4ED1-688BDA99F0C9}"/>
+              </a:ext>
+            </a:extLst>
+          </p:cNvPr>
+          <p:cNvSpPr/>
+          <p:nvPr/>
+        </p:nvSpPr>
+        <p:spPr>
+          <a:xfrm>
+            <a:off x="5273336" y="132620"/>
+            <a:ext cx="6208897" cy="1112812"/>
+          </a:xfrm>
+          <a:prstGeom prst="roundRect">
+            <a:avLst/>
+          </a:prstGeom>
+          <a:noFill/>
+        </p:spPr>
+        <p:style>
+          <a:lnRef idx="2">
+            <a:schemeClr val="accent1">
+              <a:shade val="15000"/>
+            </a:schemeClr>
+          </a:lnRef>
+          <a:fillRef idx="1">
+            <a:schemeClr val="accent1"/>
+          </a:fillRef>
+          <a:effectRef idx="0">
+            <a:schemeClr val="accent1"/>
+          </a:effectRef>
+          <a:fontRef idx="minor">
+            <a:schemeClr val="lt1"/>
+          </a:fontRef>
+        </p:style>
+        <p:txBody>
+          <a:bodyPr rtlCol="0" anchor="ctr"/>
+          <a:lstStyle/>
+          <a:p>
+            <a:pPr algn="ctr"/>
+            <a:endParaRPr lang="en-GB"/>
+          </a:p>
+        </p:txBody>
+      </p:sp>
+      <p:sp>
+        <p:nvSpPr>
+          <p:cNvPr id="8" name="TextBox 7">
+            <a:extLst>
+              <a:ext uri="{FF2B5EF4-FFF2-40B4-BE49-F238E27FC236}">
+                <a16:creationId xmlns:a16="http://schemas.microsoft.com/office/drawing/2014/main" id="{6C0F12F4-24FC-492A-8834-CEBD26CB31E4}"/>
+              </a:ext>
+            </a:extLst>
+          </p:cNvPr>
+          <p:cNvSpPr txBox="1"/>
+          <p:nvPr/>
+        </p:nvSpPr>
+        <p:spPr>
+          <a:xfrm>
+            <a:off x="5335480" y="257452"/>
+            <a:ext cx="5933689" cy="987980"/>
+          </a:xfrm>
+          <a:prstGeom prst="rect">
+            <a:avLst/>
+          </a:prstGeom>
+          <a:noFill/>
+        </p:spPr>
+        <p:txBody>
+          <a:bodyPr wrap="square">
+            <a:normAutofit/>
+          </a:bodyPr>
+          <a:lstStyle/>
+          <a:p>
+            <a:pPr algn="ctr"/>
+            <a:r>
+              <a:rPr lang="en-US" dirty="0"/>
+              <a:t>Multi-variate Data</a:t>
+            </a:r>
+          </a:p>
+          <a:p>
+            <a:endParaRPr lang="en-US" dirty="0"/>
+          </a:p>
+        </p:txBody>
+      </p:sp>
+      <p:sp>
+        <p:nvSpPr>
+          <p:cNvPr id="3" name="Title 1">
+            <a:extLst>
+              <a:ext uri="{FF2B5EF4-FFF2-40B4-BE49-F238E27FC236}">
+                <a16:creationId xmlns:a16="http://schemas.microsoft.com/office/drawing/2014/main" id="{546C1097-9E88-BBC4-17C5-E68E3FDD9D52}"/>
+              </a:ext>
+            </a:extLst>
+          </p:cNvPr>
+          <p:cNvSpPr txBox="1">
+            <a:spLocks/>
+          </p:cNvSpPr>
+          <p:nvPr/>
+        </p:nvSpPr>
+        <p:spPr>
+          <a:xfrm>
+            <a:off x="1162975" y="329312"/>
+            <a:ext cx="3959441" cy="719427"/>
+          </a:xfrm>
+          <a:prstGeom prst="rect">
+            <a:avLst/>
+          </a:prstGeom>
+        </p:spPr>
+        <p:txBody>
+          <a:bodyPr vert="horz" lIns="91440" tIns="45720" rIns="91440" bIns="45720" rtlCol="0" anchor="b">
+            <a:normAutofit fontScale="75000" lnSpcReduction="20000"/>
+          </a:bodyPr>
+          <a:lstStyle>
+            <a:lvl1pPr algn="l" defTabSz="914400" rtl="0" eaLnBrk="1" latinLnBrk="0" hangingPunct="1">
+              <a:lnSpc>
+                <a:spcPct val="85000"/>
+              </a:lnSpc>
+              <a:spcBef>
+                <a:spcPct val="0"/>
+              </a:spcBef>
+              <a:buNone/>
+              <a:defRPr sz="4800" kern="1200" spc="-50" baseline="0">
+                <a:solidFill>
+                  <a:schemeClr val="tx1">
+                    <a:lumMod val="75000"/>
+                    <a:lumOff val="25000"/>
+                  </a:schemeClr>
+                </a:solidFill>
+                <a:latin typeface="+mj-lt"/>
+                <a:ea typeface="+mj-ea"/>
+                <a:cs typeface="+mj-cs"/>
+              </a:defRPr>
+            </a:lvl1pPr>
+          </a:lstStyle>
+          <a:p>
+            <a:r>
+              <a:rPr lang="en-US" dirty="0"/>
+              <a:t>Research Question 4</a:t>
+            </a:r>
+            <a:endParaRPr lang="en-GB" dirty="0"/>
+          </a:p>
+        </p:txBody>
+      </p:sp>
+      <p:pic>
+        <p:nvPicPr>
+          <p:cNvPr id="7" name="Picture 6" descr="A diagram of a diagram&#10;&#10;Description automatically generated with medium confidence">
+            <a:extLst>
+              <a:ext uri="{FF2B5EF4-FFF2-40B4-BE49-F238E27FC236}">
+                <a16:creationId xmlns:a16="http://schemas.microsoft.com/office/drawing/2014/main" id="{5C93D92E-D605-444D-144C-ECE7253742D0}"/>
+              </a:ext>
+            </a:extLst>
+          </p:cNvPr>
+          <p:cNvPicPr>
+            <a:picLocks noChangeAspect="1"/>
+          </p:cNvPicPr>
+          <p:nvPr/>
+        </p:nvPicPr>
+        <p:blipFill>
+          <a:blip r:embed="rId2">
+            <a:extLst>
+              <a:ext uri="{28A0092B-C50C-407E-A947-70E740481C1C}">
+                <a14:useLocalDpi xmlns:a14="http://schemas.microsoft.com/office/drawing/2010/main" val="0"/>
+              </a:ext>
+            </a:extLst>
+          </a:blip>
+          <a:stretch>
+            <a:fillRect/>
+          </a:stretch>
+        </p:blipFill>
+        <p:spPr>
+          <a:xfrm>
+            <a:off x="2941320" y="1497330"/>
+            <a:ext cx="6309360" cy="3863340"/>
+          </a:xfrm>
+          <a:prstGeom prst="rect">
+            <a:avLst/>
+          </a:prstGeom>
+        </p:spPr>
+      </p:pic>
+    </p:spTree>
+    <p:extLst>
+      <p:ext uri="{BB962C8B-B14F-4D97-AF65-F5344CB8AC3E}">
+        <p14:creationId xmlns:p14="http://schemas.microsoft.com/office/powerpoint/2010/main" val="1050643754"/>
+      </p:ext>
+    </p:extLst>
+  </p:cSld>
+  <p:clrMapOvr>
+    <a:masterClrMapping/>
+  </p:clrMapOvr>
+</p:sld>
+</file>
+
+<file path=ppt/slides/slide8.xml><?xml version="1.0" encoding="utf-8"?>
 <p:sld xmlns:a="http://schemas.openxmlformats.org/drawingml/2006/main" xmlns:r="http://schemas.openxmlformats.org/officeDocument/2006/relationships" xmlns:p="http://schemas.openxmlformats.org/presentationml/2006/main">
   <p:cSld>
     <p:spTree>
@@ -7969,7 +8481,7 @@
 </p:sld>
 </file>
 
-<file path=ppt/slides/slide7.xml><?xml version="1.0" encoding="utf-8"?>
+<file path=ppt/slides/slide9.xml><?xml version="1.0" encoding="utf-8"?>
 <p:sld xmlns:a="http://schemas.openxmlformats.org/drawingml/2006/main" xmlns:r="http://schemas.openxmlformats.org/officeDocument/2006/relationships" xmlns:p="http://schemas.openxmlformats.org/presentationml/2006/main">
   <p:cSld>
     <p:spTree>

</xml_diff>

<commit_message>
Updating presentation with new format and questions
</commit_message>
<xml_diff>
--- a/Presentations/Supervisor Meetings/2024/20240301.pptx
+++ b/Presentations/Supervisor Meetings/2024/20240301.pptx
@@ -1,19 +1,24 @@
 
 <file path=ppt/presentation.xml><?xml version="1.0" encoding="utf-8"?>
-<p:presentation xmlns:a="http://schemas.openxmlformats.org/drawingml/2006/main" xmlns:r="http://schemas.openxmlformats.org/officeDocument/2006/relationships" xmlns:p="http://schemas.openxmlformats.org/presentationml/2006/main" saveSubsetFonts="1">
+<p:presentation xmlns:a="http://schemas.openxmlformats.org/drawingml/2006/main" xmlns:r="http://schemas.openxmlformats.org/officeDocument/2006/relationships" xmlns:p="http://schemas.openxmlformats.org/presentationml/2006/main" showSpecialPlsOnTitleSld="0" saveSubsetFonts="1">
   <p:sldMasterIdLst>
     <p:sldMasterId id="2147483884" r:id="rId1"/>
   </p:sldMasterIdLst>
+  <p:notesMasterIdLst>
+    <p:notesMasterId r:id="rId13"/>
+  </p:notesMasterIdLst>
   <p:sldIdLst>
     <p:sldId id="256" r:id="rId2"/>
     <p:sldId id="257" r:id="rId3"/>
     <p:sldId id="266" r:id="rId4"/>
     <p:sldId id="262" r:id="rId5"/>
-    <p:sldId id="267" r:id="rId6"/>
-    <p:sldId id="271" r:id="rId7"/>
-    <p:sldId id="270" r:id="rId8"/>
+    <p:sldId id="271" r:id="rId6"/>
+    <p:sldId id="270" r:id="rId7"/>
+    <p:sldId id="272" r:id="rId8"/>
     <p:sldId id="265" r:id="rId9"/>
-    <p:sldId id="269" r:id="rId10"/>
+    <p:sldId id="273" r:id="rId10"/>
+    <p:sldId id="274" r:id="rId11"/>
+    <p:sldId id="275" r:id="rId12"/>
   </p:sldIdLst>
   <p:sldSz cx="12192000" cy="6858000"/>
   <p:notesSz cx="6858000" cy="9144000"/>
@@ -123,7 +128,7 @@
 <file path=ppt/revisionInfo.xml><?xml version="1.0" encoding="utf-8"?>
 <p1510:revInfo xmlns:a="http://schemas.openxmlformats.org/drawingml/2006/main" xmlns:r="http://schemas.openxmlformats.org/officeDocument/2006/relationships" xmlns:p1510="http://schemas.microsoft.com/office/powerpoint/2015/10/main">
   <p1510:revLst>
-    <p1510:client id="{B7574C7C-3686-460F-9B9F-2A9122AA95F8}" v="76" dt="2024-02-29T21:38:38.604"/>
+    <p1510:client id="{B7574C7C-3686-460F-9B9F-2A9122AA95F8}" v="112" dt="2024-03-01T13:03:36.357"/>
   </p1510:revLst>
 </p1510:revInfo>
 </file>
@@ -1484,7 +1489,7 @@
   <pc:docChgLst>
     <pc:chgData name="Sean O Fithcheallaigh" userId="47659c31-a575-4792-8be3-61268c4ee0d6" providerId="ADAL" clId="{B7574C7C-3686-460F-9B9F-2A9122AA95F8}"/>
     <pc:docChg chg="undo custSel addSld delSld modSld sldOrd modMainMaster">
-      <pc:chgData name="Sean O Fithcheallaigh" userId="47659c31-a575-4792-8be3-61268c4ee0d6" providerId="ADAL" clId="{B7574C7C-3686-460F-9B9F-2A9122AA95F8}" dt="2024-02-29T21:38:50.868" v="2984"/>
+      <pc:chgData name="Sean O Fithcheallaigh" userId="47659c31-a575-4792-8be3-61268c4ee0d6" providerId="ADAL" clId="{B7574C7C-3686-460F-9B9F-2A9122AA95F8}" dt="2024-03-01T13:45:38.718" v="5655" actId="20577"/>
       <pc:docMkLst>
         <pc:docMk/>
       </pc:docMkLst>
@@ -1551,8 +1556,8 @@
           </ac:cxnSpMkLst>
         </pc:cxnChg>
       </pc:sldChg>
-      <pc:sldChg chg="addSp delSp modSp mod setBg">
-        <pc:chgData name="Sean O Fithcheallaigh" userId="47659c31-a575-4792-8be3-61268c4ee0d6" providerId="ADAL" clId="{B7574C7C-3686-460F-9B9F-2A9122AA95F8}" dt="2024-02-25T21:07:13.962" v="2790"/>
+      <pc:sldChg chg="addSp delSp modSp mod setBg modShow">
+        <pc:chgData name="Sean O Fithcheallaigh" userId="47659c31-a575-4792-8be3-61268c4ee0d6" providerId="ADAL" clId="{B7574C7C-3686-460F-9B9F-2A9122AA95F8}" dt="2024-03-01T13:03:18.303" v="4997" actId="729"/>
         <pc:sldMkLst>
           <pc:docMk/>
           <pc:sldMk cId="3126834720" sldId="257"/>
@@ -1614,7 +1619,7 @@
           </ac:spMkLst>
         </pc:spChg>
         <pc:spChg chg="add mod">
-          <ac:chgData name="Sean O Fithcheallaigh" userId="47659c31-a575-4792-8be3-61268c4ee0d6" providerId="ADAL" clId="{B7574C7C-3686-460F-9B9F-2A9122AA95F8}" dt="2024-02-12T20:29:40.155" v="151" actId="1076"/>
+          <ac:chgData name="Sean O Fithcheallaigh" userId="47659c31-a575-4792-8be3-61268c4ee0d6" providerId="ADAL" clId="{B7574C7C-3686-460F-9B9F-2A9122AA95F8}" dt="2024-03-01T11:57:39.762" v="4666" actId="1076"/>
           <ac:spMkLst>
             <pc:docMk/>
             <pc:sldMk cId="3126834720" sldId="257"/>
@@ -1622,7 +1627,7 @@
           </ac:spMkLst>
         </pc:spChg>
         <pc:spChg chg="add mod ord">
-          <ac:chgData name="Sean O Fithcheallaigh" userId="47659c31-a575-4792-8be3-61268c4ee0d6" providerId="ADAL" clId="{B7574C7C-3686-460F-9B9F-2A9122AA95F8}" dt="2024-02-12T20:28:48.327" v="86" actId="171"/>
+          <ac:chgData name="Sean O Fithcheallaigh" userId="47659c31-a575-4792-8be3-61268c4ee0d6" providerId="ADAL" clId="{B7574C7C-3686-460F-9B9F-2A9122AA95F8}" dt="2024-03-01T11:57:39.762" v="4666" actId="1076"/>
           <ac:spMkLst>
             <pc:docMk/>
             <pc:sldMk cId="3126834720" sldId="257"/>
@@ -1646,7 +1651,7 @@
           </ac:spMkLst>
         </pc:spChg>
         <pc:spChg chg="add mod ord">
-          <ac:chgData name="Sean O Fithcheallaigh" userId="47659c31-a575-4792-8be3-61268c4ee0d6" providerId="ADAL" clId="{B7574C7C-3686-460F-9B9F-2A9122AA95F8}" dt="2024-02-12T20:48:34.784" v="167" actId="171"/>
+          <ac:chgData name="Sean O Fithcheallaigh" userId="47659c31-a575-4792-8be3-61268c4ee0d6" providerId="ADAL" clId="{B7574C7C-3686-460F-9B9F-2A9122AA95F8}" dt="2024-03-01T11:57:54.724" v="4668" actId="1076"/>
           <ac:spMkLst>
             <pc:docMk/>
             <pc:sldMk cId="3126834720" sldId="257"/>
@@ -1654,7 +1659,7 @@
           </ac:spMkLst>
         </pc:spChg>
         <pc:spChg chg="add mod">
-          <ac:chgData name="Sean O Fithcheallaigh" userId="47659c31-a575-4792-8be3-61268c4ee0d6" providerId="ADAL" clId="{B7574C7C-3686-460F-9B9F-2A9122AA95F8}" dt="2024-02-12T21:08:28.411" v="269" actId="1076"/>
+          <ac:chgData name="Sean O Fithcheallaigh" userId="47659c31-a575-4792-8be3-61268c4ee0d6" providerId="ADAL" clId="{B7574C7C-3686-460F-9B9F-2A9122AA95F8}" dt="2024-03-01T11:57:54.724" v="4668" actId="1076"/>
           <ac:spMkLst>
             <pc:docMk/>
             <pc:sldMk cId="3126834720" sldId="257"/>
@@ -1662,7 +1667,7 @@
           </ac:spMkLst>
         </pc:spChg>
         <pc:spChg chg="add mod ord">
-          <ac:chgData name="Sean O Fithcheallaigh" userId="47659c31-a575-4792-8be3-61268c4ee0d6" providerId="ADAL" clId="{B7574C7C-3686-460F-9B9F-2A9122AA95F8}" dt="2024-02-12T21:07:03.117" v="225" actId="171"/>
+          <ac:chgData name="Sean O Fithcheallaigh" userId="47659c31-a575-4792-8be3-61268c4ee0d6" providerId="ADAL" clId="{B7574C7C-3686-460F-9B9F-2A9122AA95F8}" dt="2024-03-01T12:00:21.718" v="4674" actId="1076"/>
           <ac:spMkLst>
             <pc:docMk/>
             <pc:sldMk cId="3126834720" sldId="257"/>
@@ -1670,7 +1675,7 @@
           </ac:spMkLst>
         </pc:spChg>
         <pc:spChg chg="add mod">
-          <ac:chgData name="Sean O Fithcheallaigh" userId="47659c31-a575-4792-8be3-61268c4ee0d6" providerId="ADAL" clId="{B7574C7C-3686-460F-9B9F-2A9122AA95F8}" dt="2024-02-12T21:08:34.338" v="270" actId="1076"/>
+          <ac:chgData name="Sean O Fithcheallaigh" userId="47659c31-a575-4792-8be3-61268c4ee0d6" providerId="ADAL" clId="{B7574C7C-3686-460F-9B9F-2A9122AA95F8}" dt="2024-03-01T12:00:36.525" v="4705" actId="20577"/>
           <ac:spMkLst>
             <pc:docMk/>
             <pc:sldMk cId="3126834720" sldId="257"/>
@@ -1685,8 +1690,8 @@
             <ac:graphicFrameMk id="12" creationId="{A5A4C080-DB32-26A6-3579-42B671D802FD}"/>
           </ac:graphicFrameMkLst>
         </pc:graphicFrameChg>
-        <pc:picChg chg="add mod">
-          <ac:chgData name="Sean O Fithcheallaigh" userId="47659c31-a575-4792-8be3-61268c4ee0d6" providerId="ADAL" clId="{B7574C7C-3686-460F-9B9F-2A9122AA95F8}" dt="2024-02-16T14:57:22.743" v="1212" actId="1076"/>
+        <pc:picChg chg="add del mod">
+          <ac:chgData name="Sean O Fithcheallaigh" userId="47659c31-a575-4792-8be3-61268c4ee0d6" providerId="ADAL" clId="{B7574C7C-3686-460F-9B9F-2A9122AA95F8}" dt="2024-03-01T12:00:39.719" v="4706" actId="478"/>
           <ac:picMkLst>
             <pc:docMk/>
             <pc:sldMk cId="3126834720" sldId="257"/>
@@ -1702,7 +1707,15 @@
           </ac:picMkLst>
         </pc:picChg>
         <pc:picChg chg="add mod">
-          <ac:chgData name="Sean O Fithcheallaigh" userId="47659c31-a575-4792-8be3-61268c4ee0d6" providerId="ADAL" clId="{B7574C7C-3686-460F-9B9F-2A9122AA95F8}" dt="2024-02-12T20:48:22.859" v="164" actId="688"/>
+          <ac:chgData name="Sean O Fithcheallaigh" userId="47659c31-a575-4792-8be3-61268c4ee0d6" providerId="ADAL" clId="{B7574C7C-3686-460F-9B9F-2A9122AA95F8}" dt="2024-03-01T12:00:25.077" v="4676" actId="1076"/>
+          <ac:picMkLst>
+            <pc:docMk/>
+            <pc:sldMk cId="3126834720" sldId="257"/>
+            <ac:picMk id="7" creationId="{3478E47B-3487-5A38-739A-75A7EE015E55}"/>
+          </ac:picMkLst>
+        </pc:picChg>
+        <pc:picChg chg="add mod">
+          <ac:chgData name="Sean O Fithcheallaigh" userId="47659c31-a575-4792-8be3-61268c4ee0d6" providerId="ADAL" clId="{B7574C7C-3686-460F-9B9F-2A9122AA95F8}" dt="2024-03-01T11:57:54.724" v="4668" actId="1076"/>
           <ac:picMkLst>
             <pc:docMk/>
             <pc:sldMk cId="3126834720" sldId="257"/>
@@ -1710,7 +1723,7 @@
           </ac:picMkLst>
         </pc:picChg>
         <pc:picChg chg="add mod">
-          <ac:chgData name="Sean O Fithcheallaigh" userId="47659c31-a575-4792-8be3-61268c4ee0d6" providerId="ADAL" clId="{B7574C7C-3686-460F-9B9F-2A9122AA95F8}" dt="2024-02-12T21:01:16.395" v="219" actId="1076"/>
+          <ac:chgData name="Sean O Fithcheallaigh" userId="47659c31-a575-4792-8be3-61268c4ee0d6" providerId="ADAL" clId="{B7574C7C-3686-460F-9B9F-2A9122AA95F8}" dt="2024-03-01T11:57:39.762" v="4666" actId="1076"/>
           <ac:picMkLst>
             <pc:docMk/>
             <pc:sldMk cId="3126834720" sldId="257"/>
@@ -1755,11 +1768,19 @@
         </pc:sldMkLst>
       </pc:sldChg>
       <pc:sldChg chg="addSp delSp modSp new mod chgLayout">
-        <pc:chgData name="Sean O Fithcheallaigh" userId="47659c31-a575-4792-8be3-61268c4ee0d6" providerId="ADAL" clId="{B7574C7C-3686-460F-9B9F-2A9122AA95F8}" dt="2024-02-29T21:20:52.491" v="2834" actId="1076"/>
+        <pc:chgData name="Sean O Fithcheallaigh" userId="47659c31-a575-4792-8be3-61268c4ee0d6" providerId="ADAL" clId="{B7574C7C-3686-460F-9B9F-2A9122AA95F8}" dt="2024-03-01T11:24:53.445" v="4582" actId="1076"/>
         <pc:sldMkLst>
           <pc:docMk/>
           <pc:sldMk cId="2974212779" sldId="262"/>
         </pc:sldMkLst>
+        <pc:spChg chg="add del mod">
+          <ac:chgData name="Sean O Fithcheallaigh" userId="47659c31-a575-4792-8be3-61268c4ee0d6" providerId="ADAL" clId="{B7574C7C-3686-460F-9B9F-2A9122AA95F8}" dt="2024-03-01T08:43:17.004" v="2988"/>
+          <ac:spMkLst>
+            <pc:docMk/>
+            <pc:sldMk cId="2974212779" sldId="262"/>
+            <ac:spMk id="2" creationId="{7070C02E-229F-A4CE-A75A-CDC0E79C9AFC}"/>
+          </ac:spMkLst>
+        </pc:spChg>
         <pc:spChg chg="del mod ord">
           <ac:chgData name="Sean O Fithcheallaigh" userId="47659c31-a575-4792-8be3-61268c4ee0d6" providerId="ADAL" clId="{B7574C7C-3686-460F-9B9F-2A9122AA95F8}" dt="2024-02-25T20:57:33.742" v="2682" actId="478"/>
           <ac:spMkLst>
@@ -1809,6 +1830,14 @@
           </ac:spMkLst>
         </pc:spChg>
         <pc:spChg chg="add del mod">
+          <ac:chgData name="Sean O Fithcheallaigh" userId="47659c31-a575-4792-8be3-61268c4ee0d6" providerId="ADAL" clId="{B7574C7C-3686-460F-9B9F-2A9122AA95F8}" dt="2024-03-01T08:43:36.343" v="2993" actId="478"/>
+          <ac:spMkLst>
+            <pc:docMk/>
+            <pc:sldMk cId="2974212779" sldId="262"/>
+            <ac:spMk id="4" creationId="{ECDB5D3C-3D61-BC34-AB42-1071A74D2629}"/>
+          </ac:spMkLst>
+        </pc:spChg>
+        <pc:spChg chg="add del mod">
           <ac:chgData name="Sean O Fithcheallaigh" userId="47659c31-a575-4792-8be3-61268c4ee0d6" providerId="ADAL" clId="{B7574C7C-3686-460F-9B9F-2A9122AA95F8}" dt="2024-02-17T13:15:29.275" v="2050" actId="478"/>
           <ac:spMkLst>
             <pc:docMk/>
@@ -1832,6 +1861,30 @@
             <ac:spMk id="6" creationId="{8D1E488F-BB03-F49C-8001-0454BC0AB8E8}"/>
           </ac:spMkLst>
         </pc:spChg>
+        <pc:spChg chg="add mod ord">
+          <ac:chgData name="Sean O Fithcheallaigh" userId="47659c31-a575-4792-8be3-61268c4ee0d6" providerId="ADAL" clId="{B7574C7C-3686-460F-9B9F-2A9122AA95F8}" dt="2024-03-01T11:22:56.909" v="4572" actId="1076"/>
+          <ac:spMkLst>
+            <pc:docMk/>
+            <pc:sldMk cId="2974212779" sldId="262"/>
+            <ac:spMk id="6" creationId="{D81FD54A-A947-EFCC-5FD9-69780A567830}"/>
+          </ac:spMkLst>
+        </pc:spChg>
+        <pc:spChg chg="add mod ord">
+          <ac:chgData name="Sean O Fithcheallaigh" userId="47659c31-a575-4792-8be3-61268c4ee0d6" providerId="ADAL" clId="{B7574C7C-3686-460F-9B9F-2A9122AA95F8}" dt="2024-03-01T11:22:56.909" v="4572" actId="1076"/>
+          <ac:spMkLst>
+            <pc:docMk/>
+            <pc:sldMk cId="2974212779" sldId="262"/>
+            <ac:spMk id="7" creationId="{C17CB13B-E901-5B0A-8349-1A54F83A8834}"/>
+          </ac:spMkLst>
+        </pc:spChg>
+        <pc:spChg chg="add mod ord">
+          <ac:chgData name="Sean O Fithcheallaigh" userId="47659c31-a575-4792-8be3-61268c4ee0d6" providerId="ADAL" clId="{B7574C7C-3686-460F-9B9F-2A9122AA95F8}" dt="2024-03-01T11:24:23.298" v="4580" actId="1076"/>
+          <ac:spMkLst>
+            <pc:docMk/>
+            <pc:sldMk cId="2974212779" sldId="262"/>
+            <ac:spMk id="8" creationId="{5C583157-4AA1-418C-C8AC-7FB69545DA72}"/>
+          </ac:spMkLst>
+        </pc:spChg>
         <pc:spChg chg="add del mod">
           <ac:chgData name="Sean O Fithcheallaigh" userId="47659c31-a575-4792-8be3-61268c4ee0d6" providerId="ADAL" clId="{B7574C7C-3686-460F-9B9F-2A9122AA95F8}" dt="2024-02-17T12:31:04.058" v="2033" actId="478"/>
           <ac:spMkLst>
@@ -1840,6 +1893,14 @@
             <ac:spMk id="8" creationId="{E62E95DE-1F47-7F82-7AE9-6E0238820223}"/>
           </ac:spMkLst>
         </pc:spChg>
+        <pc:spChg chg="add del mod">
+          <ac:chgData name="Sean O Fithcheallaigh" userId="47659c31-a575-4792-8be3-61268c4ee0d6" providerId="ADAL" clId="{B7574C7C-3686-460F-9B9F-2A9122AA95F8}" dt="2024-03-01T10:19:16.937" v="3916" actId="478"/>
+          <ac:spMkLst>
+            <pc:docMk/>
+            <pc:sldMk cId="2974212779" sldId="262"/>
+            <ac:spMk id="9" creationId="{93875F79-149A-1124-B95D-0F8AE9EDC33A}"/>
+          </ac:spMkLst>
+        </pc:spChg>
         <pc:spChg chg="add mod">
           <ac:chgData name="Sean O Fithcheallaigh" userId="47659c31-a575-4792-8be3-61268c4ee0d6" providerId="ADAL" clId="{B7574C7C-3686-460F-9B9F-2A9122AA95F8}" dt="2024-02-25T20:54:22.073" v="2600" actId="1076"/>
           <ac:spMkLst>
@@ -1848,6 +1909,14 @@
             <ac:spMk id="10" creationId="{7ADD75FB-3E51-CABF-D1C7-E1417E081915}"/>
           </ac:spMkLst>
         </pc:spChg>
+        <pc:spChg chg="add mod">
+          <ac:chgData name="Sean O Fithcheallaigh" userId="47659c31-a575-4792-8be3-61268c4ee0d6" providerId="ADAL" clId="{B7574C7C-3686-460F-9B9F-2A9122AA95F8}" dt="2024-03-01T11:24:23.298" v="4580" actId="1076"/>
+          <ac:spMkLst>
+            <pc:docMk/>
+            <pc:sldMk cId="2974212779" sldId="262"/>
+            <ac:spMk id="11" creationId="{A6579307-C72F-D609-0576-3CA9714E9439}"/>
+          </ac:spMkLst>
+        </pc:spChg>
         <pc:spChg chg="add del mod">
           <ac:chgData name="Sean O Fithcheallaigh" userId="47659c31-a575-4792-8be3-61268c4ee0d6" providerId="ADAL" clId="{B7574C7C-3686-460F-9B9F-2A9122AA95F8}" dt="2024-02-16T15:10:24.217" v="1459" actId="478"/>
           <ac:spMkLst>
@@ -1856,6 +1925,14 @@
             <ac:spMk id="12" creationId="{9DBD96AD-1B54-B48A-174D-8682810F84E0}"/>
           </ac:spMkLst>
         </pc:spChg>
+        <pc:spChg chg="add mod ord">
+          <ac:chgData name="Sean O Fithcheallaigh" userId="47659c31-a575-4792-8be3-61268c4ee0d6" providerId="ADAL" clId="{B7574C7C-3686-460F-9B9F-2A9122AA95F8}" dt="2024-03-01T11:24:43.329" v="4581" actId="1076"/>
+          <ac:spMkLst>
+            <pc:docMk/>
+            <pc:sldMk cId="2974212779" sldId="262"/>
+            <ac:spMk id="12" creationId="{C29278B9-BCC0-A549-C5BA-35BE5D83B6B2}"/>
+          </ac:spMkLst>
+        </pc:spChg>
         <pc:spChg chg="add del mod">
           <ac:chgData name="Sean O Fithcheallaigh" userId="47659c31-a575-4792-8be3-61268c4ee0d6" providerId="ADAL" clId="{B7574C7C-3686-460F-9B9F-2A9122AA95F8}" dt="2024-02-17T12:31:02.358" v="2032" actId="478"/>
           <ac:spMkLst>
@@ -1864,6 +1941,22 @@
             <ac:spMk id="13" creationId="{5C025563-8660-1FD1-DCD9-043A3F3BBD94}"/>
           </ac:spMkLst>
         </pc:spChg>
+        <pc:spChg chg="add mod">
+          <ac:chgData name="Sean O Fithcheallaigh" userId="47659c31-a575-4792-8be3-61268c4ee0d6" providerId="ADAL" clId="{B7574C7C-3686-460F-9B9F-2A9122AA95F8}" dt="2024-03-01T11:24:43.329" v="4581" actId="1076"/>
+          <ac:spMkLst>
+            <pc:docMk/>
+            <pc:sldMk cId="2974212779" sldId="262"/>
+            <ac:spMk id="13" creationId="{F5B1AED6-1697-FE06-BE46-2151F6022E70}"/>
+          </ac:spMkLst>
+        </pc:spChg>
+        <pc:spChg chg="add mod ord">
+          <ac:chgData name="Sean O Fithcheallaigh" userId="47659c31-a575-4792-8be3-61268c4ee0d6" providerId="ADAL" clId="{B7574C7C-3686-460F-9B9F-2A9122AA95F8}" dt="2024-03-01T11:23:38.976" v="4576" actId="14100"/>
+          <ac:spMkLst>
+            <pc:docMk/>
+            <pc:sldMk cId="2974212779" sldId="262"/>
+            <ac:spMk id="14" creationId="{C8382BAB-4284-6E30-738A-F76878C873E3}"/>
+          </ac:spMkLst>
+        </pc:spChg>
         <pc:spChg chg="add del mod">
           <ac:chgData name="Sean O Fithcheallaigh" userId="47659c31-a575-4792-8be3-61268c4ee0d6" providerId="ADAL" clId="{B7574C7C-3686-460F-9B9F-2A9122AA95F8}" dt="2024-02-18T16:19:23.567" v="2238" actId="478"/>
           <ac:spMkLst>
@@ -1888,6 +1981,14 @@
             <ac:spMk id="16" creationId="{7FEFDBC4-98A8-7C96-563D-DC6799A0BC52}"/>
           </ac:spMkLst>
         </pc:spChg>
+        <pc:spChg chg="add mod">
+          <ac:chgData name="Sean O Fithcheallaigh" userId="47659c31-a575-4792-8be3-61268c4ee0d6" providerId="ADAL" clId="{B7574C7C-3686-460F-9B9F-2A9122AA95F8}" dt="2024-03-01T11:23:36.480" v="4575" actId="14100"/>
+          <ac:spMkLst>
+            <pc:docMk/>
+            <pc:sldMk cId="2974212779" sldId="262"/>
+            <ac:spMk id="16" creationId="{928A172D-4789-594A-C7C5-F96DE266C30C}"/>
+          </ac:spMkLst>
+        </pc:spChg>
         <pc:spChg chg="add del mod">
           <ac:chgData name="Sean O Fithcheallaigh" userId="47659c31-a575-4792-8be3-61268c4ee0d6" providerId="ADAL" clId="{B7574C7C-3686-460F-9B9F-2A9122AA95F8}" dt="2024-02-17T12:31:06.512" v="2035" actId="478"/>
           <ac:spMkLst>
@@ -1910,6 +2011,46 @@
             <pc:docMk/>
             <pc:sldMk cId="2974212779" sldId="262"/>
             <ac:spMk id="19" creationId="{19D8ABCD-558E-12FD-A869-7CB2DE308229}"/>
+          </ac:spMkLst>
+        </pc:spChg>
+        <pc:spChg chg="add mod">
+          <ac:chgData name="Sean O Fithcheallaigh" userId="47659c31-a575-4792-8be3-61268c4ee0d6" providerId="ADAL" clId="{B7574C7C-3686-460F-9B9F-2A9122AA95F8}" dt="2024-03-01T11:24:53.445" v="4582" actId="1076"/>
+          <ac:spMkLst>
+            <pc:docMk/>
+            <pc:sldMk cId="2974212779" sldId="262"/>
+            <ac:spMk id="19" creationId="{397C546A-01F7-2044-63B8-FE196A756711}"/>
+          </ac:spMkLst>
+        </pc:spChg>
+        <pc:spChg chg="add mod">
+          <ac:chgData name="Sean O Fithcheallaigh" userId="47659c31-a575-4792-8be3-61268c4ee0d6" providerId="ADAL" clId="{B7574C7C-3686-460F-9B9F-2A9122AA95F8}" dt="2024-03-01T11:24:53.445" v="4582" actId="1076"/>
+          <ac:spMkLst>
+            <pc:docMk/>
+            <pc:sldMk cId="2974212779" sldId="262"/>
+            <ac:spMk id="20" creationId="{2DCAFDB7-16A7-76EB-A056-2DE5E29E341C}"/>
+          </ac:spMkLst>
+        </pc:spChg>
+        <pc:spChg chg="add del mod">
+          <ac:chgData name="Sean O Fithcheallaigh" userId="47659c31-a575-4792-8be3-61268c4ee0d6" providerId="ADAL" clId="{B7574C7C-3686-460F-9B9F-2A9122AA95F8}" dt="2024-03-01T10:11:06.229" v="3676" actId="21"/>
+          <ac:spMkLst>
+            <pc:docMk/>
+            <pc:sldMk cId="2974212779" sldId="262"/>
+            <ac:spMk id="21" creationId="{5BD5151D-D594-C1F0-736A-745862DF5828}"/>
+          </ac:spMkLst>
+        </pc:spChg>
+        <pc:spChg chg="add mod">
+          <ac:chgData name="Sean O Fithcheallaigh" userId="47659c31-a575-4792-8be3-61268c4ee0d6" providerId="ADAL" clId="{B7574C7C-3686-460F-9B9F-2A9122AA95F8}" dt="2024-03-01T11:22:56.909" v="4572" actId="1076"/>
+          <ac:spMkLst>
+            <pc:docMk/>
+            <pc:sldMk cId="2974212779" sldId="262"/>
+            <ac:spMk id="22" creationId="{E8689BF9-9934-EE4D-1FA0-894ACC93294A}"/>
+          </ac:spMkLst>
+        </pc:spChg>
+        <pc:spChg chg="add mod">
+          <ac:chgData name="Sean O Fithcheallaigh" userId="47659c31-a575-4792-8be3-61268c4ee0d6" providerId="ADAL" clId="{B7574C7C-3686-460F-9B9F-2A9122AA95F8}" dt="2024-03-01T11:22:56.909" v="4572" actId="1076"/>
+          <ac:spMkLst>
+            <pc:docMk/>
+            <pc:sldMk cId="2974212779" sldId="262"/>
+            <ac:spMk id="23" creationId="{9FA525A7-1036-E8E6-B222-1296D2249763}"/>
           </ac:spMkLst>
         </pc:spChg>
         <pc:graphicFrameChg chg="add del mod ord modGraphic">
@@ -1936,8 +2077,8 @@
             <ac:picMk id="4" creationId="{78E2A836-BB30-4A56-2D0C-090F483D8876}"/>
           </ac:picMkLst>
         </pc:picChg>
-        <pc:picChg chg="add mod">
-          <ac:chgData name="Sean O Fithcheallaigh" userId="47659c31-a575-4792-8be3-61268c4ee0d6" providerId="ADAL" clId="{B7574C7C-3686-460F-9B9F-2A9122AA95F8}" dt="2024-02-29T21:20:52.491" v="2834" actId="1076"/>
+        <pc:picChg chg="add del mod">
+          <ac:chgData name="Sean O Fithcheallaigh" userId="47659c31-a575-4792-8be3-61268c4ee0d6" providerId="ADAL" clId="{B7574C7C-3686-460F-9B9F-2A9122AA95F8}" dt="2024-03-01T09:53:04.837" v="3509" actId="478"/>
           <ac:picMkLst>
             <pc:docMk/>
             <pc:sldMk cId="2974212779" sldId="262"/>
@@ -1966,6 +2107,14 @@
             <pc:docMk/>
             <pc:sldMk cId="2974212779" sldId="262"/>
             <ac:picMk id="11" creationId="{3184CB76-7485-B103-EC60-6AC34C95110F}"/>
+          </ac:picMkLst>
+        </pc:picChg>
+        <pc:picChg chg="add mod ord">
+          <ac:chgData name="Sean O Fithcheallaigh" userId="47659c31-a575-4792-8be3-61268c4ee0d6" providerId="ADAL" clId="{B7574C7C-3686-460F-9B9F-2A9122AA95F8}" dt="2024-03-01T11:22:50.054" v="4571" actId="1076"/>
+          <ac:picMkLst>
+            <pc:docMk/>
+            <pc:sldMk cId="2974212779" sldId="262"/>
+            <ac:picMk id="18" creationId="{B597DDEB-EEF5-95E8-0C12-339672F1D10C}"/>
           </ac:picMkLst>
         </pc:picChg>
       </pc:sldChg>
@@ -2152,7 +2301,7 @@
         </pc:spChg>
       </pc:sldChg>
       <pc:sldChg chg="addSp delSp modSp add mod setBg modClrScheme chgLayout">
-        <pc:chgData name="Sean O Fithcheallaigh" userId="47659c31-a575-4792-8be3-61268c4ee0d6" providerId="ADAL" clId="{B7574C7C-3686-460F-9B9F-2A9122AA95F8}" dt="2024-02-25T21:07:13.962" v="2790"/>
+        <pc:chgData name="Sean O Fithcheallaigh" userId="47659c31-a575-4792-8be3-61268c4ee0d6" providerId="ADAL" clId="{B7574C7C-3686-460F-9B9F-2A9122AA95F8}" dt="2024-03-01T12:12:08.041" v="4791" actId="478"/>
         <pc:sldMkLst>
           <pc:docMk/>
           <pc:sldMk cId="3782082519" sldId="265"/>
@@ -2269,9 +2418,25 @@
             <ac:picMk id="6" creationId="{3392B3E4-AC63-EB8B-96D5-17FDDBE2504E}"/>
           </ac:picMkLst>
         </pc:picChg>
+        <pc:cxnChg chg="add del">
+          <ac:chgData name="Sean O Fithcheallaigh" userId="47659c31-a575-4792-8be3-61268c4ee0d6" providerId="ADAL" clId="{B7574C7C-3686-460F-9B9F-2A9122AA95F8}" dt="2024-03-01T12:12:06.719" v="4790" actId="478"/>
+          <ac:cxnSpMkLst>
+            <pc:docMk/>
+            <pc:sldMk cId="3782082519" sldId="265"/>
+            <ac:cxnSpMk id="7" creationId="{4E555686-663B-88A1-BB54-25F671CC518C}"/>
+          </ac:cxnSpMkLst>
+        </pc:cxnChg>
+        <pc:cxnChg chg="add del mod">
+          <ac:chgData name="Sean O Fithcheallaigh" userId="47659c31-a575-4792-8be3-61268c4ee0d6" providerId="ADAL" clId="{B7574C7C-3686-460F-9B9F-2A9122AA95F8}" dt="2024-03-01T12:12:08.041" v="4791" actId="478"/>
+          <ac:cxnSpMkLst>
+            <pc:docMk/>
+            <pc:sldMk cId="3782082519" sldId="265"/>
+            <ac:cxnSpMk id="8" creationId="{7908367A-3CB8-E6BA-E7C5-E24283B68140}"/>
+          </ac:cxnSpMkLst>
+        </pc:cxnChg>
       </pc:sldChg>
       <pc:sldChg chg="addSp delSp modSp new mod modClrScheme chgLayout">
-        <pc:chgData name="Sean O Fithcheallaigh" userId="47659c31-a575-4792-8be3-61268c4ee0d6" providerId="ADAL" clId="{B7574C7C-3686-460F-9B9F-2A9122AA95F8}" dt="2024-02-18T19:19:17.093" v="2304" actId="20577"/>
+        <pc:chgData name="Sean O Fithcheallaigh" userId="47659c31-a575-4792-8be3-61268c4ee0d6" providerId="ADAL" clId="{B7574C7C-3686-460F-9B9F-2A9122AA95F8}" dt="2024-03-01T13:35:43.920" v="5021" actId="20577"/>
         <pc:sldMkLst>
           <pc:docMk/>
           <pc:sldMk cId="3569103075" sldId="266"/>
@@ -2293,7 +2458,7 @@
           </ac:spMkLst>
         </pc:spChg>
         <pc:spChg chg="add mod ord">
-          <ac:chgData name="Sean O Fithcheallaigh" userId="47659c31-a575-4792-8be3-61268c4ee0d6" providerId="ADAL" clId="{B7574C7C-3686-460F-9B9F-2A9122AA95F8}" dt="2024-02-18T19:19:17.093" v="2304" actId="20577"/>
+          <ac:chgData name="Sean O Fithcheallaigh" userId="47659c31-a575-4792-8be3-61268c4ee0d6" providerId="ADAL" clId="{B7574C7C-3686-460F-9B9F-2A9122AA95F8}" dt="2024-03-01T13:35:43.920" v="5021" actId="20577"/>
           <ac:spMkLst>
             <pc:docMk/>
             <pc:sldMk cId="3569103075" sldId="266"/>
@@ -2309,8 +2474,8 @@
           </ac:spMkLst>
         </pc:spChg>
       </pc:sldChg>
-      <pc:sldChg chg="addSp delSp modSp add mod">
-        <pc:chgData name="Sean O Fithcheallaigh" userId="47659c31-a575-4792-8be3-61268c4ee0d6" providerId="ADAL" clId="{B7574C7C-3686-460F-9B9F-2A9122AA95F8}" dt="2024-02-29T21:20:36.444" v="2832" actId="1076"/>
+      <pc:sldChg chg="addSp delSp modSp add del mod modShow">
+        <pc:chgData name="Sean O Fithcheallaigh" userId="47659c31-a575-4792-8be3-61268c4ee0d6" providerId="ADAL" clId="{B7574C7C-3686-460F-9B9F-2A9122AA95F8}" dt="2024-03-01T11:56:45.333" v="4631" actId="2696"/>
         <pc:sldMkLst>
           <pc:docMk/>
           <pc:sldMk cId="788743055" sldId="267"/>
@@ -2324,6 +2489,14 @@
           </ac:spMkLst>
         </pc:spChg>
         <pc:spChg chg="add mod">
+          <ac:chgData name="Sean O Fithcheallaigh" userId="47659c31-a575-4792-8be3-61268c4ee0d6" providerId="ADAL" clId="{B7574C7C-3686-460F-9B9F-2A9122AA95F8}" dt="2024-03-01T10:11:20.204" v="3680" actId="14100"/>
+          <ac:spMkLst>
+            <pc:docMk/>
+            <pc:sldMk cId="788743055" sldId="267"/>
+            <ac:spMk id="2" creationId="{BD34AF3A-C8F3-E7A7-4AE2-EBEB9D3FC005}"/>
+          </ac:spMkLst>
+        </pc:spChg>
+        <pc:spChg chg="add mod">
           <ac:chgData name="Sean O Fithcheallaigh" userId="47659c31-a575-4792-8be3-61268c4ee0d6" providerId="ADAL" clId="{B7574C7C-3686-460F-9B9F-2A9122AA95F8}" dt="2024-02-25T20:56:38.479" v="2633" actId="27636"/>
           <ac:spMkLst>
             <pc:docMk/>
@@ -2361,6 +2534,14 @@
             <pc:docMk/>
             <pc:sldMk cId="788743055" sldId="267"/>
             <ac:spMk id="15" creationId="{67D2BD6C-5B3A-C5A0-94AC-D0ECC15EEFBC}"/>
+          </ac:spMkLst>
+        </pc:spChg>
+        <pc:spChg chg="add mod">
+          <ac:chgData name="Sean O Fithcheallaigh" userId="47659c31-a575-4792-8be3-61268c4ee0d6" providerId="ADAL" clId="{B7574C7C-3686-460F-9B9F-2A9122AA95F8}" dt="2024-03-01T10:13:27.536" v="3815" actId="20577"/>
+          <ac:spMkLst>
+            <pc:docMk/>
+            <pc:sldMk cId="788743055" sldId="267"/>
+            <ac:spMk id="21" creationId="{5BD5151D-D594-C1F0-736A-745862DF5828}"/>
           </ac:spMkLst>
         </pc:spChg>
         <pc:picChg chg="add del mod">
@@ -2388,7 +2569,7 @@
           </ac:picMkLst>
         </pc:picChg>
         <pc:picChg chg="add mod">
-          <ac:chgData name="Sean O Fithcheallaigh" userId="47659c31-a575-4792-8be3-61268c4ee0d6" providerId="ADAL" clId="{B7574C7C-3686-460F-9B9F-2A9122AA95F8}" dt="2024-02-29T21:20:36.444" v="2832" actId="1076"/>
+          <ac:chgData name="Sean O Fithcheallaigh" userId="47659c31-a575-4792-8be3-61268c4ee0d6" providerId="ADAL" clId="{B7574C7C-3686-460F-9B9F-2A9122AA95F8}" dt="2024-03-01T09:20:57.859" v="3332" actId="1076"/>
           <ac:picMkLst>
             <pc:docMk/>
             <pc:sldMk cId="788743055" sldId="267"/>
@@ -2491,8 +2672,8 @@
           </ac:picMkLst>
         </pc:picChg>
       </pc:sldChg>
-      <pc:sldChg chg="modSp new mod">
-        <pc:chgData name="Sean O Fithcheallaigh" userId="47659c31-a575-4792-8be3-61268c4ee0d6" providerId="ADAL" clId="{B7574C7C-3686-460F-9B9F-2A9122AA95F8}" dt="2024-02-19T17:20:50.929" v="2373" actId="20577"/>
+      <pc:sldChg chg="modSp new del mod">
+        <pc:chgData name="Sean O Fithcheallaigh" userId="47659c31-a575-4792-8be3-61268c4ee0d6" providerId="ADAL" clId="{B7574C7C-3686-460F-9B9F-2A9122AA95F8}" dt="2024-03-01T11:48:14.863" v="4604" actId="47"/>
         <pc:sldMkLst>
           <pc:docMk/>
           <pc:sldMk cId="2550028783" sldId="269"/>
@@ -2507,13 +2688,13 @@
         </pc:spChg>
       </pc:sldChg>
       <pc:sldChg chg="addSp delSp modSp add mod ord">
-        <pc:chgData name="Sean O Fithcheallaigh" userId="47659c31-a575-4792-8be3-61268c4ee0d6" providerId="ADAL" clId="{B7574C7C-3686-460F-9B9F-2A9122AA95F8}" dt="2024-02-29T21:38:50.868" v="2984"/>
+        <pc:chgData name="Sean O Fithcheallaigh" userId="47659c31-a575-4792-8be3-61268c4ee0d6" providerId="ADAL" clId="{B7574C7C-3686-460F-9B9F-2A9122AA95F8}" dt="2024-03-01T13:02:20.733" v="4996" actId="27636"/>
         <pc:sldMkLst>
           <pc:docMk/>
           <pc:sldMk cId="1050643754" sldId="270"/>
         </pc:sldMkLst>
         <pc:spChg chg="mod">
-          <ac:chgData name="Sean O Fithcheallaigh" userId="47659c31-a575-4792-8be3-61268c4ee0d6" providerId="ADAL" clId="{B7574C7C-3686-460F-9B9F-2A9122AA95F8}" dt="2024-02-29T21:38:22.016" v="2961" actId="27636"/>
+          <ac:chgData name="Sean O Fithcheallaigh" userId="47659c31-a575-4792-8be3-61268c4ee0d6" providerId="ADAL" clId="{B7574C7C-3686-460F-9B9F-2A9122AA95F8}" dt="2024-03-01T13:02:20.733" v="4996" actId="27636"/>
           <ac:spMkLst>
             <pc:docMk/>
             <pc:sldMk cId="1050643754" sldId="270"/>
@@ -2521,13 +2702,29 @@
           </ac:spMkLst>
         </pc:spChg>
         <pc:spChg chg="mod">
-          <ac:chgData name="Sean O Fithcheallaigh" userId="47659c31-a575-4792-8be3-61268c4ee0d6" providerId="ADAL" clId="{B7574C7C-3686-460F-9B9F-2A9122AA95F8}" dt="2024-02-29T21:38:30.596" v="2979" actId="20577"/>
+          <ac:chgData name="Sean O Fithcheallaigh" userId="47659c31-a575-4792-8be3-61268c4ee0d6" providerId="ADAL" clId="{B7574C7C-3686-460F-9B9F-2A9122AA95F8}" dt="2024-03-01T10:58:36.232" v="4547" actId="1076"/>
           <ac:spMkLst>
             <pc:docMk/>
             <pc:sldMk cId="1050643754" sldId="270"/>
             <ac:spMk id="8" creationId="{6C0F12F4-24FC-492A-8834-CEBD26CB31E4}"/>
           </ac:spMkLst>
         </pc:spChg>
+        <pc:spChg chg="mod">
+          <ac:chgData name="Sean O Fithcheallaigh" userId="47659c31-a575-4792-8be3-61268c4ee0d6" providerId="ADAL" clId="{B7574C7C-3686-460F-9B9F-2A9122AA95F8}" dt="2024-03-01T10:58:42.354" v="4549" actId="1076"/>
+          <ac:spMkLst>
+            <pc:docMk/>
+            <pc:sldMk cId="1050643754" sldId="270"/>
+            <ac:spMk id="15" creationId="{A8E7C9D0-73CD-6E5F-4ED1-688BDA99F0C9}"/>
+          </ac:spMkLst>
+        </pc:spChg>
+        <pc:picChg chg="add del mod">
+          <ac:chgData name="Sean O Fithcheallaigh" userId="47659c31-a575-4792-8be3-61268c4ee0d6" providerId="ADAL" clId="{B7574C7C-3686-460F-9B9F-2A9122AA95F8}" dt="2024-03-01T11:47:38.207" v="4594" actId="478"/>
+          <ac:picMkLst>
+            <pc:docMk/>
+            <pc:sldMk cId="1050643754" sldId="270"/>
+            <ac:picMk id="4" creationId="{AF60555F-1F68-7CA3-55A9-7BBE9503217D}"/>
+          </ac:picMkLst>
+        </pc:picChg>
         <pc:picChg chg="add del mod">
           <ac:chgData name="Sean O Fithcheallaigh" userId="47659c31-a575-4792-8be3-61268c4ee0d6" providerId="ADAL" clId="{B7574C7C-3686-460F-9B9F-2A9122AA95F8}" dt="2024-02-29T21:38:17.657" v="2957" actId="478"/>
           <ac:picMkLst>
@@ -2545,7 +2742,15 @@
           </ac:picMkLst>
         </pc:picChg>
         <pc:picChg chg="add mod">
-          <ac:chgData name="Sean O Fithcheallaigh" userId="47659c31-a575-4792-8be3-61268c4ee0d6" providerId="ADAL" clId="{B7574C7C-3686-460F-9B9F-2A9122AA95F8}" dt="2024-02-29T21:38:39.257" v="2982" actId="962"/>
+          <ac:chgData name="Sean O Fithcheallaigh" userId="47659c31-a575-4792-8be3-61268c4ee0d6" providerId="ADAL" clId="{B7574C7C-3686-460F-9B9F-2A9122AA95F8}" dt="2024-03-01T11:56:30.065" v="4630" actId="1076"/>
+          <ac:picMkLst>
+            <pc:docMk/>
+            <pc:sldMk cId="1050643754" sldId="270"/>
+            <ac:picMk id="6" creationId="{F9F984DD-124A-3185-0D2B-083A23F13092}"/>
+          </ac:picMkLst>
+        </pc:picChg>
+        <pc:picChg chg="add del mod">
+          <ac:chgData name="Sean O Fithcheallaigh" userId="47659c31-a575-4792-8be3-61268c4ee0d6" providerId="ADAL" clId="{B7574C7C-3686-460F-9B9F-2A9122AA95F8}" dt="2024-03-01T11:19:12.517" v="4550" actId="478"/>
           <ac:picMkLst>
             <pc:docMk/>
             <pc:sldMk cId="1050643754" sldId="270"/>
@@ -2609,13 +2814,125 @@
         </pc:spChg>
       </pc:sldChg>
       <pc:sldChg chg="addSp delSp modSp add mod">
-        <pc:chgData name="Sean O Fithcheallaigh" userId="47659c31-a575-4792-8be3-61268c4ee0d6" providerId="ADAL" clId="{B7574C7C-3686-460F-9B9F-2A9122AA95F8}" dt="2024-02-29T21:37:58.704" v="2956" actId="478"/>
+        <pc:chgData name="Sean O Fithcheallaigh" userId="47659c31-a575-4792-8be3-61268c4ee0d6" providerId="ADAL" clId="{B7574C7C-3686-460F-9B9F-2A9122AA95F8}" dt="2024-03-01T13:05:33.112" v="5001" actId="1076"/>
         <pc:sldMkLst>
           <pc:docMk/>
           <pc:sldMk cId="1816625563" sldId="271"/>
         </pc:sldMkLst>
-        <pc:picChg chg="mod">
-          <ac:chgData name="Sean O Fithcheallaigh" userId="47659c31-a575-4792-8be3-61268c4ee0d6" providerId="ADAL" clId="{B7574C7C-3686-460F-9B9F-2A9122AA95F8}" dt="2024-02-29T21:36:45.972" v="2951" actId="1076"/>
+        <pc:spChg chg="add mod">
+          <ac:chgData name="Sean O Fithcheallaigh" userId="47659c31-a575-4792-8be3-61268c4ee0d6" providerId="ADAL" clId="{B7574C7C-3686-460F-9B9F-2A9122AA95F8}" dt="2024-03-01T12:24:10.733" v="4980" actId="1076"/>
+          <ac:spMkLst>
+            <pc:docMk/>
+            <pc:sldMk cId="1816625563" sldId="271"/>
+            <ac:spMk id="2" creationId="{B9847C69-25BA-99FD-FCC1-4BFDD2148656}"/>
+          </ac:spMkLst>
+        </pc:spChg>
+        <pc:spChg chg="mod">
+          <ac:chgData name="Sean O Fithcheallaigh" userId="47659c31-a575-4792-8be3-61268c4ee0d6" providerId="ADAL" clId="{B7574C7C-3686-460F-9B9F-2A9122AA95F8}" dt="2024-03-01T13:02:14.656" v="4992" actId="27636"/>
+          <ac:spMkLst>
+            <pc:docMk/>
+            <pc:sldMk cId="1816625563" sldId="271"/>
+            <ac:spMk id="3" creationId="{2D54498E-2E1C-278F-44CE-3BFE5BB6C639}"/>
+          </ac:spMkLst>
+        </pc:spChg>
+        <pc:spChg chg="add mod">
+          <ac:chgData name="Sean O Fithcheallaigh" userId="47659c31-a575-4792-8be3-61268c4ee0d6" providerId="ADAL" clId="{B7574C7C-3686-460F-9B9F-2A9122AA95F8}" dt="2024-03-01T12:24:10.733" v="4980" actId="1076"/>
+          <ac:spMkLst>
+            <pc:docMk/>
+            <pc:sldMk cId="1816625563" sldId="271"/>
+            <ac:spMk id="5" creationId="{6E1994ED-ACC1-453C-1A15-90BADF438356}"/>
+          </ac:spMkLst>
+        </pc:spChg>
+        <pc:spChg chg="add del mod">
+          <ac:chgData name="Sean O Fithcheallaigh" userId="47659c31-a575-4792-8be3-61268c4ee0d6" providerId="ADAL" clId="{B7574C7C-3686-460F-9B9F-2A9122AA95F8}" dt="2024-03-01T10:23:01.860" v="4047" actId="478"/>
+          <ac:spMkLst>
+            <pc:docMk/>
+            <pc:sldMk cId="1816625563" sldId="271"/>
+            <ac:spMk id="6" creationId="{7C76B56D-98DC-21BD-0847-50F80FF8D29B}"/>
+          </ac:spMkLst>
+        </pc:spChg>
+        <pc:spChg chg="add mod">
+          <ac:chgData name="Sean O Fithcheallaigh" userId="47659c31-a575-4792-8be3-61268c4ee0d6" providerId="ADAL" clId="{B7574C7C-3686-460F-9B9F-2A9122AA95F8}" dt="2024-03-01T13:05:33.112" v="5001" actId="1076"/>
+          <ac:spMkLst>
+            <pc:docMk/>
+            <pc:sldMk cId="1816625563" sldId="271"/>
+            <ac:spMk id="7" creationId="{039AACAB-F6C4-B140-A2D7-9F1C1AE826D6}"/>
+          </ac:spMkLst>
+        </pc:spChg>
+        <pc:spChg chg="mod">
+          <ac:chgData name="Sean O Fithcheallaigh" userId="47659c31-a575-4792-8be3-61268c4ee0d6" providerId="ADAL" clId="{B7574C7C-3686-460F-9B9F-2A9122AA95F8}" dt="2024-03-01T11:52:40.755" v="4629" actId="113"/>
+          <ac:spMkLst>
+            <pc:docMk/>
+            <pc:sldMk cId="1816625563" sldId="271"/>
+            <ac:spMk id="8" creationId="{75270068-906F-74E3-DED9-9B74726E881F}"/>
+          </ac:spMkLst>
+        </pc:spChg>
+        <pc:spChg chg="add mod">
+          <ac:chgData name="Sean O Fithcheallaigh" userId="47659c31-a575-4792-8be3-61268c4ee0d6" providerId="ADAL" clId="{B7574C7C-3686-460F-9B9F-2A9122AA95F8}" dt="2024-03-01T13:05:33.112" v="5001" actId="1076"/>
+          <ac:spMkLst>
+            <pc:docMk/>
+            <pc:sldMk cId="1816625563" sldId="271"/>
+            <ac:spMk id="9" creationId="{2AA988B1-CDDF-5E2E-AD41-60F6E6F1B80F}"/>
+          </ac:spMkLst>
+        </pc:spChg>
+        <pc:spChg chg="add mod">
+          <ac:chgData name="Sean O Fithcheallaigh" userId="47659c31-a575-4792-8be3-61268c4ee0d6" providerId="ADAL" clId="{B7574C7C-3686-460F-9B9F-2A9122AA95F8}" dt="2024-03-01T13:05:21.759" v="4999" actId="1076"/>
+          <ac:spMkLst>
+            <pc:docMk/>
+            <pc:sldMk cId="1816625563" sldId="271"/>
+            <ac:spMk id="10" creationId="{33F4C7AC-8235-3542-1B93-B5263AE0BD4B}"/>
+          </ac:spMkLst>
+        </pc:spChg>
+        <pc:spChg chg="add mod">
+          <ac:chgData name="Sean O Fithcheallaigh" userId="47659c31-a575-4792-8be3-61268c4ee0d6" providerId="ADAL" clId="{B7574C7C-3686-460F-9B9F-2A9122AA95F8}" dt="2024-03-01T13:05:25.768" v="5000" actId="1076"/>
+          <ac:spMkLst>
+            <pc:docMk/>
+            <pc:sldMk cId="1816625563" sldId="271"/>
+            <ac:spMk id="11" creationId="{125072F5-A7EF-09C3-F2CF-8A98038B404C}"/>
+          </ac:spMkLst>
+        </pc:spChg>
+        <pc:spChg chg="add mod">
+          <ac:chgData name="Sean O Fithcheallaigh" userId="47659c31-a575-4792-8be3-61268c4ee0d6" providerId="ADAL" clId="{B7574C7C-3686-460F-9B9F-2A9122AA95F8}" dt="2024-03-01T11:42:02.137" v="4587" actId="1076"/>
+          <ac:spMkLst>
+            <pc:docMk/>
+            <pc:sldMk cId="1816625563" sldId="271"/>
+            <ac:spMk id="12" creationId="{2BEBB406-4EE1-7F49-CB20-FCFCE9109217}"/>
+          </ac:spMkLst>
+        </pc:spChg>
+        <pc:spChg chg="add mod">
+          <ac:chgData name="Sean O Fithcheallaigh" userId="47659c31-a575-4792-8be3-61268c4ee0d6" providerId="ADAL" clId="{B7574C7C-3686-460F-9B9F-2A9122AA95F8}" dt="2024-03-01T11:42:02.137" v="4587" actId="1076"/>
+          <ac:spMkLst>
+            <pc:docMk/>
+            <pc:sldMk cId="1816625563" sldId="271"/>
+            <ac:spMk id="13" creationId="{80FEACFC-4BB9-106A-CC00-790D011DCE97}"/>
+          </ac:spMkLst>
+        </pc:spChg>
+        <pc:spChg chg="add mod">
+          <ac:chgData name="Sean O Fithcheallaigh" userId="47659c31-a575-4792-8be3-61268c4ee0d6" providerId="ADAL" clId="{B7574C7C-3686-460F-9B9F-2A9122AA95F8}" dt="2024-03-01T12:24:10.733" v="4980" actId="1076"/>
+          <ac:spMkLst>
+            <pc:docMk/>
+            <pc:sldMk cId="1816625563" sldId="271"/>
+            <ac:spMk id="14" creationId="{116A4A6C-0422-0C8E-572D-AFCC1761F459}"/>
+          </ac:spMkLst>
+        </pc:spChg>
+        <pc:spChg chg="mod">
+          <ac:chgData name="Sean O Fithcheallaigh" userId="47659c31-a575-4792-8be3-61268c4ee0d6" providerId="ADAL" clId="{B7574C7C-3686-460F-9B9F-2A9122AA95F8}" dt="2024-03-01T10:56:45.479" v="4419" actId="1076"/>
+          <ac:spMkLst>
+            <pc:docMk/>
+            <pc:sldMk cId="1816625563" sldId="271"/>
+            <ac:spMk id="15" creationId="{A4606749-4EEB-B3B0-5952-FBE065DCB761}"/>
+          </ac:spMkLst>
+        </pc:spChg>
+        <pc:spChg chg="add mod">
+          <ac:chgData name="Sean O Fithcheallaigh" userId="47659c31-a575-4792-8be3-61268c4ee0d6" providerId="ADAL" clId="{B7574C7C-3686-460F-9B9F-2A9122AA95F8}" dt="2024-03-01T12:24:10.733" v="4980" actId="1076"/>
+          <ac:spMkLst>
+            <pc:docMk/>
+            <pc:sldMk cId="1816625563" sldId="271"/>
+            <ac:spMk id="16" creationId="{3C7DAFD1-7AEB-441A-B531-99FF572A3B97}"/>
+          </ac:spMkLst>
+        </pc:spChg>
+        <pc:picChg chg="del mod">
+          <ac:chgData name="Sean O Fithcheallaigh" userId="47659c31-a575-4792-8be3-61268c4ee0d6" providerId="ADAL" clId="{B7574C7C-3686-460F-9B9F-2A9122AA95F8}" dt="2024-03-01T13:01:40.085" v="4981" actId="478"/>
           <ac:picMkLst>
             <pc:docMk/>
             <pc:sldMk cId="1816625563" sldId="271"/>
@@ -2630,6 +2947,191 @@
             <ac:picMk id="5" creationId="{6D35CE97-1085-FE36-C16D-0560DE2CF67B}"/>
           </ac:picMkLst>
         </pc:picChg>
+        <pc:picChg chg="add mod">
+          <ac:chgData name="Sean O Fithcheallaigh" userId="47659c31-a575-4792-8be3-61268c4ee0d6" providerId="ADAL" clId="{B7574C7C-3686-460F-9B9F-2A9122AA95F8}" dt="2024-03-01T13:02:06.015" v="4988" actId="1076"/>
+          <ac:picMkLst>
+            <pc:docMk/>
+            <pc:sldMk cId="1816625563" sldId="271"/>
+            <ac:picMk id="20" creationId="{2739967D-8659-6E7B-E8F0-B9F05B82D844}"/>
+          </ac:picMkLst>
+        </pc:picChg>
+      </pc:sldChg>
+      <pc:sldChg chg="addSp delSp modSp new del mod">
+        <pc:chgData name="Sean O Fithcheallaigh" userId="47659c31-a575-4792-8be3-61268c4ee0d6" providerId="ADAL" clId="{B7574C7C-3686-460F-9B9F-2A9122AA95F8}" dt="2024-03-01T10:46:14.268" v="4412" actId="2696"/>
+        <pc:sldMkLst>
+          <pc:docMk/>
+          <pc:sldMk cId="1026439507" sldId="272"/>
+        </pc:sldMkLst>
+        <pc:spChg chg="mod">
+          <ac:chgData name="Sean O Fithcheallaigh" userId="47659c31-a575-4792-8be3-61268c4ee0d6" providerId="ADAL" clId="{B7574C7C-3686-460F-9B9F-2A9122AA95F8}" dt="2024-03-01T10:45:30.466" v="4401" actId="20577"/>
+          <ac:spMkLst>
+            <pc:docMk/>
+            <pc:sldMk cId="1026439507" sldId="272"/>
+            <ac:spMk id="2" creationId="{3718594A-E618-1E34-88BE-5D110F0121DA}"/>
+          </ac:spMkLst>
+        </pc:spChg>
+        <pc:spChg chg="del">
+          <ac:chgData name="Sean O Fithcheallaigh" userId="47659c31-a575-4792-8be3-61268c4ee0d6" providerId="ADAL" clId="{B7574C7C-3686-460F-9B9F-2A9122AA95F8}" dt="2024-03-01T10:45:44.719" v="4402" actId="3680"/>
+          <ac:spMkLst>
+            <pc:docMk/>
+            <pc:sldMk cId="1026439507" sldId="272"/>
+            <ac:spMk id="3" creationId="{EEFF6C59-0EEA-9083-3EFD-A9DAE4CFE54C}"/>
+          </ac:spMkLst>
+        </pc:spChg>
+        <pc:spChg chg="add del mod">
+          <ac:chgData name="Sean O Fithcheallaigh" userId="47659c31-a575-4792-8be3-61268c4ee0d6" providerId="ADAL" clId="{B7574C7C-3686-460F-9B9F-2A9122AA95F8}" dt="2024-03-01T10:45:54.790" v="4404" actId="3680"/>
+          <ac:spMkLst>
+            <pc:docMk/>
+            <pc:sldMk cId="1026439507" sldId="272"/>
+            <ac:spMk id="6" creationId="{689A3422-175E-248D-3980-A1CC9CAB8577}"/>
+          </ac:spMkLst>
+        </pc:spChg>
+        <pc:graphicFrameChg chg="add del mod ord modGraphic">
+          <ac:chgData name="Sean O Fithcheallaigh" userId="47659c31-a575-4792-8be3-61268c4ee0d6" providerId="ADAL" clId="{B7574C7C-3686-460F-9B9F-2A9122AA95F8}" dt="2024-03-01T10:45:48.646" v="4403" actId="478"/>
+          <ac:graphicFrameMkLst>
+            <pc:docMk/>
+            <pc:sldMk cId="1026439507" sldId="272"/>
+            <ac:graphicFrameMk id="4" creationId="{B5BC0B6A-0926-B9D2-E165-6614C4FEECE6}"/>
+          </ac:graphicFrameMkLst>
+        </pc:graphicFrameChg>
+        <pc:graphicFrameChg chg="add mod ord modGraphic">
+          <ac:chgData name="Sean O Fithcheallaigh" userId="47659c31-a575-4792-8be3-61268c4ee0d6" providerId="ADAL" clId="{B7574C7C-3686-460F-9B9F-2A9122AA95F8}" dt="2024-03-01T10:46:00.237" v="4411" actId="20577"/>
+          <ac:graphicFrameMkLst>
+            <pc:docMk/>
+            <pc:sldMk cId="1026439507" sldId="272"/>
+            <ac:graphicFrameMk id="7" creationId="{488429F6-FC39-2FCE-4DAA-C06E4E9085EF}"/>
+          </ac:graphicFrameMkLst>
+        </pc:graphicFrameChg>
+      </pc:sldChg>
+      <pc:sldChg chg="modSp add mod ord">
+        <pc:chgData name="Sean O Fithcheallaigh" userId="47659c31-a575-4792-8be3-61268c4ee0d6" providerId="ADAL" clId="{B7574C7C-3686-460F-9B9F-2A9122AA95F8}" dt="2024-03-01T12:01:17.192" v="4758" actId="20577"/>
+        <pc:sldMkLst>
+          <pc:docMk/>
+          <pc:sldMk cId="2456818696" sldId="272"/>
+        </pc:sldMkLst>
+        <pc:spChg chg="mod">
+          <ac:chgData name="Sean O Fithcheallaigh" userId="47659c31-a575-4792-8be3-61268c4ee0d6" providerId="ADAL" clId="{B7574C7C-3686-460F-9B9F-2A9122AA95F8}" dt="2024-03-01T12:01:17.192" v="4758" actId="20577"/>
+          <ac:spMkLst>
+            <pc:docMk/>
+            <pc:sldMk cId="2456818696" sldId="272"/>
+            <ac:spMk id="4" creationId="{7BA22027-27B1-D9EB-8EFB-ADC3ECCC5B0A}"/>
+          </ac:spMkLst>
+        </pc:spChg>
+      </pc:sldChg>
+      <pc:sldChg chg="addSp delSp modSp add del mod">
+        <pc:chgData name="Sean O Fithcheallaigh" userId="47659c31-a575-4792-8be3-61268c4ee0d6" providerId="ADAL" clId="{B7574C7C-3686-460F-9B9F-2A9122AA95F8}" dt="2024-03-01T12:11:22.862" v="4776" actId="47"/>
+        <pc:sldMkLst>
+          <pc:docMk/>
+          <pc:sldMk cId="2099883357" sldId="273"/>
+        </pc:sldMkLst>
+        <pc:picChg chg="del">
+          <ac:chgData name="Sean O Fithcheallaigh" userId="47659c31-a575-4792-8be3-61268c4ee0d6" providerId="ADAL" clId="{B7574C7C-3686-460F-9B9F-2A9122AA95F8}" dt="2024-03-01T12:09:44.648" v="4760" actId="478"/>
+          <ac:picMkLst>
+            <pc:docMk/>
+            <pc:sldMk cId="2099883357" sldId="273"/>
+            <ac:picMk id="6" creationId="{5D312293-E0B2-728C-1765-1ED3ABEB6D51}"/>
+          </ac:picMkLst>
+        </pc:picChg>
+        <pc:picChg chg="add mod">
+          <ac:chgData name="Sean O Fithcheallaigh" userId="47659c31-a575-4792-8be3-61268c4ee0d6" providerId="ADAL" clId="{B7574C7C-3686-460F-9B9F-2A9122AA95F8}" dt="2024-03-01T12:10:49.849" v="4771" actId="1076"/>
+          <ac:picMkLst>
+            <pc:docMk/>
+            <pc:sldMk cId="2099883357" sldId="273"/>
+            <ac:picMk id="7" creationId="{6B16B959-E4A3-849F-7F70-B7166F7CB672}"/>
+          </ac:picMkLst>
+        </pc:picChg>
+      </pc:sldChg>
+      <pc:sldChg chg="addSp delSp modSp add mod">
+        <pc:chgData name="Sean O Fithcheallaigh" userId="47659c31-a575-4792-8be3-61268c4ee0d6" providerId="ADAL" clId="{B7574C7C-3686-460F-9B9F-2A9122AA95F8}" dt="2024-03-01T12:15:36.448" v="4948" actId="14100"/>
+        <pc:sldMkLst>
+          <pc:docMk/>
+          <pc:sldMk cId="3914633024" sldId="273"/>
+        </pc:sldMkLst>
+        <pc:picChg chg="del">
+          <ac:chgData name="Sean O Fithcheallaigh" userId="47659c31-a575-4792-8be3-61268c4ee0d6" providerId="ADAL" clId="{B7574C7C-3686-460F-9B9F-2A9122AA95F8}" dt="2024-03-01T12:11:28.535" v="4778" actId="478"/>
+          <ac:picMkLst>
+            <pc:docMk/>
+            <pc:sldMk cId="3914633024" sldId="273"/>
+            <ac:picMk id="6" creationId="{835B86B4-23D6-A9D9-457A-18029F9DB9E4}"/>
+          </ac:picMkLst>
+        </pc:picChg>
+        <pc:picChg chg="add del mod">
+          <ac:chgData name="Sean O Fithcheallaigh" userId="47659c31-a575-4792-8be3-61268c4ee0d6" providerId="ADAL" clId="{B7574C7C-3686-460F-9B9F-2A9122AA95F8}" dt="2024-03-01T12:14:59.107" v="4945" actId="478"/>
+          <ac:picMkLst>
+            <pc:docMk/>
+            <pc:sldMk cId="3914633024" sldId="273"/>
+            <ac:picMk id="9" creationId="{58F00289-DF2D-4AE4-63F3-8C31DAFACEE8}"/>
+          </ac:picMkLst>
+        </pc:picChg>
+        <pc:picChg chg="add mod">
+          <ac:chgData name="Sean O Fithcheallaigh" userId="47659c31-a575-4792-8be3-61268c4ee0d6" providerId="ADAL" clId="{B7574C7C-3686-460F-9B9F-2A9122AA95F8}" dt="2024-03-01T12:15:36.448" v="4948" actId="14100"/>
+          <ac:picMkLst>
+            <pc:docMk/>
+            <pc:sldMk cId="3914633024" sldId="273"/>
+            <ac:picMk id="11" creationId="{3561B25C-7FAB-0B23-A884-D09827853F02}"/>
+          </ac:picMkLst>
+        </pc:picChg>
+        <pc:cxnChg chg="del">
+          <ac:chgData name="Sean O Fithcheallaigh" userId="47659c31-a575-4792-8be3-61268c4ee0d6" providerId="ADAL" clId="{B7574C7C-3686-460F-9B9F-2A9122AA95F8}" dt="2024-03-01T12:12:24.309" v="4795" actId="478"/>
+          <ac:cxnSpMkLst>
+            <pc:docMk/>
+            <pc:sldMk cId="3914633024" sldId="273"/>
+            <ac:cxnSpMk id="7" creationId="{24B8AC16-1488-3FB6-8B67-8B72F784E874}"/>
+          </ac:cxnSpMkLst>
+        </pc:cxnChg>
+        <pc:cxnChg chg="del">
+          <ac:chgData name="Sean O Fithcheallaigh" userId="47659c31-a575-4792-8be3-61268c4ee0d6" providerId="ADAL" clId="{B7574C7C-3686-460F-9B9F-2A9122AA95F8}" dt="2024-03-01T12:12:11.935" v="4792" actId="478"/>
+          <ac:cxnSpMkLst>
+            <pc:docMk/>
+            <pc:sldMk cId="3914633024" sldId="273"/>
+            <ac:cxnSpMk id="8" creationId="{353F2097-FDB3-0AE4-EC65-8E622B4DA206}"/>
+          </ac:cxnSpMkLst>
+        </pc:cxnChg>
+      </pc:sldChg>
+      <pc:sldChg chg="modSp add mod ord">
+        <pc:chgData name="Sean O Fithcheallaigh" userId="47659c31-a575-4792-8be3-61268c4ee0d6" providerId="ADAL" clId="{B7574C7C-3686-460F-9B9F-2A9122AA95F8}" dt="2024-03-01T12:17:26.597" v="4977" actId="20577"/>
+        <pc:sldMkLst>
+          <pc:docMk/>
+          <pc:sldMk cId="514336153" sldId="274"/>
+        </pc:sldMkLst>
+        <pc:spChg chg="mod">
+          <ac:chgData name="Sean O Fithcheallaigh" userId="47659c31-a575-4792-8be3-61268c4ee0d6" providerId="ADAL" clId="{B7574C7C-3686-460F-9B9F-2A9122AA95F8}" dt="2024-03-01T12:17:26.597" v="4977" actId="20577"/>
+          <ac:spMkLst>
+            <pc:docMk/>
+            <pc:sldMk cId="514336153" sldId="274"/>
+            <ac:spMk id="4" creationId="{8556B55C-8D4A-A20E-7877-C41CBC01F12E}"/>
+          </ac:spMkLst>
+        </pc:spChg>
+      </pc:sldChg>
+      <pc:sldChg chg="new del">
+        <pc:chgData name="Sean O Fithcheallaigh" userId="47659c31-a575-4792-8be3-61268c4ee0d6" providerId="ADAL" clId="{B7574C7C-3686-460F-9B9F-2A9122AA95F8}" dt="2024-03-01T12:20:12.161" v="4979" actId="47"/>
+        <pc:sldMkLst>
+          <pc:docMk/>
+          <pc:sldMk cId="844995378" sldId="275"/>
+        </pc:sldMkLst>
+      </pc:sldChg>
+      <pc:sldChg chg="modSp new mod">
+        <pc:chgData name="Sean O Fithcheallaigh" userId="47659c31-a575-4792-8be3-61268c4ee0d6" providerId="ADAL" clId="{B7574C7C-3686-460F-9B9F-2A9122AA95F8}" dt="2024-03-01T13:45:38.718" v="5655" actId="20577"/>
+        <pc:sldMkLst>
+          <pc:docMk/>
+          <pc:sldMk cId="3459907314" sldId="275"/>
+        </pc:sldMkLst>
+        <pc:spChg chg="mod">
+          <ac:chgData name="Sean O Fithcheallaigh" userId="47659c31-a575-4792-8be3-61268c4ee0d6" providerId="ADAL" clId="{B7574C7C-3686-460F-9B9F-2A9122AA95F8}" dt="2024-03-01T13:38:30.860" v="5082" actId="27636"/>
+          <ac:spMkLst>
+            <pc:docMk/>
+            <pc:sldMk cId="3459907314" sldId="275"/>
+            <ac:spMk id="2" creationId="{A6DC92E0-C040-20C4-FBEE-76F4DB5A724E}"/>
+          </ac:spMkLst>
+        </pc:spChg>
+        <pc:spChg chg="mod">
+          <ac:chgData name="Sean O Fithcheallaigh" userId="47659c31-a575-4792-8be3-61268c4ee0d6" providerId="ADAL" clId="{B7574C7C-3686-460F-9B9F-2A9122AA95F8}" dt="2024-03-01T13:45:38.718" v="5655" actId="20577"/>
+          <ac:spMkLst>
+            <pc:docMk/>
+            <pc:sldMk cId="3459907314" sldId="275"/>
+            <ac:spMk id="3" creationId="{B566B4D7-CD65-FAB6-32EC-53E83623013D}"/>
+          </ac:spMkLst>
+        </pc:spChg>
       </pc:sldChg>
       <pc:sldMasterChg chg="modSp mod setBg modSldLayout">
         <pc:chgData name="Sean O Fithcheallaigh" userId="47659c31-a575-4792-8be3-61268c4ee0d6" providerId="ADAL" clId="{B7574C7C-3686-460F-9B9F-2A9122AA95F8}" dt="2024-02-25T21:07:13.962" v="2790"/>
@@ -2882,6 +3384,356 @@
 </pc:chgInfo>
 </file>
 
+<file path=ppt/notesMasters/notesMaster1.xml><?xml version="1.0" encoding="utf-8"?>
+<p:notesMaster xmlns:a="http://schemas.openxmlformats.org/drawingml/2006/main" xmlns:r="http://schemas.openxmlformats.org/officeDocument/2006/relationships" xmlns:p="http://schemas.openxmlformats.org/presentationml/2006/main">
+  <p:cSld>
+    <p:bg>
+      <p:bgRef idx="1001">
+        <a:schemeClr val="bg1"/>
+      </p:bgRef>
+    </p:bg>
+    <p:spTree>
+      <p:nvGrpSpPr>
+        <p:cNvPr id="1" name=""/>
+        <p:cNvGrpSpPr/>
+        <p:nvPr/>
+      </p:nvGrpSpPr>
+      <p:grpSpPr>
+        <a:xfrm>
+          <a:off x="0" y="0"/>
+          <a:ext cx="0" cy="0"/>
+          <a:chOff x="0" y="0"/>
+          <a:chExt cx="0" cy="0"/>
+        </a:xfrm>
+      </p:grpSpPr>
+      <p:sp>
+        <p:nvSpPr>
+          <p:cNvPr id="2" name="Header Placeholder 1"/>
+          <p:cNvSpPr>
+            <a:spLocks noGrp="1"/>
+          </p:cNvSpPr>
+          <p:nvPr>
+            <p:ph type="hdr" sz="quarter"/>
+          </p:nvPr>
+        </p:nvSpPr>
+        <p:spPr>
+          <a:xfrm>
+            <a:off x="0" y="0"/>
+            <a:ext cx="2971800" cy="458788"/>
+          </a:xfrm>
+          <a:prstGeom prst="rect">
+            <a:avLst/>
+          </a:prstGeom>
+        </p:spPr>
+        <p:txBody>
+          <a:bodyPr vert="horz" lIns="91440" tIns="45720" rIns="91440" bIns="45720" rtlCol="0"/>
+          <a:lstStyle>
+            <a:lvl1pPr algn="l">
+              <a:defRPr sz="1200"/>
+            </a:lvl1pPr>
+          </a:lstStyle>
+          <a:p>
+            <a:endParaRPr lang="en-GB"/>
+          </a:p>
+        </p:txBody>
+      </p:sp>
+      <p:sp>
+        <p:nvSpPr>
+          <p:cNvPr id="3" name="Date Placeholder 2"/>
+          <p:cNvSpPr>
+            <a:spLocks noGrp="1"/>
+          </p:cNvSpPr>
+          <p:nvPr>
+            <p:ph type="dt" idx="1"/>
+          </p:nvPr>
+        </p:nvSpPr>
+        <p:spPr>
+          <a:xfrm>
+            <a:off x="3884613" y="0"/>
+            <a:ext cx="2971800" cy="458788"/>
+          </a:xfrm>
+          <a:prstGeom prst="rect">
+            <a:avLst/>
+          </a:prstGeom>
+        </p:spPr>
+        <p:txBody>
+          <a:bodyPr vert="horz" lIns="91440" tIns="45720" rIns="91440" bIns="45720" rtlCol="0"/>
+          <a:lstStyle>
+            <a:lvl1pPr algn="r">
+              <a:defRPr sz="1200"/>
+            </a:lvl1pPr>
+          </a:lstStyle>
+          <a:p>
+            <a:fld id="{E9A43392-C767-4137-A1B4-E9A9DDFBDAD0}" type="datetimeFigureOut">
+              <a:rPr lang="en-GB" smtClean="0"/>
+              <a:t>01/03/2024</a:t>
+            </a:fld>
+            <a:endParaRPr lang="en-GB"/>
+          </a:p>
+        </p:txBody>
+      </p:sp>
+      <p:sp>
+        <p:nvSpPr>
+          <p:cNvPr id="4" name="Slide Image Placeholder 3"/>
+          <p:cNvSpPr>
+            <a:spLocks noGrp="1" noRot="1" noChangeAspect="1"/>
+          </p:cNvSpPr>
+          <p:nvPr>
+            <p:ph type="sldImg" idx="2"/>
+          </p:nvPr>
+        </p:nvSpPr>
+        <p:spPr>
+          <a:xfrm>
+            <a:off x="685800" y="1143000"/>
+            <a:ext cx="5486400" cy="3086100"/>
+          </a:xfrm>
+          <a:prstGeom prst="rect">
+            <a:avLst/>
+          </a:prstGeom>
+          <a:noFill/>
+          <a:ln w="12700">
+            <a:solidFill>
+              <a:prstClr val="black"/>
+            </a:solidFill>
+          </a:ln>
+        </p:spPr>
+        <p:txBody>
+          <a:bodyPr vert="horz" lIns="91440" tIns="45720" rIns="91440" bIns="45720" rtlCol="0" anchor="ctr"/>
+          <a:lstStyle/>
+          <a:p>
+            <a:endParaRPr lang="en-GB"/>
+          </a:p>
+        </p:txBody>
+      </p:sp>
+      <p:sp>
+        <p:nvSpPr>
+          <p:cNvPr id="5" name="Notes Placeholder 4"/>
+          <p:cNvSpPr>
+            <a:spLocks noGrp="1"/>
+          </p:cNvSpPr>
+          <p:nvPr>
+            <p:ph type="body" sz="quarter" idx="3"/>
+          </p:nvPr>
+        </p:nvSpPr>
+        <p:spPr>
+          <a:xfrm>
+            <a:off x="685800" y="4400550"/>
+            <a:ext cx="5486400" cy="3600450"/>
+          </a:xfrm>
+          <a:prstGeom prst="rect">
+            <a:avLst/>
+          </a:prstGeom>
+        </p:spPr>
+        <p:txBody>
+          <a:bodyPr vert="horz" lIns="91440" tIns="45720" rIns="91440" bIns="45720" rtlCol="0"/>
+          <a:lstStyle/>
+          <a:p>
+            <a:pPr lvl="0"/>
+            <a:r>
+              <a:rPr lang="en-US"/>
+              <a:t>Click to edit Master text styles</a:t>
+            </a:r>
+          </a:p>
+          <a:p>
+            <a:pPr lvl="1"/>
+            <a:r>
+              <a:rPr lang="en-US"/>
+              <a:t>Second level</a:t>
+            </a:r>
+          </a:p>
+          <a:p>
+            <a:pPr lvl="2"/>
+            <a:r>
+              <a:rPr lang="en-US"/>
+              <a:t>Third level</a:t>
+            </a:r>
+          </a:p>
+          <a:p>
+            <a:pPr lvl="3"/>
+            <a:r>
+              <a:rPr lang="en-US"/>
+              <a:t>Fourth level</a:t>
+            </a:r>
+          </a:p>
+          <a:p>
+            <a:pPr lvl="4"/>
+            <a:r>
+              <a:rPr lang="en-US"/>
+              <a:t>Fifth level</a:t>
+            </a:r>
+            <a:endParaRPr lang="en-GB"/>
+          </a:p>
+        </p:txBody>
+      </p:sp>
+      <p:sp>
+        <p:nvSpPr>
+          <p:cNvPr id="6" name="Footer Placeholder 5"/>
+          <p:cNvSpPr>
+            <a:spLocks noGrp="1"/>
+          </p:cNvSpPr>
+          <p:nvPr>
+            <p:ph type="ftr" sz="quarter" idx="4"/>
+          </p:nvPr>
+        </p:nvSpPr>
+        <p:spPr>
+          <a:xfrm>
+            <a:off x="0" y="8685213"/>
+            <a:ext cx="2971800" cy="458787"/>
+          </a:xfrm>
+          <a:prstGeom prst="rect">
+            <a:avLst/>
+          </a:prstGeom>
+        </p:spPr>
+        <p:txBody>
+          <a:bodyPr vert="horz" lIns="91440" tIns="45720" rIns="91440" bIns="45720" rtlCol="0" anchor="b"/>
+          <a:lstStyle>
+            <a:lvl1pPr algn="l">
+              <a:defRPr sz="1200"/>
+            </a:lvl1pPr>
+          </a:lstStyle>
+          <a:p>
+            <a:endParaRPr lang="en-GB"/>
+          </a:p>
+        </p:txBody>
+      </p:sp>
+      <p:sp>
+        <p:nvSpPr>
+          <p:cNvPr id="7" name="Slide Number Placeholder 6"/>
+          <p:cNvSpPr>
+            <a:spLocks noGrp="1"/>
+          </p:cNvSpPr>
+          <p:nvPr>
+            <p:ph type="sldNum" sz="quarter" idx="5"/>
+          </p:nvPr>
+        </p:nvSpPr>
+        <p:spPr>
+          <a:xfrm>
+            <a:off x="3884613" y="8685213"/>
+            <a:ext cx="2971800" cy="458787"/>
+          </a:xfrm>
+          <a:prstGeom prst="rect">
+            <a:avLst/>
+          </a:prstGeom>
+        </p:spPr>
+        <p:txBody>
+          <a:bodyPr vert="horz" lIns="91440" tIns="45720" rIns="91440" bIns="45720" rtlCol="0" anchor="b"/>
+          <a:lstStyle>
+            <a:lvl1pPr algn="r">
+              <a:defRPr sz="1200"/>
+            </a:lvl1pPr>
+          </a:lstStyle>
+          <a:p>
+            <a:fld id="{6F0AC7D4-A38E-400B-AF32-076B45E85765}" type="slidenum">
+              <a:rPr lang="en-GB" smtClean="0"/>
+              <a:t>‹#›</a:t>
+            </a:fld>
+            <a:endParaRPr lang="en-GB"/>
+          </a:p>
+        </p:txBody>
+      </p:sp>
+    </p:spTree>
+    <p:extLst>
+      <p:ext uri="{BB962C8B-B14F-4D97-AF65-F5344CB8AC3E}">
+        <p14:creationId xmlns:p14="http://schemas.microsoft.com/office/powerpoint/2010/main" val="2192915783"/>
+      </p:ext>
+    </p:extLst>
+  </p:cSld>
+  <p:clrMap bg1="lt1" tx1="dk1" bg2="lt2" tx2="dk2" accent1="accent1" accent2="accent2" accent3="accent3" accent4="accent4" accent5="accent5" accent6="accent6" hlink="hlink" folHlink="folHlink"/>
+  <p:notesStyle>
+    <a:lvl1pPr marL="0" algn="l" defTabSz="914400" rtl="0" eaLnBrk="1" latinLnBrk="0" hangingPunct="1">
+      <a:defRPr sz="1200" kern="1200">
+        <a:solidFill>
+          <a:schemeClr val="tx1"/>
+        </a:solidFill>
+        <a:latin typeface="+mn-lt"/>
+        <a:ea typeface="+mn-ea"/>
+        <a:cs typeface="+mn-cs"/>
+      </a:defRPr>
+    </a:lvl1pPr>
+    <a:lvl2pPr marL="457200" algn="l" defTabSz="914400" rtl="0" eaLnBrk="1" latinLnBrk="0" hangingPunct="1">
+      <a:defRPr sz="1200" kern="1200">
+        <a:solidFill>
+          <a:schemeClr val="tx1"/>
+        </a:solidFill>
+        <a:latin typeface="+mn-lt"/>
+        <a:ea typeface="+mn-ea"/>
+        <a:cs typeface="+mn-cs"/>
+      </a:defRPr>
+    </a:lvl2pPr>
+    <a:lvl3pPr marL="914400" algn="l" defTabSz="914400" rtl="0" eaLnBrk="1" latinLnBrk="0" hangingPunct="1">
+      <a:defRPr sz="1200" kern="1200">
+        <a:solidFill>
+          <a:schemeClr val="tx1"/>
+        </a:solidFill>
+        <a:latin typeface="+mn-lt"/>
+        <a:ea typeface="+mn-ea"/>
+        <a:cs typeface="+mn-cs"/>
+      </a:defRPr>
+    </a:lvl3pPr>
+    <a:lvl4pPr marL="1371600" algn="l" defTabSz="914400" rtl="0" eaLnBrk="1" latinLnBrk="0" hangingPunct="1">
+      <a:defRPr sz="1200" kern="1200">
+        <a:solidFill>
+          <a:schemeClr val="tx1"/>
+        </a:solidFill>
+        <a:latin typeface="+mn-lt"/>
+        <a:ea typeface="+mn-ea"/>
+        <a:cs typeface="+mn-cs"/>
+      </a:defRPr>
+    </a:lvl4pPr>
+    <a:lvl5pPr marL="1828800" algn="l" defTabSz="914400" rtl="0" eaLnBrk="1" latinLnBrk="0" hangingPunct="1">
+      <a:defRPr sz="1200" kern="1200">
+        <a:solidFill>
+          <a:schemeClr val="tx1"/>
+        </a:solidFill>
+        <a:latin typeface="+mn-lt"/>
+        <a:ea typeface="+mn-ea"/>
+        <a:cs typeface="+mn-cs"/>
+      </a:defRPr>
+    </a:lvl5pPr>
+    <a:lvl6pPr marL="2286000" algn="l" defTabSz="914400" rtl="0" eaLnBrk="1" latinLnBrk="0" hangingPunct="1">
+      <a:defRPr sz="1200" kern="1200">
+        <a:solidFill>
+          <a:schemeClr val="tx1"/>
+        </a:solidFill>
+        <a:latin typeface="+mn-lt"/>
+        <a:ea typeface="+mn-ea"/>
+        <a:cs typeface="+mn-cs"/>
+      </a:defRPr>
+    </a:lvl6pPr>
+    <a:lvl7pPr marL="2743200" algn="l" defTabSz="914400" rtl="0" eaLnBrk="1" latinLnBrk="0" hangingPunct="1">
+      <a:defRPr sz="1200" kern="1200">
+        <a:solidFill>
+          <a:schemeClr val="tx1"/>
+        </a:solidFill>
+        <a:latin typeface="+mn-lt"/>
+        <a:ea typeface="+mn-ea"/>
+        <a:cs typeface="+mn-cs"/>
+      </a:defRPr>
+    </a:lvl7pPr>
+    <a:lvl8pPr marL="3200400" algn="l" defTabSz="914400" rtl="0" eaLnBrk="1" latinLnBrk="0" hangingPunct="1">
+      <a:defRPr sz="1200" kern="1200">
+        <a:solidFill>
+          <a:schemeClr val="tx1"/>
+        </a:solidFill>
+        <a:latin typeface="+mn-lt"/>
+        <a:ea typeface="+mn-ea"/>
+        <a:cs typeface="+mn-cs"/>
+      </a:defRPr>
+    </a:lvl8pPr>
+    <a:lvl9pPr marL="3657600" algn="l" defTabSz="914400" rtl="0" eaLnBrk="1" latinLnBrk="0" hangingPunct="1">
+      <a:defRPr sz="1200" kern="1200">
+        <a:solidFill>
+          <a:schemeClr val="tx1"/>
+        </a:solidFill>
+        <a:latin typeface="+mn-lt"/>
+        <a:ea typeface="+mn-ea"/>
+        <a:cs typeface="+mn-cs"/>
+      </a:defRPr>
+    </a:lvl9pPr>
+  </p:notesStyle>
+</p:notesMaster>
+</file>
+
 <file path=ppt/slideLayouts/slideLayout1.xml><?xml version="1.0" encoding="utf-8"?>
 <p:sldLayout xmlns:a="http://schemas.openxmlformats.org/drawingml/2006/main" xmlns:r="http://schemas.openxmlformats.org/officeDocument/2006/relationships" xmlns:p="http://schemas.openxmlformats.org/presentationml/2006/main" type="title" preserve="1">
   <p:cSld name="Title Slide">
@@ -3108,9 +3960,9 @@
           <a:bodyPr/>
           <a:lstStyle/>
           <a:p>
-            <a:fld id="{0CD94E99-FA29-4EFF-88BE-3447E30E8C4D}" type="datetimeFigureOut">
+            <a:fld id="{5B07C734-A788-4C44-A615-CFDCB507568B}" type="datetime1">
               <a:rPr lang="en-GB" smtClean="0"/>
-              <a:t>29/02/2024</a:t>
+              <a:t>01/03/2024</a:t>
             </a:fld>
             <a:endParaRPr lang="en-GB"/>
           </a:p>
@@ -3131,7 +3983,10 @@
           <a:bodyPr/>
           <a:lstStyle/>
           <a:p>
-            <a:endParaRPr lang="en-GB"/>
+            <a:r>
+              <a:rPr lang="en-GB"/>
+              <a:t>Supervisor Meeting</a:t>
+            </a:r>
           </a:p>
         </p:txBody>
       </p:sp>
@@ -3316,9 +4171,9 @@
           <a:bodyPr/>
           <a:lstStyle/>
           <a:p>
-            <a:fld id="{0CD94E99-FA29-4EFF-88BE-3447E30E8C4D}" type="datetimeFigureOut">
+            <a:fld id="{BBCA379E-BDDE-43DA-BA17-E6B54240C0B3}" type="datetime1">
               <a:rPr lang="en-GB" smtClean="0"/>
-              <a:t>29/02/2024</a:t>
+              <a:t>01/03/2024</a:t>
             </a:fld>
             <a:endParaRPr lang="en-GB"/>
           </a:p>
@@ -3339,7 +4194,10 @@
           <a:bodyPr/>
           <a:lstStyle/>
           <a:p>
-            <a:endParaRPr lang="en-GB"/>
+            <a:r>
+              <a:rPr lang="en-GB"/>
+              <a:t>Supervisor Meeting</a:t>
+            </a:r>
           </a:p>
         </p:txBody>
       </p:sp>
@@ -3574,9 +4432,9 @@
           <a:bodyPr/>
           <a:lstStyle/>
           <a:p>
-            <a:fld id="{0CD94E99-FA29-4EFF-88BE-3447E30E8C4D}" type="datetimeFigureOut">
+            <a:fld id="{133DCD2D-99F9-4E1C-9F3B-8D374F39343D}" type="datetime1">
               <a:rPr lang="en-GB" smtClean="0"/>
-              <a:t>29/02/2024</a:t>
+              <a:t>01/03/2024</a:t>
             </a:fld>
             <a:endParaRPr lang="en-GB"/>
           </a:p>
@@ -3597,7 +4455,10 @@
           <a:bodyPr/>
           <a:lstStyle/>
           <a:p>
-            <a:endParaRPr lang="en-GB"/>
+            <a:r>
+              <a:rPr lang="en-GB"/>
+              <a:t>Supervisor Meeting</a:t>
+            </a:r>
           </a:p>
         </p:txBody>
       </p:sp>
@@ -3760,9 +4621,9 @@
           <a:bodyPr/>
           <a:lstStyle/>
           <a:p>
-            <a:fld id="{0CD94E99-FA29-4EFF-88BE-3447E30E8C4D}" type="datetimeFigureOut">
+            <a:fld id="{7778A1CA-0478-45A0-9435-D96032CA4164}" type="datetime1">
               <a:rPr lang="en-GB" smtClean="0"/>
-              <a:t>29/02/2024</a:t>
+              <a:t>01/03/2024</a:t>
             </a:fld>
             <a:endParaRPr lang="en-GB"/>
           </a:p>
@@ -3789,7 +4650,10 @@
           <a:bodyPr/>
           <a:lstStyle/>
           <a:p>
-            <a:endParaRPr lang="en-GB"/>
+            <a:r>
+              <a:rPr lang="en-GB"/>
+              <a:t>Supervisor Meeting</a:t>
+            </a:r>
           </a:p>
         </p:txBody>
       </p:sp>
@@ -4109,9 +4973,9 @@
           <a:bodyPr/>
           <a:lstStyle/>
           <a:p>
-            <a:fld id="{0CD94E99-FA29-4EFF-88BE-3447E30E8C4D}" type="datetimeFigureOut">
+            <a:fld id="{23DC5470-1C1D-4923-B8A8-961DFF721FBD}" type="datetime1">
               <a:rPr lang="en-GB" smtClean="0"/>
-              <a:t>29/02/2024</a:t>
+              <a:t>01/03/2024</a:t>
             </a:fld>
             <a:endParaRPr lang="en-GB"/>
           </a:p>
@@ -4132,7 +4996,10 @@
           <a:bodyPr/>
           <a:lstStyle/>
           <a:p>
-            <a:endParaRPr lang="en-GB"/>
+            <a:r>
+              <a:rPr lang="en-GB"/>
+              <a:t>Supervisor Meeting</a:t>
+            </a:r>
           </a:p>
         </p:txBody>
       </p:sp>
@@ -4384,9 +5251,9 @@
           <a:bodyPr/>
           <a:lstStyle/>
           <a:p>
-            <a:fld id="{0CD94E99-FA29-4EFF-88BE-3447E30E8C4D}" type="datetimeFigureOut">
+            <a:fld id="{0E741BE0-2C8A-4B1C-AFBF-7305842CD248}" type="datetime1">
               <a:rPr lang="en-GB" smtClean="0"/>
-              <a:t>29/02/2024</a:t>
+              <a:t>01/03/2024</a:t>
             </a:fld>
             <a:endParaRPr lang="en-GB"/>
           </a:p>
@@ -4407,7 +5274,10 @@
           <a:bodyPr/>
           <a:lstStyle/>
           <a:p>
-            <a:endParaRPr lang="en-GB"/>
+            <a:r>
+              <a:rPr lang="en-GB"/>
+              <a:t>Supervisor Meeting</a:t>
+            </a:r>
           </a:p>
         </p:txBody>
       </p:sp>
@@ -4763,9 +5633,9 @@
           <a:bodyPr/>
           <a:lstStyle/>
           <a:p>
-            <a:fld id="{0CD94E99-FA29-4EFF-88BE-3447E30E8C4D}" type="datetimeFigureOut">
+            <a:fld id="{3D2519A9-BEC6-4C36-B98F-DA784E00FBFE}" type="datetime1">
               <a:rPr lang="en-GB" smtClean="0"/>
-              <a:t>29/02/2024</a:t>
+              <a:t>01/03/2024</a:t>
             </a:fld>
             <a:endParaRPr lang="en-GB"/>
           </a:p>
@@ -4786,7 +5656,10 @@
           <a:bodyPr/>
           <a:lstStyle/>
           <a:p>
-            <a:endParaRPr lang="en-GB"/>
+            <a:r>
+              <a:rPr lang="en-GB"/>
+              <a:t>Supervisor Meeting</a:t>
+            </a:r>
           </a:p>
         </p:txBody>
       </p:sp>
@@ -4881,9 +5754,9 @@
           <a:bodyPr/>
           <a:lstStyle/>
           <a:p>
-            <a:fld id="{0CD94E99-FA29-4EFF-88BE-3447E30E8C4D}" type="datetimeFigureOut">
+            <a:fld id="{005527DF-4A67-459D-BBB9-9CF200764E01}" type="datetime1">
               <a:rPr lang="en-GB" smtClean="0"/>
-              <a:t>29/02/2024</a:t>
+              <a:t>01/03/2024</a:t>
             </a:fld>
             <a:endParaRPr lang="en-GB"/>
           </a:p>
@@ -4904,7 +5777,10 @@
           <a:bodyPr/>
           <a:lstStyle/>
           <a:p>
-            <a:endParaRPr lang="en-GB"/>
+            <a:r>
+              <a:rPr lang="en-GB"/>
+              <a:t>Supervisor Meeting</a:t>
+            </a:r>
           </a:p>
         </p:txBody>
       </p:sp>
@@ -5054,9 +5930,9 @@
           <a:bodyPr/>
           <a:lstStyle/>
           <a:p>
-            <a:fld id="{0CD94E99-FA29-4EFF-88BE-3447E30E8C4D}" type="datetimeFigureOut">
+            <a:fld id="{AB815DF0-B384-4B57-B949-BD773032C594}" type="datetime1">
               <a:rPr lang="en-GB" smtClean="0"/>
-              <a:t>29/02/2024</a:t>
+              <a:t>01/03/2024</a:t>
             </a:fld>
             <a:endParaRPr lang="en-GB"/>
           </a:p>
@@ -5085,7 +5961,10 @@
             </a:lvl1pPr>
           </a:lstStyle>
           <a:p>
-            <a:endParaRPr lang="en-GB"/>
+            <a:r>
+              <a:rPr lang="en-GB"/>
+              <a:t>Supervisor Meeting</a:t>
+            </a:r>
           </a:p>
         </p:txBody>
       </p:sp>
@@ -5410,9 +6289,9 @@
             </a:lvl1pPr>
           </a:lstStyle>
           <a:p>
-            <a:fld id="{0CD94E99-FA29-4EFF-88BE-3447E30E8C4D}" type="datetimeFigureOut">
+            <a:fld id="{9A7FC2E2-2BAF-4FF7-AB60-CB61E8F4481E}" type="datetime1">
               <a:rPr lang="en-GB" smtClean="0"/>
-              <a:t>29/02/2024</a:t>
+              <a:t>01/03/2024</a:t>
             </a:fld>
             <a:endParaRPr lang="en-GB"/>
           </a:p>
@@ -5446,7 +6325,10 @@
             </a:lvl1pPr>
           </a:lstStyle>
           <a:p>
-            <a:endParaRPr lang="en-GB"/>
+            <a:r>
+              <a:rPr lang="en-GB"/>
+              <a:t>Supervisor Meeting</a:t>
+            </a:r>
           </a:p>
         </p:txBody>
       </p:sp>
@@ -5789,9 +6671,9 @@
           <a:bodyPr/>
           <a:lstStyle/>
           <a:p>
-            <a:fld id="{0CD94E99-FA29-4EFF-88BE-3447E30E8C4D}" type="datetimeFigureOut">
+            <a:fld id="{922F4F2B-4496-4E96-BB72-FCD2DDED5FAC}" type="datetime1">
               <a:rPr lang="en-GB" smtClean="0"/>
-              <a:t>29/02/2024</a:t>
+              <a:t>01/03/2024</a:t>
             </a:fld>
             <a:endParaRPr lang="en-GB"/>
           </a:p>
@@ -5812,7 +6694,10 @@
           <a:bodyPr/>
           <a:lstStyle/>
           <a:p>
-            <a:endParaRPr lang="en-GB"/>
+            <a:r>
+              <a:rPr lang="en-GB"/>
+              <a:t>Supervisor Meeting</a:t>
+            </a:r>
           </a:p>
         </p:txBody>
       </p:sp>
@@ -6081,9 +6966,9 @@
             </a:lvl1pPr>
           </a:lstStyle>
           <a:p>
-            <a:fld id="{0CD94E99-FA29-4EFF-88BE-3447E30E8C4D}" type="datetimeFigureOut">
+            <a:fld id="{A27F2E53-74FD-4822-A803-F8740BFB7820}" type="datetime1">
               <a:rPr lang="en-GB" smtClean="0"/>
-              <a:t>29/02/2024</a:t>
+              <a:t>01/03/2024</a:t>
             </a:fld>
             <a:endParaRPr lang="en-GB"/>
           </a:p>
@@ -6120,7 +7005,10 @@
             </a:lvl1pPr>
           </a:lstStyle>
           <a:p>
-            <a:endParaRPr lang="en-GB"/>
+            <a:r>
+              <a:rPr lang="en-GB"/>
+              <a:t>Supervisor Meeting</a:t>
+            </a:r>
           </a:p>
         </p:txBody>
       </p:sp>
@@ -6222,6 +7110,7 @@
     <p:sldLayoutId id="2147483894" r:id="rId10"/>
     <p:sldLayoutId id="2147483895" r:id="rId11"/>
   </p:sldLayoutIdLst>
+  <p:hf hdr="0" ftr="0" dt="0"/>
   <p:txStyles>
     <p:titleStyle>
       <a:lvl1pPr algn="l" defTabSz="914400" rtl="0" eaLnBrk="1" latinLnBrk="0" hangingPunct="1">
@@ -6985,6 +7874,270 @@
 </p:sld>
 </file>
 
+<file path=ppt/slides/slide10.xml><?xml version="1.0" encoding="utf-8"?>
+<p:sld xmlns:a="http://schemas.openxmlformats.org/drawingml/2006/main" xmlns:r="http://schemas.openxmlformats.org/officeDocument/2006/relationships" xmlns:p="http://schemas.openxmlformats.org/presentationml/2006/main">
+  <p:cSld>
+    <p:spTree>
+      <p:nvGrpSpPr>
+        <p:cNvPr id="1" name="">
+          <a:extLst>
+            <a:ext uri="{FF2B5EF4-FFF2-40B4-BE49-F238E27FC236}">
+              <a16:creationId xmlns:a16="http://schemas.microsoft.com/office/drawing/2014/main" id="{D753024E-2011-A80E-838D-EA93BF4E2992}"/>
+            </a:ext>
+          </a:extLst>
+        </p:cNvPr>
+        <p:cNvGrpSpPr/>
+        <p:nvPr/>
+      </p:nvGrpSpPr>
+      <p:grpSpPr>
+        <a:xfrm>
+          <a:off x="0" y="0"/>
+          <a:ext cx="0" cy="0"/>
+          <a:chOff x="0" y="0"/>
+          <a:chExt cx="0" cy="0"/>
+        </a:xfrm>
+      </p:grpSpPr>
+      <p:sp>
+        <p:nvSpPr>
+          <p:cNvPr id="4" name="Title 3">
+            <a:extLst>
+              <a:ext uri="{FF2B5EF4-FFF2-40B4-BE49-F238E27FC236}">
+                <a16:creationId xmlns:a16="http://schemas.microsoft.com/office/drawing/2014/main" id="{8556B55C-8D4A-A20E-7877-C41CBC01F12E}"/>
+              </a:ext>
+            </a:extLst>
+          </p:cNvPr>
+          <p:cNvSpPr>
+            <a:spLocks noGrp="1"/>
+          </p:cNvSpPr>
+          <p:nvPr>
+            <p:ph type="ctrTitle"/>
+          </p:nvPr>
+        </p:nvSpPr>
+        <p:spPr/>
+        <p:txBody>
+          <a:bodyPr/>
+          <a:lstStyle/>
+          <a:p>
+            <a:r>
+              <a:rPr lang="en-US" dirty="0"/>
+              <a:t>Questions and What’s Next</a:t>
+            </a:r>
+            <a:endParaRPr lang="en-GB" dirty="0"/>
+          </a:p>
+        </p:txBody>
+      </p:sp>
+      <p:sp>
+        <p:nvSpPr>
+          <p:cNvPr id="5" name="Subtitle 4">
+            <a:extLst>
+              <a:ext uri="{FF2B5EF4-FFF2-40B4-BE49-F238E27FC236}">
+                <a16:creationId xmlns:a16="http://schemas.microsoft.com/office/drawing/2014/main" id="{14756E38-C2E8-302A-EE87-2475A0B8C87E}"/>
+              </a:ext>
+            </a:extLst>
+          </p:cNvPr>
+          <p:cNvSpPr>
+            <a:spLocks noGrp="1"/>
+          </p:cNvSpPr>
+          <p:nvPr>
+            <p:ph type="subTitle" idx="1"/>
+          </p:nvPr>
+        </p:nvSpPr>
+        <p:spPr/>
+        <p:txBody>
+          <a:bodyPr/>
+          <a:lstStyle/>
+          <a:p>
+            <a:endParaRPr lang="en-GB"/>
+          </a:p>
+        </p:txBody>
+      </p:sp>
+    </p:spTree>
+    <p:extLst>
+      <p:ext uri="{BB962C8B-B14F-4D97-AF65-F5344CB8AC3E}">
+        <p14:creationId xmlns:p14="http://schemas.microsoft.com/office/powerpoint/2010/main" val="514336153"/>
+      </p:ext>
+    </p:extLst>
+  </p:cSld>
+  <p:clrMapOvr>
+    <a:masterClrMapping/>
+  </p:clrMapOvr>
+</p:sld>
+</file>
+
+<file path=ppt/slides/slide11.xml><?xml version="1.0" encoding="utf-8"?>
+<p:sld xmlns:a="http://schemas.openxmlformats.org/drawingml/2006/main" xmlns:r="http://schemas.openxmlformats.org/officeDocument/2006/relationships" xmlns:p="http://schemas.openxmlformats.org/presentationml/2006/main">
+  <p:cSld>
+    <p:spTree>
+      <p:nvGrpSpPr>
+        <p:cNvPr id="1" name=""/>
+        <p:cNvGrpSpPr/>
+        <p:nvPr/>
+      </p:nvGrpSpPr>
+      <p:grpSpPr>
+        <a:xfrm>
+          <a:off x="0" y="0"/>
+          <a:ext cx="0" cy="0"/>
+          <a:chOff x="0" y="0"/>
+          <a:chExt cx="0" cy="0"/>
+        </a:xfrm>
+      </p:grpSpPr>
+      <p:sp>
+        <p:nvSpPr>
+          <p:cNvPr id="2" name="Title 1">
+            <a:extLst>
+              <a:ext uri="{FF2B5EF4-FFF2-40B4-BE49-F238E27FC236}">
+                <a16:creationId xmlns:a16="http://schemas.microsoft.com/office/drawing/2014/main" id="{A6DC92E0-C040-20C4-FBEE-76F4DB5A724E}"/>
+              </a:ext>
+            </a:extLst>
+          </p:cNvPr>
+          <p:cNvSpPr>
+            <a:spLocks noGrp="1"/>
+          </p:cNvSpPr>
+          <p:nvPr>
+            <p:ph type="title"/>
+          </p:nvPr>
+        </p:nvSpPr>
+        <p:spPr/>
+        <p:txBody>
+          <a:bodyPr>
+            <a:normAutofit/>
+          </a:bodyPr>
+          <a:lstStyle/>
+          <a:p>
+            <a:r>
+              <a:rPr lang="en-US" sz="3200" dirty="0"/>
+              <a:t>Questions (Some specific, some general), and What’s Next</a:t>
+            </a:r>
+            <a:endParaRPr lang="en-GB" sz="3200" dirty="0"/>
+          </a:p>
+        </p:txBody>
+      </p:sp>
+      <p:sp>
+        <p:nvSpPr>
+          <p:cNvPr id="3" name="Content Placeholder 2">
+            <a:extLst>
+              <a:ext uri="{FF2B5EF4-FFF2-40B4-BE49-F238E27FC236}">
+                <a16:creationId xmlns:a16="http://schemas.microsoft.com/office/drawing/2014/main" id="{B566B4D7-CD65-FAB6-32EC-53E83623013D}"/>
+              </a:ext>
+            </a:extLst>
+          </p:cNvPr>
+          <p:cNvSpPr>
+            <a:spLocks noGrp="1"/>
+          </p:cNvSpPr>
+          <p:nvPr>
+            <p:ph idx="1"/>
+          </p:nvPr>
+        </p:nvSpPr>
+        <p:spPr/>
+        <p:txBody>
+          <a:bodyPr/>
+          <a:lstStyle/>
+          <a:p>
+            <a:pPr lvl="1"/>
+            <a:r>
+              <a:rPr lang="en-US" dirty="0"/>
+              <a:t>What is required for the 100/200-day review?</a:t>
+            </a:r>
+          </a:p>
+          <a:p>
+            <a:pPr lvl="2"/>
+            <a:r>
+              <a:rPr lang="en-US" dirty="0"/>
+              <a:t>4-page report, presentation – but level of detail?</a:t>
+            </a:r>
+          </a:p>
+          <a:p>
+            <a:pPr lvl="1"/>
+            <a:r>
+              <a:rPr lang="en-US" dirty="0"/>
+              <a:t>As a rule of thumb, what amount of reading should I aim for in a week? </a:t>
+            </a:r>
+          </a:p>
+          <a:p>
+            <a:pPr lvl="2"/>
+            <a:r>
+              <a:rPr lang="en-US" dirty="0"/>
+              <a:t>Associated with this is writing more</a:t>
+            </a:r>
+          </a:p>
+          <a:p>
+            <a:pPr lvl="1"/>
+            <a:r>
+              <a:rPr lang="en-US" dirty="0"/>
+              <a:t>Submitting abstract for NIBES?</a:t>
+            </a:r>
+          </a:p>
+          <a:p>
+            <a:pPr lvl="1"/>
+            <a:r>
+              <a:rPr lang="en-US" dirty="0"/>
+              <a:t>What is the policy on the use of AI tools, specifically to assist with coding (e.g., Copilot)</a:t>
+            </a:r>
+          </a:p>
+          <a:p>
+            <a:pPr lvl="1"/>
+            <a:r>
+              <a:rPr lang="en-US" dirty="0"/>
+              <a:t>AI tool for writing C </a:t>
+            </a:r>
+            <a:r>
+              <a:rPr lang="en-US"/>
+              <a:t>test cases?</a:t>
+            </a:r>
+            <a:endParaRPr lang="en-US" dirty="0"/>
+          </a:p>
+          <a:p>
+            <a:pPr lvl="1"/>
+            <a:endParaRPr lang="en-US" dirty="0"/>
+          </a:p>
+          <a:p>
+            <a:pPr lvl="1"/>
+            <a:endParaRPr lang="en-GB" dirty="0"/>
+          </a:p>
+        </p:txBody>
+      </p:sp>
+      <p:sp>
+        <p:nvSpPr>
+          <p:cNvPr id="4" name="Slide Number Placeholder 3">
+            <a:extLst>
+              <a:ext uri="{FF2B5EF4-FFF2-40B4-BE49-F238E27FC236}">
+                <a16:creationId xmlns:a16="http://schemas.microsoft.com/office/drawing/2014/main" id="{52893AD0-6CB9-5D61-6998-7D90F3953C0B}"/>
+              </a:ext>
+            </a:extLst>
+          </p:cNvPr>
+          <p:cNvSpPr>
+            <a:spLocks noGrp="1"/>
+          </p:cNvSpPr>
+          <p:nvPr>
+            <p:ph type="sldNum" sz="quarter" idx="12"/>
+          </p:nvPr>
+        </p:nvSpPr>
+        <p:spPr/>
+        <p:txBody>
+          <a:bodyPr/>
+          <a:lstStyle/>
+          <a:p>
+            <a:fld id="{D3726DCB-FEA5-4222-BB45-1CC90DF962E6}" type="slidenum">
+              <a:rPr lang="en-GB" smtClean="0"/>
+              <a:t>11</a:t>
+            </a:fld>
+            <a:endParaRPr lang="en-GB"/>
+          </a:p>
+        </p:txBody>
+      </p:sp>
+    </p:spTree>
+    <p:extLst>
+      <p:ext uri="{BB962C8B-B14F-4D97-AF65-F5344CB8AC3E}">
+        <p14:creationId xmlns:p14="http://schemas.microsoft.com/office/powerpoint/2010/main" val="3459907314"/>
+      </p:ext>
+    </p:extLst>
+  </p:cSld>
+  <p:clrMapOvr>
+    <a:masterClrMapping/>
+  </p:clrMapOvr>
+</p:sld>
+</file>
+
 <file path=ppt/slides/slide2.xml><?xml version="1.0" encoding="utf-8"?>
 <p:sld xmlns:a="http://schemas.openxmlformats.org/drawingml/2006/main" xmlns:r="http://schemas.openxmlformats.org/officeDocument/2006/relationships" xmlns:p="http://schemas.openxmlformats.org/presentationml/2006/main">
   <p:cSld>
@@ -7004,46 +8157,10 @@
       </p:grpSpPr>
       <p:sp>
         <p:nvSpPr>
-          <p:cNvPr id="2" name="Title 1">
+          <p:cNvPr id="27" name="Rectangle: Rounded Corners 26">
             <a:extLst>
               <a:ext uri="{FF2B5EF4-FFF2-40B4-BE49-F238E27FC236}">
-                <a16:creationId xmlns:a16="http://schemas.microsoft.com/office/drawing/2014/main" id="{681D533A-3C45-4858-8E40-47B9F15C47FC}"/>
-              </a:ext>
-            </a:extLst>
-          </p:cNvPr>
-          <p:cNvSpPr>
-            <a:spLocks noGrp="1"/>
-          </p:cNvSpPr>
-          <p:nvPr>
-            <p:ph type="title"/>
-          </p:nvPr>
-        </p:nvSpPr>
-        <p:spPr>
-          <a:xfrm>
-            <a:off x="1097280" y="286603"/>
-            <a:ext cx="10058400" cy="903005"/>
-          </a:xfrm>
-        </p:spPr>
-        <p:txBody>
-          <a:bodyPr>
-            <a:normAutofit/>
-          </a:bodyPr>
-          <a:lstStyle/>
-          <a:p>
-            <a:r>
-              <a:rPr lang="en-US" dirty="0"/>
-              <a:t>Agenda	</a:t>
-            </a:r>
-            <a:endParaRPr lang="en-GB" dirty="0"/>
-          </a:p>
-        </p:txBody>
-      </p:sp>
-      <p:sp>
-        <p:nvSpPr>
-          <p:cNvPr id="16" name="Rectangle: Rounded Corners 15">
-            <a:extLst>
-              <a:ext uri="{FF2B5EF4-FFF2-40B4-BE49-F238E27FC236}">
-                <a16:creationId xmlns:a16="http://schemas.microsoft.com/office/drawing/2014/main" id="{E0BBAE84-68A8-27FD-899F-5CDAF2AC1E95}"/>
+                <a16:creationId xmlns:a16="http://schemas.microsoft.com/office/drawing/2014/main" id="{EF46DCAD-7D94-7B9B-51EF-B4C3FAC004D1}"/>
               </a:ext>
             </a:extLst>
           </p:cNvPr>
@@ -7052,7 +8169,7 @@
         </p:nvSpPr>
         <p:spPr>
           <a:xfrm>
-            <a:off x="1818525" y="2707240"/>
+            <a:off x="8767505" y="2707239"/>
             <a:ext cx="1726058" cy="1541123"/>
           </a:xfrm>
           <a:prstGeom prst="roundRect">
@@ -7086,6 +8203,88 @@
       </p:sp>
       <p:sp>
         <p:nvSpPr>
+          <p:cNvPr id="2" name="Title 1">
+            <a:extLst>
+              <a:ext uri="{FF2B5EF4-FFF2-40B4-BE49-F238E27FC236}">
+                <a16:creationId xmlns:a16="http://schemas.microsoft.com/office/drawing/2014/main" id="{681D533A-3C45-4858-8E40-47B9F15C47FC}"/>
+              </a:ext>
+            </a:extLst>
+          </p:cNvPr>
+          <p:cNvSpPr>
+            <a:spLocks noGrp="1"/>
+          </p:cNvSpPr>
+          <p:nvPr>
+            <p:ph type="title"/>
+          </p:nvPr>
+        </p:nvSpPr>
+        <p:spPr>
+          <a:xfrm>
+            <a:off x="1097280" y="286603"/>
+            <a:ext cx="10058400" cy="903005"/>
+          </a:xfrm>
+        </p:spPr>
+        <p:txBody>
+          <a:bodyPr>
+            <a:normAutofit/>
+          </a:bodyPr>
+          <a:lstStyle/>
+          <a:p>
+            <a:r>
+              <a:rPr lang="en-US" dirty="0"/>
+              <a:t>Agenda	</a:t>
+            </a:r>
+            <a:endParaRPr lang="en-GB" dirty="0"/>
+          </a:p>
+        </p:txBody>
+      </p:sp>
+      <p:sp>
+        <p:nvSpPr>
+          <p:cNvPr id="16" name="Rectangle: Rounded Corners 15">
+            <a:extLst>
+              <a:ext uri="{FF2B5EF4-FFF2-40B4-BE49-F238E27FC236}">
+                <a16:creationId xmlns:a16="http://schemas.microsoft.com/office/drawing/2014/main" id="{E0BBAE84-68A8-27FD-899F-5CDAF2AC1E95}"/>
+              </a:ext>
+            </a:extLst>
+          </p:cNvPr>
+          <p:cNvSpPr/>
+          <p:nvPr/>
+        </p:nvSpPr>
+        <p:spPr>
+          <a:xfrm>
+            <a:off x="1403480" y="2707239"/>
+            <a:ext cx="1726058" cy="1541123"/>
+          </a:xfrm>
+          <a:prstGeom prst="roundRect">
+            <a:avLst/>
+          </a:prstGeom>
+        </p:spPr>
+        <p:style>
+          <a:lnRef idx="2">
+            <a:schemeClr val="accent1">
+              <a:shade val="15000"/>
+            </a:schemeClr>
+          </a:lnRef>
+          <a:fillRef idx="1">
+            <a:schemeClr val="accent1"/>
+          </a:fillRef>
+          <a:effectRef idx="0">
+            <a:schemeClr val="accent1"/>
+          </a:effectRef>
+          <a:fontRef idx="minor">
+            <a:schemeClr val="lt1"/>
+          </a:fontRef>
+        </p:style>
+        <p:txBody>
+          <a:bodyPr rtlCol="0" anchor="ctr"/>
+          <a:lstStyle/>
+          <a:p>
+            <a:pPr algn="ctr"/>
+            <a:endParaRPr lang="en-GB"/>
+          </a:p>
+        </p:txBody>
+      </p:sp>
+      <p:sp>
+        <p:nvSpPr>
           <p:cNvPr id="15" name="TextBox 14">
             <a:extLst>
               <a:ext uri="{FF2B5EF4-FFF2-40B4-BE49-F238E27FC236}">
@@ -7098,8 +8297,8 @@
         </p:nvSpPr>
         <p:spPr>
           <a:xfrm>
-            <a:off x="1646847" y="4469258"/>
-            <a:ext cx="2069413" cy="646331"/>
+            <a:off x="1097280" y="4469257"/>
+            <a:ext cx="2338461" cy="646331"/>
           </a:xfrm>
           <a:prstGeom prst="rect">
             <a:avLst/>
@@ -7115,7 +8314,7 @@
             <a:pPr algn="ctr"/>
             <a:r>
               <a:rPr lang="en-US" dirty="0"/>
-              <a:t>REFINED RESEARCH </a:t>
+              <a:t>EXPLORING RESEARCH </a:t>
             </a:r>
           </a:p>
           <a:p>
@@ -7279,7 +8478,7 @@
         </p:blipFill>
         <p:spPr>
           <a:xfrm>
-            <a:off x="2333432" y="2971799"/>
+            <a:off x="1918387" y="2971798"/>
             <a:ext cx="914400" cy="914400"/>
           </a:xfrm>
           <a:prstGeom prst="rect">
@@ -7287,52 +8486,6 @@
           </a:prstGeom>
         </p:spPr>
       </p:pic>
-      <p:sp>
-        <p:nvSpPr>
-          <p:cNvPr id="27" name="Rectangle: Rounded Corners 26">
-            <a:extLst>
-              <a:ext uri="{FF2B5EF4-FFF2-40B4-BE49-F238E27FC236}">
-                <a16:creationId xmlns:a16="http://schemas.microsoft.com/office/drawing/2014/main" id="{EF46DCAD-7D94-7B9B-51EF-B4C3FAC004D1}"/>
-              </a:ext>
-            </a:extLst>
-          </p:cNvPr>
-          <p:cNvSpPr/>
-          <p:nvPr/>
-        </p:nvSpPr>
-        <p:spPr>
-          <a:xfrm>
-            <a:off x="8708377" y="2707239"/>
-            <a:ext cx="1726058" cy="1541123"/>
-          </a:xfrm>
-          <a:prstGeom prst="roundRect">
-            <a:avLst/>
-          </a:prstGeom>
-        </p:spPr>
-        <p:style>
-          <a:lnRef idx="2">
-            <a:schemeClr val="accent1">
-              <a:shade val="15000"/>
-            </a:schemeClr>
-          </a:lnRef>
-          <a:fillRef idx="1">
-            <a:schemeClr val="accent1"/>
-          </a:fillRef>
-          <a:effectRef idx="0">
-            <a:schemeClr val="accent1"/>
-          </a:effectRef>
-          <a:fontRef idx="minor">
-            <a:schemeClr val="lt1"/>
-          </a:fontRef>
-        </p:style>
-        <p:txBody>
-          <a:bodyPr rtlCol="0" anchor="ctr"/>
-          <a:lstStyle/>
-          <a:p>
-            <a:pPr algn="ctr"/>
-            <a:endParaRPr lang="en-GB"/>
-          </a:p>
-        </p:txBody>
-      </p:sp>
       <p:sp>
         <p:nvSpPr>
           <p:cNvPr id="28" name="TextBox 27">
@@ -7347,8 +8500,8 @@
         </p:nvSpPr>
         <p:spPr>
           <a:xfrm>
-            <a:off x="8654658" y="4469258"/>
-            <a:ext cx="1951753" cy="369332"/>
+            <a:off x="8814639" y="4469258"/>
+            <a:ext cx="1631793" cy="369332"/>
           </a:xfrm>
           <a:prstGeom prst="rect">
             <a:avLst/>
@@ -7364,17 +8517,46 @@
             <a:pPr algn="ctr"/>
             <a:r>
               <a:rPr lang="en-US" dirty="0"/>
-              <a:t>ARTICLE SEARCHES</a:t>
-            </a:r>
+              <a:t>WHAT IS NEXT?</a:t>
+            </a:r>
+          </a:p>
+        </p:txBody>
+      </p:sp>
+      <p:sp>
+        <p:nvSpPr>
+          <p:cNvPr id="5" name="Slide Number Placeholder 4">
+            <a:extLst>
+              <a:ext uri="{FF2B5EF4-FFF2-40B4-BE49-F238E27FC236}">
+                <a16:creationId xmlns:a16="http://schemas.microsoft.com/office/drawing/2014/main" id="{23AEC3DF-CD72-34CD-956B-B7BB00135A83}"/>
+              </a:ext>
+            </a:extLst>
+          </p:cNvPr>
+          <p:cNvSpPr>
+            <a:spLocks noGrp="1"/>
+          </p:cNvSpPr>
+          <p:nvPr>
+            <p:ph type="sldNum" sz="quarter" idx="12"/>
+          </p:nvPr>
+        </p:nvSpPr>
+        <p:spPr/>
+        <p:txBody>
+          <a:bodyPr/>
+          <a:lstStyle/>
+          <a:p>
+            <a:fld id="{D3726DCB-FEA5-4222-BB45-1CC90DF962E6}" type="slidenum">
+              <a:rPr lang="en-GB" smtClean="0"/>
+              <a:t>2</a:t>
+            </a:fld>
+            <a:endParaRPr lang="en-GB"/>
           </a:p>
         </p:txBody>
       </p:sp>
       <p:pic>
         <p:nvPicPr>
-          <p:cNvPr id="4" name="Graphic 3" descr="Document outline">
+          <p:cNvPr id="7" name="Graphic 6" descr="Signpost outline">
             <a:extLst>
               <a:ext uri="{FF2B5EF4-FFF2-40B4-BE49-F238E27FC236}">
-                <a16:creationId xmlns:a16="http://schemas.microsoft.com/office/drawing/2014/main" id="{C91C3543-115C-A4F3-BC64-B38A1BD0D772}"/>
+                <a16:creationId xmlns:a16="http://schemas.microsoft.com/office/drawing/2014/main" id="{3478E47B-3487-5A38-739A-75A7EE015E55}"/>
               </a:ext>
             </a:extLst>
           </p:cNvPr>
@@ -7400,7 +8582,7 @@
         </p:blipFill>
         <p:spPr>
           <a:xfrm>
-            <a:off x="9173334" y="2971799"/>
+            <a:off x="9173334" y="3020600"/>
             <a:ext cx="914400" cy="914400"/>
           </a:xfrm>
           <a:prstGeom prst="rect">
@@ -7522,6 +8704,42 @@
           <a:chExt cx="0" cy="0"/>
         </a:xfrm>
       </p:grpSpPr>
+      <p:pic>
+        <p:nvPicPr>
+          <p:cNvPr id="18" name="Picture 17" descr="A diagram of a person's mind map&#10;&#10;Description automatically generated">
+            <a:extLst>
+              <a:ext uri="{FF2B5EF4-FFF2-40B4-BE49-F238E27FC236}">
+                <a16:creationId xmlns:a16="http://schemas.microsoft.com/office/drawing/2014/main" id="{B597DDEB-EEF5-95E8-0C12-339672F1D10C}"/>
+              </a:ext>
+            </a:extLst>
+          </p:cNvPr>
+          <p:cNvPicPr>
+            <a:picLocks noChangeAspect="1"/>
+          </p:cNvPicPr>
+          <p:nvPr/>
+        </p:nvPicPr>
+        <p:blipFill>
+          <a:blip r:embed="rId2">
+            <a:extLst>
+              <a:ext uri="{28A0092B-C50C-407E-A947-70E740481C1C}">
+                <a14:useLocalDpi xmlns:a14="http://schemas.microsoft.com/office/drawing/2010/main" val="0"/>
+              </a:ext>
+            </a:extLst>
+          </a:blip>
+          <a:stretch>
+            <a:fillRect/>
+          </a:stretch>
+        </p:blipFill>
+        <p:spPr>
+          <a:xfrm>
+            <a:off x="932156" y="1318391"/>
+            <a:ext cx="7938122" cy="4853205"/>
+          </a:xfrm>
+          <a:prstGeom prst="rect">
+            <a:avLst/>
+          </a:prstGeom>
+        </p:spPr>
+      </p:pic>
       <p:sp>
         <p:nvSpPr>
           <p:cNvPr id="10" name="TextBox 9">
@@ -7668,42 +8886,533 @@
           </a:p>
         </p:txBody>
       </p:sp>
-      <p:pic>
-        <p:nvPicPr>
-          <p:cNvPr id="5" name="Picture 4" descr="A diagram of a person with text&#10;&#10;Description automatically generated with medium confidence">
+      <p:sp>
+        <p:nvSpPr>
+          <p:cNvPr id="7" name="Rectangle: Rounded Corners 6">
             <a:extLst>
               <a:ext uri="{FF2B5EF4-FFF2-40B4-BE49-F238E27FC236}">
-                <a16:creationId xmlns:a16="http://schemas.microsoft.com/office/drawing/2014/main" id="{425E7C17-E2E0-DB91-D1D3-F104D31C823A}"/>
+                <a16:creationId xmlns:a16="http://schemas.microsoft.com/office/drawing/2014/main" id="{C17CB13B-E901-5B0A-8349-1A54F83A8834}"/>
               </a:ext>
             </a:extLst>
           </p:cNvPr>
-          <p:cNvPicPr>
-            <a:picLocks noChangeAspect="1"/>
-          </p:cNvPicPr>
+          <p:cNvSpPr/>
           <p:nvPr/>
-        </p:nvPicPr>
-        <p:blipFill>
-          <a:blip r:embed="rId2">
+        </p:nvSpPr>
+        <p:spPr>
+          <a:xfrm>
+            <a:off x="9396701" y="2522876"/>
+            <a:ext cx="2237175" cy="562824"/>
+          </a:xfrm>
+          <a:prstGeom prst="roundRect">
+            <a:avLst/>
+          </a:prstGeom>
+        </p:spPr>
+        <p:style>
+          <a:lnRef idx="2">
+            <a:schemeClr val="accent1">
+              <a:shade val="15000"/>
+            </a:schemeClr>
+          </a:lnRef>
+          <a:fillRef idx="1">
+            <a:schemeClr val="accent1"/>
+          </a:fillRef>
+          <a:effectRef idx="0">
+            <a:schemeClr val="accent1"/>
+          </a:effectRef>
+          <a:fontRef idx="minor">
+            <a:schemeClr val="lt1"/>
+          </a:fontRef>
+        </p:style>
+        <p:txBody>
+          <a:bodyPr rtlCol="0" anchor="ctr"/>
+          <a:lstStyle/>
+          <a:p>
+            <a:pPr algn="ctr"/>
+            <a:endParaRPr lang="en-GB" dirty="0"/>
+          </a:p>
+        </p:txBody>
+      </p:sp>
+      <p:sp>
+        <p:nvSpPr>
+          <p:cNvPr id="6" name="TextBox 5">
             <a:extLst>
-              <a:ext uri="{28A0092B-C50C-407E-A947-70E740481C1C}">
-                <a14:useLocalDpi xmlns:a14="http://schemas.microsoft.com/office/drawing/2010/main" val="0"/>
+              <a:ext uri="{FF2B5EF4-FFF2-40B4-BE49-F238E27FC236}">
+                <a16:creationId xmlns:a16="http://schemas.microsoft.com/office/drawing/2014/main" id="{D81FD54A-A947-EFCC-5FD9-69780A567830}"/>
               </a:ext>
             </a:extLst>
-          </a:blip>
-          <a:stretch>
-            <a:fillRect/>
-          </a:stretch>
-        </p:blipFill>
+          </p:cNvPr>
+          <p:cNvSpPr txBox="1"/>
+          <p:nvPr/>
+        </p:nvSpPr>
         <p:spPr>
           <a:xfrm>
-            <a:off x="1965620" y="1339315"/>
-            <a:ext cx="8260760" cy="4822510"/>
+            <a:off x="9396701" y="2522876"/>
+            <a:ext cx="2237175" cy="562824"/>
           </a:xfrm>
           <a:prstGeom prst="rect">
             <a:avLst/>
           </a:prstGeom>
+          <a:noFill/>
         </p:spPr>
-      </p:pic>
+        <p:txBody>
+          <a:bodyPr wrap="square">
+            <a:normAutofit fontScale="85000" lnSpcReduction="20000"/>
+          </a:bodyPr>
+          <a:lstStyle/>
+          <a:p>
+            <a:pPr algn="ctr"/>
+            <a:r>
+              <a:rPr lang="en-US" sz="1400" dirty="0"/>
+              <a:t>What different ways can nodes go offline? Can we detect if a node is offline?</a:t>
+            </a:r>
+            <a:endParaRPr lang="en-GB" sz="1400" dirty="0"/>
+          </a:p>
+        </p:txBody>
+      </p:sp>
+      <p:sp>
+        <p:nvSpPr>
+          <p:cNvPr id="11" name="Rectangle: Rounded Corners 10">
+            <a:extLst>
+              <a:ext uri="{FF2B5EF4-FFF2-40B4-BE49-F238E27FC236}">
+                <a16:creationId xmlns:a16="http://schemas.microsoft.com/office/drawing/2014/main" id="{A6579307-C72F-D609-0576-3CA9714E9439}"/>
+              </a:ext>
+            </a:extLst>
+          </p:cNvPr>
+          <p:cNvSpPr/>
+          <p:nvPr/>
+        </p:nvSpPr>
+        <p:spPr>
+          <a:xfrm>
+            <a:off x="9396700" y="1908160"/>
+            <a:ext cx="2237175" cy="562824"/>
+          </a:xfrm>
+          <a:prstGeom prst="roundRect">
+            <a:avLst/>
+          </a:prstGeom>
+        </p:spPr>
+        <p:style>
+          <a:lnRef idx="2">
+            <a:schemeClr val="accent1">
+              <a:shade val="15000"/>
+            </a:schemeClr>
+          </a:lnRef>
+          <a:fillRef idx="1">
+            <a:schemeClr val="accent1"/>
+          </a:fillRef>
+          <a:effectRef idx="0">
+            <a:schemeClr val="accent1"/>
+          </a:effectRef>
+          <a:fontRef idx="minor">
+            <a:schemeClr val="lt1"/>
+          </a:fontRef>
+        </p:style>
+        <p:txBody>
+          <a:bodyPr rtlCol="0" anchor="ctr"/>
+          <a:lstStyle/>
+          <a:p>
+            <a:pPr algn="ctr"/>
+            <a:endParaRPr lang="en-GB" dirty="0"/>
+          </a:p>
+        </p:txBody>
+      </p:sp>
+      <p:sp>
+        <p:nvSpPr>
+          <p:cNvPr id="8" name="TextBox 7">
+            <a:extLst>
+              <a:ext uri="{FF2B5EF4-FFF2-40B4-BE49-F238E27FC236}">
+                <a16:creationId xmlns:a16="http://schemas.microsoft.com/office/drawing/2014/main" id="{5C583157-4AA1-418C-C8AC-7FB69545DA72}"/>
+              </a:ext>
+            </a:extLst>
+          </p:cNvPr>
+          <p:cNvSpPr txBox="1"/>
+          <p:nvPr/>
+        </p:nvSpPr>
+        <p:spPr>
+          <a:xfrm>
+            <a:off x="9396698" y="1908160"/>
+            <a:ext cx="2237175" cy="562824"/>
+          </a:xfrm>
+          <a:prstGeom prst="rect">
+            <a:avLst/>
+          </a:prstGeom>
+          <a:noFill/>
+        </p:spPr>
+        <p:txBody>
+          <a:bodyPr wrap="square">
+            <a:normAutofit fontScale="77500" lnSpcReduction="20000"/>
+          </a:bodyPr>
+          <a:lstStyle/>
+          <a:p>
+            <a:pPr algn="ctr"/>
+            <a:r>
+              <a:rPr lang="en-US" sz="1400" dirty="0"/>
+              <a:t>How do we deal with missing nodes? Does the way a node went missing determine what we do?</a:t>
+            </a:r>
+            <a:endParaRPr lang="en-GB" sz="1400" dirty="0"/>
+          </a:p>
+        </p:txBody>
+      </p:sp>
+      <p:sp>
+        <p:nvSpPr>
+          <p:cNvPr id="13" name="Rectangle: Rounded Corners 12">
+            <a:extLst>
+              <a:ext uri="{FF2B5EF4-FFF2-40B4-BE49-F238E27FC236}">
+                <a16:creationId xmlns:a16="http://schemas.microsoft.com/office/drawing/2014/main" id="{F5B1AED6-1697-FE06-BE46-2151F6022E70}"/>
+              </a:ext>
+            </a:extLst>
+          </p:cNvPr>
+          <p:cNvSpPr/>
+          <p:nvPr/>
+        </p:nvSpPr>
+        <p:spPr>
+          <a:xfrm>
+            <a:off x="9419205" y="4376343"/>
+            <a:ext cx="2237175" cy="574665"/>
+          </a:xfrm>
+          <a:prstGeom prst="roundRect">
+            <a:avLst/>
+          </a:prstGeom>
+        </p:spPr>
+        <p:style>
+          <a:lnRef idx="2">
+            <a:schemeClr val="accent1">
+              <a:shade val="15000"/>
+            </a:schemeClr>
+          </a:lnRef>
+          <a:fillRef idx="1">
+            <a:schemeClr val="accent1"/>
+          </a:fillRef>
+          <a:effectRef idx="0">
+            <a:schemeClr val="accent1"/>
+          </a:effectRef>
+          <a:fontRef idx="minor">
+            <a:schemeClr val="lt1"/>
+          </a:fontRef>
+        </p:style>
+        <p:txBody>
+          <a:bodyPr rtlCol="0" anchor="ctr"/>
+          <a:lstStyle/>
+          <a:p>
+            <a:pPr algn="ctr"/>
+            <a:endParaRPr lang="en-GB" dirty="0"/>
+          </a:p>
+        </p:txBody>
+      </p:sp>
+      <p:sp>
+        <p:nvSpPr>
+          <p:cNvPr id="12" name="TextBox 11">
+            <a:extLst>
+              <a:ext uri="{FF2B5EF4-FFF2-40B4-BE49-F238E27FC236}">
+                <a16:creationId xmlns:a16="http://schemas.microsoft.com/office/drawing/2014/main" id="{C29278B9-BCC0-A549-C5BA-35BE5D83B6B2}"/>
+              </a:ext>
+            </a:extLst>
+          </p:cNvPr>
+          <p:cNvSpPr txBox="1"/>
+          <p:nvPr/>
+        </p:nvSpPr>
+        <p:spPr>
+          <a:xfrm>
+            <a:off x="9419205" y="4394098"/>
+            <a:ext cx="2237174" cy="562825"/>
+          </a:xfrm>
+          <a:prstGeom prst="rect">
+            <a:avLst/>
+          </a:prstGeom>
+          <a:noFill/>
+        </p:spPr>
+        <p:txBody>
+          <a:bodyPr wrap="square">
+            <a:normAutofit fontScale="85000" lnSpcReduction="20000"/>
+          </a:bodyPr>
+          <a:lstStyle/>
+          <a:p>
+            <a:pPr algn="ctr"/>
+            <a:r>
+              <a:rPr lang="en-US" sz="1400" dirty="0"/>
+              <a:t>Are some nodes more likely to go offline than others? Can we predict this?</a:t>
+            </a:r>
+            <a:endParaRPr lang="en-GB" sz="1400" dirty="0"/>
+          </a:p>
+        </p:txBody>
+      </p:sp>
+      <p:sp>
+        <p:nvSpPr>
+          <p:cNvPr id="16" name="Rectangle: Rounded Corners 15">
+            <a:extLst>
+              <a:ext uri="{FF2B5EF4-FFF2-40B4-BE49-F238E27FC236}">
+                <a16:creationId xmlns:a16="http://schemas.microsoft.com/office/drawing/2014/main" id="{928A172D-4789-594A-C7C5-F96DE266C30C}"/>
+              </a:ext>
+            </a:extLst>
+          </p:cNvPr>
+          <p:cNvSpPr/>
+          <p:nvPr/>
+        </p:nvSpPr>
+        <p:spPr>
+          <a:xfrm>
+            <a:off x="9396701" y="3133930"/>
+            <a:ext cx="2237175" cy="574665"/>
+          </a:xfrm>
+          <a:prstGeom prst="roundRect">
+            <a:avLst/>
+          </a:prstGeom>
+        </p:spPr>
+        <p:style>
+          <a:lnRef idx="2">
+            <a:schemeClr val="accent1">
+              <a:shade val="15000"/>
+            </a:schemeClr>
+          </a:lnRef>
+          <a:fillRef idx="1">
+            <a:schemeClr val="accent1"/>
+          </a:fillRef>
+          <a:effectRef idx="0">
+            <a:schemeClr val="accent1"/>
+          </a:effectRef>
+          <a:fontRef idx="minor">
+            <a:schemeClr val="lt1"/>
+          </a:fontRef>
+        </p:style>
+        <p:txBody>
+          <a:bodyPr rtlCol="0" anchor="ctr"/>
+          <a:lstStyle/>
+          <a:p>
+            <a:pPr algn="ctr"/>
+            <a:endParaRPr lang="en-GB" dirty="0"/>
+          </a:p>
+        </p:txBody>
+      </p:sp>
+      <p:sp>
+        <p:nvSpPr>
+          <p:cNvPr id="14" name="TextBox 13">
+            <a:extLst>
+              <a:ext uri="{FF2B5EF4-FFF2-40B4-BE49-F238E27FC236}">
+                <a16:creationId xmlns:a16="http://schemas.microsoft.com/office/drawing/2014/main" id="{C8382BAB-4284-6E30-738A-F76878C873E3}"/>
+              </a:ext>
+            </a:extLst>
+          </p:cNvPr>
+          <p:cNvSpPr txBox="1"/>
+          <p:nvPr/>
+        </p:nvSpPr>
+        <p:spPr>
+          <a:xfrm>
+            <a:off x="9419205" y="3161244"/>
+            <a:ext cx="2214670" cy="535512"/>
+          </a:xfrm>
+          <a:prstGeom prst="rect">
+            <a:avLst/>
+          </a:prstGeom>
+          <a:noFill/>
+        </p:spPr>
+        <p:txBody>
+          <a:bodyPr wrap="square">
+            <a:normAutofit fontScale="85000" lnSpcReduction="20000"/>
+          </a:bodyPr>
+          <a:lstStyle/>
+          <a:p>
+            <a:pPr algn="ctr"/>
+            <a:r>
+              <a:rPr lang="en-US" sz="1400" dirty="0"/>
+              <a:t>Are some nodes more likely to go offline than others? Can we predict this?</a:t>
+            </a:r>
+            <a:endParaRPr lang="en-GB" sz="1400" dirty="0"/>
+          </a:p>
+        </p:txBody>
+      </p:sp>
+      <p:sp>
+        <p:nvSpPr>
+          <p:cNvPr id="19" name="Rectangle: Rounded Corners 18">
+            <a:extLst>
+              <a:ext uri="{FF2B5EF4-FFF2-40B4-BE49-F238E27FC236}">
+                <a16:creationId xmlns:a16="http://schemas.microsoft.com/office/drawing/2014/main" id="{397C546A-01F7-2044-63B8-FE196A756711}"/>
+              </a:ext>
+            </a:extLst>
+          </p:cNvPr>
+          <p:cNvSpPr/>
+          <p:nvPr/>
+        </p:nvSpPr>
+        <p:spPr>
+          <a:xfrm>
+            <a:off x="9441708" y="5014739"/>
+            <a:ext cx="2214671" cy="574665"/>
+          </a:xfrm>
+          <a:prstGeom prst="roundRect">
+            <a:avLst/>
+          </a:prstGeom>
+        </p:spPr>
+        <p:style>
+          <a:lnRef idx="2">
+            <a:schemeClr val="accent1">
+              <a:shade val="15000"/>
+            </a:schemeClr>
+          </a:lnRef>
+          <a:fillRef idx="1">
+            <a:schemeClr val="accent1"/>
+          </a:fillRef>
+          <a:effectRef idx="0">
+            <a:schemeClr val="accent1"/>
+          </a:effectRef>
+          <a:fontRef idx="minor">
+            <a:schemeClr val="lt1"/>
+          </a:fontRef>
+        </p:style>
+        <p:txBody>
+          <a:bodyPr rtlCol="0" anchor="ctr"/>
+          <a:lstStyle/>
+          <a:p>
+            <a:pPr algn="ctr"/>
+            <a:endParaRPr lang="en-GB" dirty="0"/>
+          </a:p>
+        </p:txBody>
+      </p:sp>
+      <p:sp>
+        <p:nvSpPr>
+          <p:cNvPr id="20" name="TextBox 19">
+            <a:extLst>
+              <a:ext uri="{FF2B5EF4-FFF2-40B4-BE49-F238E27FC236}">
+                <a16:creationId xmlns:a16="http://schemas.microsoft.com/office/drawing/2014/main" id="{2DCAFDB7-16A7-76EB-A056-2DE5E29E341C}"/>
+              </a:ext>
+            </a:extLst>
+          </p:cNvPr>
+          <p:cNvSpPr txBox="1"/>
+          <p:nvPr/>
+        </p:nvSpPr>
+        <p:spPr>
+          <a:xfrm>
+            <a:off x="9441708" y="5055930"/>
+            <a:ext cx="2214670" cy="535512"/>
+          </a:xfrm>
+          <a:prstGeom prst="rect">
+            <a:avLst/>
+          </a:prstGeom>
+          <a:noFill/>
+        </p:spPr>
+        <p:txBody>
+          <a:bodyPr wrap="square">
+            <a:normAutofit fontScale="85000" lnSpcReduction="20000"/>
+          </a:bodyPr>
+          <a:lstStyle/>
+          <a:p>
+            <a:pPr algn="ctr"/>
+            <a:r>
+              <a:rPr lang="en-US" sz="1400" dirty="0"/>
+              <a:t>Will some nodes have more of an influence than others? Do they get more support?</a:t>
+            </a:r>
+            <a:endParaRPr lang="en-GB" sz="1400" dirty="0"/>
+          </a:p>
+        </p:txBody>
+      </p:sp>
+      <p:sp>
+        <p:nvSpPr>
+          <p:cNvPr id="22" name="Rectangle: Rounded Corners 21">
+            <a:extLst>
+              <a:ext uri="{FF2B5EF4-FFF2-40B4-BE49-F238E27FC236}">
+                <a16:creationId xmlns:a16="http://schemas.microsoft.com/office/drawing/2014/main" id="{E8689BF9-9934-EE4D-1FA0-894ACC93294A}"/>
+              </a:ext>
+            </a:extLst>
+          </p:cNvPr>
+          <p:cNvSpPr/>
+          <p:nvPr/>
+        </p:nvSpPr>
+        <p:spPr>
+          <a:xfrm>
+            <a:off x="9419205" y="3760487"/>
+            <a:ext cx="2214671" cy="574665"/>
+          </a:xfrm>
+          <a:prstGeom prst="roundRect">
+            <a:avLst/>
+          </a:prstGeom>
+        </p:spPr>
+        <p:style>
+          <a:lnRef idx="2">
+            <a:schemeClr val="accent1">
+              <a:shade val="15000"/>
+            </a:schemeClr>
+          </a:lnRef>
+          <a:fillRef idx="1">
+            <a:schemeClr val="accent1"/>
+          </a:fillRef>
+          <a:effectRef idx="0">
+            <a:schemeClr val="accent1"/>
+          </a:effectRef>
+          <a:fontRef idx="minor">
+            <a:schemeClr val="lt1"/>
+          </a:fontRef>
+        </p:style>
+        <p:txBody>
+          <a:bodyPr rtlCol="0" anchor="ctr"/>
+          <a:lstStyle/>
+          <a:p>
+            <a:pPr algn="ctr"/>
+            <a:endParaRPr lang="en-GB" dirty="0"/>
+          </a:p>
+        </p:txBody>
+      </p:sp>
+      <p:sp>
+        <p:nvSpPr>
+          <p:cNvPr id="23" name="TextBox 22">
+            <a:extLst>
+              <a:ext uri="{FF2B5EF4-FFF2-40B4-BE49-F238E27FC236}">
+                <a16:creationId xmlns:a16="http://schemas.microsoft.com/office/drawing/2014/main" id="{9FA525A7-1036-E8E6-B222-1296D2249763}"/>
+              </a:ext>
+            </a:extLst>
+          </p:cNvPr>
+          <p:cNvSpPr txBox="1"/>
+          <p:nvPr/>
+        </p:nvSpPr>
+        <p:spPr>
+          <a:xfrm>
+            <a:off x="9419205" y="3787801"/>
+            <a:ext cx="2214670" cy="535512"/>
+          </a:xfrm>
+          <a:prstGeom prst="rect">
+            <a:avLst/>
+          </a:prstGeom>
+          <a:noFill/>
+        </p:spPr>
+        <p:txBody>
+          <a:bodyPr wrap="square">
+            <a:normAutofit fontScale="85000" lnSpcReduction="20000"/>
+          </a:bodyPr>
+          <a:lstStyle/>
+          <a:p>
+            <a:pPr algn="ctr"/>
+            <a:r>
+              <a:rPr lang="en-US" sz="1400" dirty="0"/>
+              <a:t>Can ML/FL models be made adaptable to missing nodes? Can other nodes pick up the slack?</a:t>
+            </a:r>
+            <a:endParaRPr lang="en-GB" sz="1400" dirty="0"/>
+          </a:p>
+        </p:txBody>
+      </p:sp>
+      <p:sp>
+        <p:nvSpPr>
+          <p:cNvPr id="25" name="Slide Number Placeholder 24">
+            <a:extLst>
+              <a:ext uri="{FF2B5EF4-FFF2-40B4-BE49-F238E27FC236}">
+                <a16:creationId xmlns:a16="http://schemas.microsoft.com/office/drawing/2014/main" id="{5D555122-A67E-973E-7070-74B19E51C0CA}"/>
+              </a:ext>
+            </a:extLst>
+          </p:cNvPr>
+          <p:cNvSpPr>
+            <a:spLocks noGrp="1"/>
+          </p:cNvSpPr>
+          <p:nvPr>
+            <p:ph type="sldNum" sz="quarter" idx="12"/>
+          </p:nvPr>
+        </p:nvSpPr>
+        <p:spPr/>
+        <p:txBody>
+          <a:bodyPr/>
+          <a:lstStyle/>
+          <a:p>
+            <a:fld id="{D3726DCB-FEA5-4222-BB45-1CC90DF962E6}" type="slidenum">
+              <a:rPr lang="en-GB" smtClean="0"/>
+              <a:t>4</a:t>
+            </a:fld>
+            <a:endParaRPr lang="en-GB"/>
+          </a:p>
+        </p:txBody>
+      </p:sp>
     </p:spTree>
     <p:extLst>
       <p:ext uri="{BB962C8B-B14F-4D97-AF65-F5344CB8AC3E}">
@@ -7725,7 +9434,7 @@
         <p:cNvPr id="1" name="">
           <a:extLst>
             <a:ext uri="{FF2B5EF4-FFF2-40B4-BE49-F238E27FC236}">
-              <a16:creationId xmlns:a16="http://schemas.microsoft.com/office/drawing/2014/main" id="{A75DFD47-E96D-8B48-0C28-FA7AC6E8305C}"/>
+              <a16:creationId xmlns:a16="http://schemas.microsoft.com/office/drawing/2014/main" id="{CE665F83-FC8F-AD79-1A11-4C9E1BBC1198}"/>
             </a:ext>
           </a:extLst>
         </p:cNvPr>
@@ -7745,7 +9454,7 @@
           <p:cNvPr id="15" name="Rectangle: Rounded Corners 14">
             <a:extLst>
               <a:ext uri="{FF2B5EF4-FFF2-40B4-BE49-F238E27FC236}">
-                <a16:creationId xmlns:a16="http://schemas.microsoft.com/office/drawing/2014/main" id="{67D2BD6C-5B3A-C5A0-94AC-D0ECC15EEFBC}"/>
+                <a16:creationId xmlns:a16="http://schemas.microsoft.com/office/drawing/2014/main" id="{A4606749-4EEB-B3B0-5952-FBE065DCB761}"/>
               </a:ext>
             </a:extLst>
           </p:cNvPr>
@@ -7754,8 +9463,8 @@
         </p:nvSpPr>
         <p:spPr>
           <a:xfrm>
-            <a:off x="5273336" y="132620"/>
-            <a:ext cx="6208897" cy="1112812"/>
+            <a:off x="5211192" y="412970"/>
+            <a:ext cx="6208897" cy="719427"/>
           </a:xfrm>
           <a:prstGeom prst="roundRect">
             <a:avLst/>
@@ -7792,7 +9501,7 @@
           <p:cNvPr id="8" name="TextBox 7">
             <a:extLst>
               <a:ext uri="{FF2B5EF4-FFF2-40B4-BE49-F238E27FC236}">
-                <a16:creationId xmlns:a16="http://schemas.microsoft.com/office/drawing/2014/main" id="{4122F22F-CC6A-21A3-E65B-6D9079943A2F}"/>
+                <a16:creationId xmlns:a16="http://schemas.microsoft.com/office/drawing/2014/main" id="{75270068-906F-74E3-DED9-9B74726E881F}"/>
               </a:ext>
             </a:extLst>
           </p:cNvPr>
@@ -7801,8 +9510,8 @@
         </p:nvSpPr>
         <p:spPr>
           <a:xfrm>
-            <a:off x="5335480" y="257452"/>
-            <a:ext cx="5933689" cy="987980"/>
+            <a:off x="5273336" y="471691"/>
+            <a:ext cx="5933689" cy="658366"/>
           </a:xfrm>
           <a:prstGeom prst="rect">
             <a:avLst/>
@@ -7811,22 +9520,22 @@
         </p:spPr>
         <p:txBody>
           <a:bodyPr wrap="square">
-            <a:normAutofit fontScale="92500" lnSpcReduction="20000"/>
+            <a:normAutofit/>
           </a:bodyPr>
           <a:lstStyle/>
           <a:p>
             <a:pPr algn="ctr"/>
             <a:r>
               <a:rPr lang="en-US" dirty="0"/>
-              <a:t>With the ever-increasing use of IoT devices, </a:t>
+              <a:t>Can we design FL systems that work within a </a:t>
             </a:r>
             <a:r>
               <a:rPr lang="en-US" b="1" dirty="0"/>
-              <a:t>can FL algorithms or tools be designed to operate specifically on Edge devices to minimize computational and costs</a:t>
+              <a:t>distributed multi-task learning system</a:t>
             </a:r>
             <a:r>
               <a:rPr lang="en-US" dirty="0"/>
-              <a:t>. The models should be adaptable to a range of data sources and types.</a:t>
+              <a:t>?</a:t>
             </a:r>
           </a:p>
           <a:p>
@@ -7839,7 +9548,7 @@
           <p:cNvPr id="3" name="Title 1">
             <a:extLst>
               <a:ext uri="{FF2B5EF4-FFF2-40B4-BE49-F238E27FC236}">
-                <a16:creationId xmlns:a16="http://schemas.microsoft.com/office/drawing/2014/main" id="{F48022CB-9AA6-E5AB-13E3-835BF32A1988}"/>
+                <a16:creationId xmlns:a16="http://schemas.microsoft.com/office/drawing/2014/main" id="{2D54498E-2E1C-278F-44CE-3BFE5BB6C639}"/>
               </a:ext>
             </a:extLst>
           </p:cNvPr>
@@ -7892,12 +9601,456 @@
           </a:p>
         </p:txBody>
       </p:sp>
+      <p:sp>
+        <p:nvSpPr>
+          <p:cNvPr id="2" name="Rectangle: Rounded Corners 1">
+            <a:extLst>
+              <a:ext uri="{FF2B5EF4-FFF2-40B4-BE49-F238E27FC236}">
+                <a16:creationId xmlns:a16="http://schemas.microsoft.com/office/drawing/2014/main" id="{B9847C69-25BA-99FD-FCC1-4BFDD2148656}"/>
+              </a:ext>
+            </a:extLst>
+          </p:cNvPr>
+          <p:cNvSpPr/>
+          <p:nvPr/>
+        </p:nvSpPr>
+        <p:spPr>
+          <a:xfrm>
+            <a:off x="9465216" y="4121099"/>
+            <a:ext cx="2214671" cy="574665"/>
+          </a:xfrm>
+          <a:prstGeom prst="roundRect">
+            <a:avLst/>
+          </a:prstGeom>
+        </p:spPr>
+        <p:style>
+          <a:lnRef idx="2">
+            <a:schemeClr val="accent1">
+              <a:shade val="15000"/>
+            </a:schemeClr>
+          </a:lnRef>
+          <a:fillRef idx="1">
+            <a:schemeClr val="accent1"/>
+          </a:fillRef>
+          <a:effectRef idx="0">
+            <a:schemeClr val="accent1"/>
+          </a:effectRef>
+          <a:fontRef idx="minor">
+            <a:schemeClr val="lt1"/>
+          </a:fontRef>
+        </p:style>
+        <p:txBody>
+          <a:bodyPr rtlCol="0" anchor="ctr"/>
+          <a:lstStyle/>
+          <a:p>
+            <a:pPr algn="ctr"/>
+            <a:endParaRPr lang="en-GB" dirty="0"/>
+          </a:p>
+        </p:txBody>
+      </p:sp>
+      <p:sp>
+        <p:nvSpPr>
+          <p:cNvPr id="5" name="TextBox 4">
+            <a:extLst>
+              <a:ext uri="{FF2B5EF4-FFF2-40B4-BE49-F238E27FC236}">
+                <a16:creationId xmlns:a16="http://schemas.microsoft.com/office/drawing/2014/main" id="{6E1994ED-ACC1-453C-1A15-90BADF438356}"/>
+              </a:ext>
+            </a:extLst>
+          </p:cNvPr>
+          <p:cNvSpPr txBox="1"/>
+          <p:nvPr/>
+        </p:nvSpPr>
+        <p:spPr>
+          <a:xfrm>
+            <a:off x="9465217" y="4148413"/>
+            <a:ext cx="2214670" cy="535512"/>
+          </a:xfrm>
+          <a:prstGeom prst="rect">
+            <a:avLst/>
+          </a:prstGeom>
+          <a:noFill/>
+        </p:spPr>
+        <p:txBody>
+          <a:bodyPr wrap="square">
+            <a:normAutofit fontScale="77500" lnSpcReduction="20000"/>
+          </a:bodyPr>
+          <a:lstStyle/>
+          <a:p>
+            <a:pPr algn="ctr"/>
+            <a:r>
+              <a:rPr lang="en-US" sz="1400" dirty="0"/>
+              <a:t>Shared learning can lead to a more efficient systems, which can lead to improved performance?</a:t>
+            </a:r>
+            <a:endParaRPr lang="en-GB" sz="1400" dirty="0"/>
+          </a:p>
+        </p:txBody>
+      </p:sp>
+      <p:sp>
+        <p:nvSpPr>
+          <p:cNvPr id="7" name="Rectangle: Rounded Corners 6">
+            <a:extLst>
+              <a:ext uri="{FF2B5EF4-FFF2-40B4-BE49-F238E27FC236}">
+                <a16:creationId xmlns:a16="http://schemas.microsoft.com/office/drawing/2014/main" id="{039AACAB-F6C4-B140-A2D7-9F1C1AE826D6}"/>
+              </a:ext>
+            </a:extLst>
+          </p:cNvPr>
+          <p:cNvSpPr/>
+          <p:nvPr/>
+        </p:nvSpPr>
+        <p:spPr>
+          <a:xfrm>
+            <a:off x="9465216" y="3476110"/>
+            <a:ext cx="2214671" cy="574665"/>
+          </a:xfrm>
+          <a:prstGeom prst="roundRect">
+            <a:avLst/>
+          </a:prstGeom>
+        </p:spPr>
+        <p:style>
+          <a:lnRef idx="2">
+            <a:schemeClr val="accent1">
+              <a:shade val="15000"/>
+            </a:schemeClr>
+          </a:lnRef>
+          <a:fillRef idx="1">
+            <a:schemeClr val="accent1"/>
+          </a:fillRef>
+          <a:effectRef idx="0">
+            <a:schemeClr val="accent1"/>
+          </a:effectRef>
+          <a:fontRef idx="minor">
+            <a:schemeClr val="lt1"/>
+          </a:fontRef>
+        </p:style>
+        <p:txBody>
+          <a:bodyPr rtlCol="0" anchor="ctr"/>
+          <a:lstStyle/>
+          <a:p>
+            <a:pPr algn="ctr"/>
+            <a:endParaRPr lang="en-GB" dirty="0"/>
+          </a:p>
+        </p:txBody>
+      </p:sp>
+      <p:sp>
+        <p:nvSpPr>
+          <p:cNvPr id="9" name="TextBox 8">
+            <a:extLst>
+              <a:ext uri="{FF2B5EF4-FFF2-40B4-BE49-F238E27FC236}">
+                <a16:creationId xmlns:a16="http://schemas.microsoft.com/office/drawing/2014/main" id="{2AA988B1-CDDF-5E2E-AD41-60F6E6F1B80F}"/>
+              </a:ext>
+            </a:extLst>
+          </p:cNvPr>
+          <p:cNvSpPr txBox="1"/>
+          <p:nvPr/>
+        </p:nvSpPr>
+        <p:spPr>
+          <a:xfrm>
+            <a:off x="9465216" y="3503424"/>
+            <a:ext cx="2214670" cy="535512"/>
+          </a:xfrm>
+          <a:prstGeom prst="rect">
+            <a:avLst/>
+          </a:prstGeom>
+          <a:noFill/>
+        </p:spPr>
+        <p:txBody>
+          <a:bodyPr wrap="square">
+            <a:normAutofit fontScale="85000" lnSpcReduction="20000"/>
+          </a:bodyPr>
+          <a:lstStyle/>
+          <a:p>
+            <a:pPr algn="ctr"/>
+            <a:r>
+              <a:rPr lang="en-US" sz="1400" dirty="0"/>
+              <a:t>Distributed systems can have benefits in privacy – there is no single source of data</a:t>
+            </a:r>
+            <a:endParaRPr lang="en-GB" sz="1400" dirty="0"/>
+          </a:p>
+        </p:txBody>
+      </p:sp>
+      <p:sp>
+        <p:nvSpPr>
+          <p:cNvPr id="10" name="Rectangle: Rounded Corners 9">
+            <a:extLst>
+              <a:ext uri="{FF2B5EF4-FFF2-40B4-BE49-F238E27FC236}">
+                <a16:creationId xmlns:a16="http://schemas.microsoft.com/office/drawing/2014/main" id="{33F4C7AC-8235-3542-1B93-B5263AE0BD4B}"/>
+              </a:ext>
+            </a:extLst>
+          </p:cNvPr>
+          <p:cNvSpPr/>
+          <p:nvPr/>
+        </p:nvSpPr>
+        <p:spPr>
+          <a:xfrm>
+            <a:off x="9449134" y="2162236"/>
+            <a:ext cx="2214671" cy="574665"/>
+          </a:xfrm>
+          <a:prstGeom prst="roundRect">
+            <a:avLst/>
+          </a:prstGeom>
+        </p:spPr>
+        <p:style>
+          <a:lnRef idx="2">
+            <a:schemeClr val="accent1">
+              <a:shade val="15000"/>
+            </a:schemeClr>
+          </a:lnRef>
+          <a:fillRef idx="1">
+            <a:schemeClr val="accent1"/>
+          </a:fillRef>
+          <a:effectRef idx="0">
+            <a:schemeClr val="accent1"/>
+          </a:effectRef>
+          <a:fontRef idx="minor">
+            <a:schemeClr val="lt1"/>
+          </a:fontRef>
+        </p:style>
+        <p:txBody>
+          <a:bodyPr rtlCol="0" anchor="ctr"/>
+          <a:lstStyle/>
+          <a:p>
+            <a:pPr algn="ctr"/>
+            <a:endParaRPr lang="en-GB" dirty="0"/>
+          </a:p>
+        </p:txBody>
+      </p:sp>
+      <p:sp>
+        <p:nvSpPr>
+          <p:cNvPr id="11" name="TextBox 10">
+            <a:extLst>
+              <a:ext uri="{FF2B5EF4-FFF2-40B4-BE49-F238E27FC236}">
+                <a16:creationId xmlns:a16="http://schemas.microsoft.com/office/drawing/2014/main" id="{125072F5-A7EF-09C3-F2CF-8A98038B404C}"/>
+              </a:ext>
+            </a:extLst>
+          </p:cNvPr>
+          <p:cNvSpPr txBox="1"/>
+          <p:nvPr/>
+        </p:nvSpPr>
+        <p:spPr>
+          <a:xfrm>
+            <a:off x="9480093" y="2244400"/>
+            <a:ext cx="2214670" cy="562826"/>
+          </a:xfrm>
+          <a:prstGeom prst="rect">
+            <a:avLst/>
+          </a:prstGeom>
+          <a:noFill/>
+        </p:spPr>
+        <p:txBody>
+          <a:bodyPr wrap="square">
+            <a:normAutofit fontScale="77500" lnSpcReduction="20000"/>
+          </a:bodyPr>
+          <a:lstStyle/>
+          <a:p>
+            <a:pPr algn="ctr"/>
+            <a:r>
+              <a:rPr lang="en-US" sz="1400" dirty="0"/>
+              <a:t>Distributed systems could require a different communications systems (LoRa?)</a:t>
+            </a:r>
+            <a:endParaRPr lang="en-GB" sz="1400" dirty="0"/>
+          </a:p>
+        </p:txBody>
+      </p:sp>
+      <p:sp>
+        <p:nvSpPr>
+          <p:cNvPr id="12" name="Rectangle: Rounded Corners 11">
+            <a:extLst>
+              <a:ext uri="{FF2B5EF4-FFF2-40B4-BE49-F238E27FC236}">
+                <a16:creationId xmlns:a16="http://schemas.microsoft.com/office/drawing/2014/main" id="{2BEBB406-4EE1-7F49-CB20-FCFCE9109217}"/>
+              </a:ext>
+            </a:extLst>
+          </p:cNvPr>
+          <p:cNvSpPr/>
+          <p:nvPr/>
+        </p:nvSpPr>
+        <p:spPr>
+          <a:xfrm>
+            <a:off x="9465217" y="2802245"/>
+            <a:ext cx="2214671" cy="574665"/>
+          </a:xfrm>
+          <a:prstGeom prst="roundRect">
+            <a:avLst/>
+          </a:prstGeom>
+        </p:spPr>
+        <p:style>
+          <a:lnRef idx="2">
+            <a:schemeClr val="accent1">
+              <a:shade val="15000"/>
+            </a:schemeClr>
+          </a:lnRef>
+          <a:fillRef idx="1">
+            <a:schemeClr val="accent1"/>
+          </a:fillRef>
+          <a:effectRef idx="0">
+            <a:schemeClr val="accent1"/>
+          </a:effectRef>
+          <a:fontRef idx="minor">
+            <a:schemeClr val="lt1"/>
+          </a:fontRef>
+        </p:style>
+        <p:txBody>
+          <a:bodyPr rtlCol="0" anchor="ctr"/>
+          <a:lstStyle/>
+          <a:p>
+            <a:pPr algn="ctr"/>
+            <a:endParaRPr lang="en-GB" dirty="0"/>
+          </a:p>
+        </p:txBody>
+      </p:sp>
+      <p:sp>
+        <p:nvSpPr>
+          <p:cNvPr id="13" name="TextBox 12">
+            <a:extLst>
+              <a:ext uri="{FF2B5EF4-FFF2-40B4-BE49-F238E27FC236}">
+                <a16:creationId xmlns:a16="http://schemas.microsoft.com/office/drawing/2014/main" id="{80FEACFC-4BB9-106A-CC00-790D011DCE97}"/>
+              </a:ext>
+            </a:extLst>
+          </p:cNvPr>
+          <p:cNvSpPr txBox="1"/>
+          <p:nvPr/>
+        </p:nvSpPr>
+        <p:spPr>
+          <a:xfrm>
+            <a:off x="9465217" y="2854889"/>
+            <a:ext cx="2214670" cy="510182"/>
+          </a:xfrm>
+          <a:prstGeom prst="rect">
+            <a:avLst/>
+          </a:prstGeom>
+          <a:noFill/>
+        </p:spPr>
+        <p:txBody>
+          <a:bodyPr wrap="square">
+            <a:normAutofit fontScale="85000" lnSpcReduction="10000"/>
+          </a:bodyPr>
+          <a:lstStyle/>
+          <a:p>
+            <a:pPr algn="ctr"/>
+            <a:r>
+              <a:rPr lang="en-US" sz="1400" dirty="0"/>
+              <a:t>Allows for larger, more complex problems to be tackled </a:t>
+            </a:r>
+            <a:endParaRPr lang="en-GB" sz="1400" dirty="0"/>
+          </a:p>
+        </p:txBody>
+      </p:sp>
+      <p:sp>
+        <p:nvSpPr>
+          <p:cNvPr id="14" name="Rectangle: Rounded Corners 13">
+            <a:extLst>
+              <a:ext uri="{FF2B5EF4-FFF2-40B4-BE49-F238E27FC236}">
+                <a16:creationId xmlns:a16="http://schemas.microsoft.com/office/drawing/2014/main" id="{116A4A6C-0422-0C8E-572D-AFCC1761F459}"/>
+              </a:ext>
+            </a:extLst>
+          </p:cNvPr>
+          <p:cNvSpPr/>
+          <p:nvPr/>
+        </p:nvSpPr>
+        <p:spPr>
+          <a:xfrm>
+            <a:off x="9465216" y="4779251"/>
+            <a:ext cx="2244427" cy="574665"/>
+          </a:xfrm>
+          <a:prstGeom prst="roundRect">
+            <a:avLst/>
+          </a:prstGeom>
+        </p:spPr>
+        <p:style>
+          <a:lnRef idx="2">
+            <a:schemeClr val="accent1">
+              <a:shade val="15000"/>
+            </a:schemeClr>
+          </a:lnRef>
+          <a:fillRef idx="1">
+            <a:schemeClr val="accent1"/>
+          </a:fillRef>
+          <a:effectRef idx="0">
+            <a:schemeClr val="accent1"/>
+          </a:effectRef>
+          <a:fontRef idx="minor">
+            <a:schemeClr val="lt1"/>
+          </a:fontRef>
+        </p:style>
+        <p:txBody>
+          <a:bodyPr rtlCol="0" anchor="ctr"/>
+          <a:lstStyle/>
+          <a:p>
+            <a:pPr algn="ctr"/>
+            <a:endParaRPr lang="en-GB" dirty="0"/>
+          </a:p>
+        </p:txBody>
+      </p:sp>
+      <p:sp>
+        <p:nvSpPr>
+          <p:cNvPr id="16" name="TextBox 15">
+            <a:extLst>
+              <a:ext uri="{FF2B5EF4-FFF2-40B4-BE49-F238E27FC236}">
+                <a16:creationId xmlns:a16="http://schemas.microsoft.com/office/drawing/2014/main" id="{3C7DAFD1-7AEB-441A-B531-99FF572A3B97}"/>
+              </a:ext>
+            </a:extLst>
+          </p:cNvPr>
+          <p:cNvSpPr txBox="1"/>
+          <p:nvPr/>
+        </p:nvSpPr>
+        <p:spPr>
+          <a:xfrm>
+            <a:off x="9465215" y="4831895"/>
+            <a:ext cx="2244427" cy="510182"/>
+          </a:xfrm>
+          <a:prstGeom prst="rect">
+            <a:avLst/>
+          </a:prstGeom>
+          <a:noFill/>
+        </p:spPr>
+        <p:txBody>
+          <a:bodyPr wrap="square">
+            <a:normAutofit fontScale="77500" lnSpcReduction="20000"/>
+          </a:bodyPr>
+          <a:lstStyle/>
+          <a:p>
+            <a:pPr algn="ctr"/>
+            <a:r>
+              <a:rPr lang="en-US" sz="1400" dirty="0"/>
+              <a:t>Working with constrained devices in a DMTL system will require synchronization in connections</a:t>
+            </a:r>
+            <a:endParaRPr lang="en-GB" sz="1400" dirty="0"/>
+          </a:p>
+        </p:txBody>
+      </p:sp>
+      <p:sp>
+        <p:nvSpPr>
+          <p:cNvPr id="18" name="Slide Number Placeholder 17">
+            <a:extLst>
+              <a:ext uri="{FF2B5EF4-FFF2-40B4-BE49-F238E27FC236}">
+                <a16:creationId xmlns:a16="http://schemas.microsoft.com/office/drawing/2014/main" id="{81C98557-F02C-D36C-7435-B4AB73CC3437}"/>
+              </a:ext>
+            </a:extLst>
+          </p:cNvPr>
+          <p:cNvSpPr>
+            <a:spLocks noGrp="1"/>
+          </p:cNvSpPr>
+          <p:nvPr>
+            <p:ph type="sldNum" sz="quarter" idx="12"/>
+          </p:nvPr>
+        </p:nvSpPr>
+        <p:spPr/>
+        <p:txBody>
+          <a:bodyPr/>
+          <a:lstStyle/>
+          <a:p>
+            <a:fld id="{D3726DCB-FEA5-4222-BB45-1CC90DF962E6}" type="slidenum">
+              <a:rPr lang="en-GB" smtClean="0"/>
+              <a:t>5</a:t>
+            </a:fld>
+            <a:endParaRPr lang="en-GB"/>
+          </a:p>
+        </p:txBody>
+      </p:sp>
       <p:pic>
         <p:nvPicPr>
-          <p:cNvPr id="5" name="Picture 4" descr="A diagram of a company&#10;&#10;Description automatically generated with medium confidence">
+          <p:cNvPr id="20" name="Picture 19" descr="A diagram of a flowchart&#10;&#10;Description automatically generated">
             <a:extLst>
               <a:ext uri="{FF2B5EF4-FFF2-40B4-BE49-F238E27FC236}">
-                <a16:creationId xmlns:a16="http://schemas.microsoft.com/office/drawing/2014/main" id="{51F48AE8-C823-16D1-87BC-5F7EEC1A80B6}"/>
+                <a16:creationId xmlns:a16="http://schemas.microsoft.com/office/drawing/2014/main" id="{2739967D-8659-6E7B-E8F0-B9F05B82D844}"/>
               </a:ext>
             </a:extLst>
           </p:cNvPr>
@@ -7920,8 +10073,8 @@
         </p:blipFill>
         <p:spPr>
           <a:xfrm>
-            <a:off x="2168295" y="1370264"/>
-            <a:ext cx="7855409" cy="4860668"/>
+            <a:off x="841588" y="1451853"/>
+            <a:ext cx="7558521" cy="4815597"/>
           </a:xfrm>
           <a:prstGeom prst="rect">
             <a:avLst/>
@@ -7931,7 +10084,7 @@
     </p:spTree>
     <p:extLst>
       <p:ext uri="{BB962C8B-B14F-4D97-AF65-F5344CB8AC3E}">
-        <p14:creationId xmlns:p14="http://schemas.microsoft.com/office/powerpoint/2010/main" val="788743055"/>
+        <p14:creationId xmlns:p14="http://schemas.microsoft.com/office/powerpoint/2010/main" val="1816625563"/>
       </p:ext>
     </p:extLst>
   </p:cSld>
@@ -7949,7 +10102,7 @@
         <p:cNvPr id="1" name="">
           <a:extLst>
             <a:ext uri="{FF2B5EF4-FFF2-40B4-BE49-F238E27FC236}">
-              <a16:creationId xmlns:a16="http://schemas.microsoft.com/office/drawing/2014/main" id="{CE665F83-FC8F-AD79-1A11-4C9E1BBC1198}"/>
+              <a16:creationId xmlns:a16="http://schemas.microsoft.com/office/drawing/2014/main" id="{57CDB7E2-D2E6-8925-4F5B-B2741E365FD8}"/>
             </a:ext>
           </a:extLst>
         </p:cNvPr>
@@ -7969,7 +10122,7 @@
           <p:cNvPr id="15" name="Rectangle: Rounded Corners 14">
             <a:extLst>
               <a:ext uri="{FF2B5EF4-FFF2-40B4-BE49-F238E27FC236}">
-                <a16:creationId xmlns:a16="http://schemas.microsoft.com/office/drawing/2014/main" id="{A4606749-4EEB-B3B0-5952-FBE065DCB761}"/>
+                <a16:creationId xmlns:a16="http://schemas.microsoft.com/office/drawing/2014/main" id="{A8E7C9D0-73CD-6E5F-4ED1-688BDA99F0C9}"/>
               </a:ext>
             </a:extLst>
           </p:cNvPr>
@@ -7978,8 +10131,8 @@
         </p:nvSpPr>
         <p:spPr>
           <a:xfrm>
-            <a:off x="5273336" y="132620"/>
-            <a:ext cx="6208897" cy="1112812"/>
+            <a:off x="5273336" y="435580"/>
+            <a:ext cx="6208897" cy="730144"/>
           </a:xfrm>
           <a:prstGeom prst="roundRect">
             <a:avLst/>
@@ -8016,7 +10169,7 @@
           <p:cNvPr id="8" name="TextBox 7">
             <a:extLst>
               <a:ext uri="{FF2B5EF4-FFF2-40B4-BE49-F238E27FC236}">
-                <a16:creationId xmlns:a16="http://schemas.microsoft.com/office/drawing/2014/main" id="{75270068-906F-74E3-DED9-9B74726E881F}"/>
+                <a16:creationId xmlns:a16="http://schemas.microsoft.com/office/drawing/2014/main" id="{6C0F12F4-24FC-492A-8834-CEBD26CB31E4}"/>
               </a:ext>
             </a:extLst>
           </p:cNvPr>
@@ -8025,8 +10178,8 @@
         </p:nvSpPr>
         <p:spPr>
           <a:xfrm>
-            <a:off x="5335480" y="257452"/>
-            <a:ext cx="5933689" cy="987980"/>
+            <a:off x="5335480" y="515288"/>
+            <a:ext cx="5933689" cy="570729"/>
           </a:xfrm>
           <a:prstGeom prst="rect">
             <a:avLst/>
@@ -8035,14 +10188,14 @@
         </p:spPr>
         <p:txBody>
           <a:bodyPr wrap="square">
-            <a:normAutofit/>
+            <a:normAutofit fontScale="92500" lnSpcReduction="10000"/>
           </a:bodyPr>
           <a:lstStyle/>
           <a:p>
             <a:pPr algn="ctr"/>
             <a:r>
               <a:rPr lang="en-US" dirty="0"/>
-              <a:t>Can we design FL systems that work within a distributed multi-task learning system?</a:t>
+              <a:t>Can we introduce multivariate data (MVD) to a FL network? What must be considered when working with MVD?</a:t>
             </a:r>
           </a:p>
           <a:p>
@@ -8055,7 +10208,7 @@
           <p:cNvPr id="3" name="Title 1">
             <a:extLst>
               <a:ext uri="{FF2B5EF4-FFF2-40B4-BE49-F238E27FC236}">
-                <a16:creationId xmlns:a16="http://schemas.microsoft.com/office/drawing/2014/main" id="{2D54498E-2E1C-278F-44CE-3BFE5BB6C639}"/>
+                <a16:creationId xmlns:a16="http://schemas.microsoft.com/office/drawing/2014/main" id="{546C1097-9E88-BBC4-17C5-E68E3FDD9D52}"/>
               </a:ext>
             </a:extLst>
           </p:cNvPr>
@@ -8110,10 +10263,10 @@
       </p:sp>
       <p:pic>
         <p:nvPicPr>
-          <p:cNvPr id="4" name="Picture 3" descr="A diagram of a flowchart&#10;&#10;Description automatically generated">
+          <p:cNvPr id="6" name="Picture 5" descr="A diagram of a data system&#10;&#10;Description automatically generated">
             <a:extLst>
               <a:ext uri="{FF2B5EF4-FFF2-40B4-BE49-F238E27FC236}">
-                <a16:creationId xmlns:a16="http://schemas.microsoft.com/office/drawing/2014/main" id="{52BE103E-19D1-4D2A-5327-9DFA22AD801C}"/>
+                <a16:creationId xmlns:a16="http://schemas.microsoft.com/office/drawing/2014/main" id="{F9F984DD-124A-3185-0D2B-083A23F13092}"/>
               </a:ext>
             </a:extLst>
           </p:cNvPr>
@@ -8136,18 +10289,47 @@
         </p:blipFill>
         <p:spPr>
           <a:xfrm>
-            <a:off x="260415" y="1385504"/>
-            <a:ext cx="7668129" cy="4885430"/>
+            <a:off x="3146256" y="1328031"/>
+            <a:ext cx="5899488" cy="4852462"/>
           </a:xfrm>
           <a:prstGeom prst="rect">
             <a:avLst/>
           </a:prstGeom>
         </p:spPr>
       </p:pic>
+      <p:sp>
+        <p:nvSpPr>
+          <p:cNvPr id="10" name="Slide Number Placeholder 9">
+            <a:extLst>
+              <a:ext uri="{FF2B5EF4-FFF2-40B4-BE49-F238E27FC236}">
+                <a16:creationId xmlns:a16="http://schemas.microsoft.com/office/drawing/2014/main" id="{AF3988F8-A243-9C5E-A4DF-E67955ABEE98}"/>
+              </a:ext>
+            </a:extLst>
+          </p:cNvPr>
+          <p:cNvSpPr>
+            <a:spLocks noGrp="1"/>
+          </p:cNvSpPr>
+          <p:nvPr>
+            <p:ph type="sldNum" sz="quarter" idx="12"/>
+          </p:nvPr>
+        </p:nvSpPr>
+        <p:spPr/>
+        <p:txBody>
+          <a:bodyPr/>
+          <a:lstStyle/>
+          <a:p>
+            <a:fld id="{D3726DCB-FEA5-4222-BB45-1CC90DF962E6}" type="slidenum">
+              <a:rPr lang="en-GB" smtClean="0"/>
+              <a:t>6</a:t>
+            </a:fld>
+            <a:endParaRPr lang="en-GB"/>
+          </a:p>
+        </p:txBody>
+      </p:sp>
     </p:spTree>
     <p:extLst>
       <p:ext uri="{BB962C8B-B14F-4D97-AF65-F5344CB8AC3E}">
-        <p14:creationId xmlns:p14="http://schemas.microsoft.com/office/powerpoint/2010/main" val="1816625563"/>
+        <p14:creationId xmlns:p14="http://schemas.microsoft.com/office/powerpoint/2010/main" val="1050643754"/>
       </p:ext>
     </p:extLst>
   </p:cSld>
@@ -8165,7 +10347,7 @@
         <p:cNvPr id="1" name="">
           <a:extLst>
             <a:ext uri="{FF2B5EF4-FFF2-40B4-BE49-F238E27FC236}">
-              <a16:creationId xmlns:a16="http://schemas.microsoft.com/office/drawing/2014/main" id="{57CDB7E2-D2E6-8925-4F5B-B2741E365FD8}"/>
+              <a16:creationId xmlns:a16="http://schemas.microsoft.com/office/drawing/2014/main" id="{63DD0E09-0112-DA2D-87F8-0C025DFD8B83}"/>
             </a:ext>
           </a:extLst>
         </p:cNvPr>
@@ -8182,188 +10364,62 @@
       </p:grpSpPr>
       <p:sp>
         <p:nvSpPr>
-          <p:cNvPr id="15" name="Rectangle: Rounded Corners 14">
+          <p:cNvPr id="4" name="Title 3">
             <a:extLst>
               <a:ext uri="{FF2B5EF4-FFF2-40B4-BE49-F238E27FC236}">
-                <a16:creationId xmlns:a16="http://schemas.microsoft.com/office/drawing/2014/main" id="{A8E7C9D0-73CD-6E5F-4ED1-688BDA99F0C9}"/>
+                <a16:creationId xmlns:a16="http://schemas.microsoft.com/office/drawing/2014/main" id="{7BA22027-27B1-D9EB-8EFB-ADC3ECCC5B0A}"/>
               </a:ext>
             </a:extLst>
           </p:cNvPr>
-          <p:cNvSpPr/>
-          <p:nvPr/>
-        </p:nvSpPr>
-        <p:spPr>
-          <a:xfrm>
-            <a:off x="5273336" y="132620"/>
-            <a:ext cx="6208897" cy="1112812"/>
-          </a:xfrm>
-          <a:prstGeom prst="roundRect">
-            <a:avLst/>
-          </a:prstGeom>
-          <a:noFill/>
-        </p:spPr>
-        <p:style>
-          <a:lnRef idx="2">
-            <a:schemeClr val="accent1">
-              <a:shade val="15000"/>
-            </a:schemeClr>
-          </a:lnRef>
-          <a:fillRef idx="1">
-            <a:schemeClr val="accent1"/>
-          </a:fillRef>
-          <a:effectRef idx="0">
-            <a:schemeClr val="accent1"/>
-          </a:effectRef>
-          <a:fontRef idx="minor">
-            <a:schemeClr val="lt1"/>
-          </a:fontRef>
-        </p:style>
-        <p:txBody>
-          <a:bodyPr rtlCol="0" anchor="ctr"/>
+          <p:cNvSpPr>
+            <a:spLocks noGrp="1"/>
+          </p:cNvSpPr>
+          <p:nvPr>
+            <p:ph type="ctrTitle"/>
+          </p:nvPr>
+        </p:nvSpPr>
+        <p:spPr/>
+        <p:txBody>
+          <a:bodyPr/>
           <a:lstStyle/>
           <a:p>
-            <a:pPr algn="ctr"/>
-            <a:endParaRPr lang="en-GB"/>
-          </a:p>
-        </p:txBody>
-      </p:sp>
-      <p:sp>
-        <p:nvSpPr>
-          <p:cNvPr id="8" name="TextBox 7">
+            <a:r>
+              <a:rPr lang="en-US" dirty="0"/>
+              <a:t>Federated Learning System Graphic</a:t>
+            </a:r>
+            <a:endParaRPr lang="en-GB" dirty="0"/>
+          </a:p>
+        </p:txBody>
+      </p:sp>
+      <p:sp>
+        <p:nvSpPr>
+          <p:cNvPr id="5" name="Subtitle 4">
             <a:extLst>
               <a:ext uri="{FF2B5EF4-FFF2-40B4-BE49-F238E27FC236}">
-                <a16:creationId xmlns:a16="http://schemas.microsoft.com/office/drawing/2014/main" id="{6C0F12F4-24FC-492A-8834-CEBD26CB31E4}"/>
+                <a16:creationId xmlns:a16="http://schemas.microsoft.com/office/drawing/2014/main" id="{295B6055-BFF1-B53A-CC75-C3615A5F460C}"/>
               </a:ext>
             </a:extLst>
           </p:cNvPr>
-          <p:cNvSpPr txBox="1"/>
-          <p:nvPr/>
-        </p:nvSpPr>
-        <p:spPr>
-          <a:xfrm>
-            <a:off x="5335480" y="257452"/>
-            <a:ext cx="5933689" cy="987980"/>
-          </a:xfrm>
-          <a:prstGeom prst="rect">
-            <a:avLst/>
-          </a:prstGeom>
-          <a:noFill/>
-        </p:spPr>
-        <p:txBody>
-          <a:bodyPr wrap="square">
-            <a:normAutofit/>
-          </a:bodyPr>
+          <p:cNvSpPr>
+            <a:spLocks noGrp="1"/>
+          </p:cNvSpPr>
+          <p:nvPr>
+            <p:ph type="subTitle" idx="1"/>
+          </p:nvPr>
+        </p:nvSpPr>
+        <p:spPr/>
+        <p:txBody>
+          <a:bodyPr/>
           <a:lstStyle/>
           <a:p>
-            <a:pPr algn="ctr"/>
-            <a:r>
-              <a:rPr lang="en-US" dirty="0"/>
-              <a:t>Multi-variate Data</a:t>
-            </a:r>
-          </a:p>
-          <a:p>
-            <a:endParaRPr lang="en-US" dirty="0"/>
-          </a:p>
-        </p:txBody>
-      </p:sp>
-      <p:sp>
-        <p:nvSpPr>
-          <p:cNvPr id="3" name="Title 1">
-            <a:extLst>
-              <a:ext uri="{FF2B5EF4-FFF2-40B4-BE49-F238E27FC236}">
-                <a16:creationId xmlns:a16="http://schemas.microsoft.com/office/drawing/2014/main" id="{546C1097-9E88-BBC4-17C5-E68E3FDD9D52}"/>
-              </a:ext>
-            </a:extLst>
-          </p:cNvPr>
-          <p:cNvSpPr txBox="1">
-            <a:spLocks/>
-          </p:cNvSpPr>
-          <p:nvPr/>
-        </p:nvSpPr>
-        <p:spPr>
-          <a:xfrm>
-            <a:off x="1162975" y="329312"/>
-            <a:ext cx="3959441" cy="719427"/>
-          </a:xfrm>
-          <a:prstGeom prst="rect">
-            <a:avLst/>
-          </a:prstGeom>
-        </p:spPr>
-        <p:txBody>
-          <a:bodyPr vert="horz" lIns="91440" tIns="45720" rIns="91440" bIns="45720" rtlCol="0" anchor="b">
-            <a:normAutofit fontScale="75000" lnSpcReduction="20000"/>
-          </a:bodyPr>
-          <a:lstStyle>
-            <a:lvl1pPr algn="l" defTabSz="914400" rtl="0" eaLnBrk="1" latinLnBrk="0" hangingPunct="1">
-              <a:lnSpc>
-                <a:spcPct val="85000"/>
-              </a:lnSpc>
-              <a:spcBef>
-                <a:spcPct val="0"/>
-              </a:spcBef>
-              <a:buNone/>
-              <a:defRPr sz="4800" kern="1200" spc="-50" baseline="0">
-                <a:solidFill>
-                  <a:schemeClr val="tx1">
-                    <a:lumMod val="75000"/>
-                    <a:lumOff val="25000"/>
-                  </a:schemeClr>
-                </a:solidFill>
-                <a:latin typeface="+mj-lt"/>
-                <a:ea typeface="+mj-ea"/>
-                <a:cs typeface="+mj-cs"/>
-              </a:defRPr>
-            </a:lvl1pPr>
-          </a:lstStyle>
-          <a:p>
-            <a:r>
-              <a:rPr lang="en-US" dirty="0"/>
-              <a:t>Research Question 4</a:t>
-            </a:r>
-            <a:endParaRPr lang="en-GB" dirty="0"/>
-          </a:p>
-        </p:txBody>
-      </p:sp>
-      <p:pic>
-        <p:nvPicPr>
-          <p:cNvPr id="7" name="Picture 6" descr="A diagram of a diagram&#10;&#10;Description automatically generated with medium confidence">
-            <a:extLst>
-              <a:ext uri="{FF2B5EF4-FFF2-40B4-BE49-F238E27FC236}">
-                <a16:creationId xmlns:a16="http://schemas.microsoft.com/office/drawing/2014/main" id="{5C93D92E-D605-444D-144C-ECE7253742D0}"/>
-              </a:ext>
-            </a:extLst>
-          </p:cNvPr>
-          <p:cNvPicPr>
-            <a:picLocks noChangeAspect="1"/>
-          </p:cNvPicPr>
-          <p:nvPr/>
-        </p:nvPicPr>
-        <p:blipFill>
-          <a:blip r:embed="rId2">
-            <a:extLst>
-              <a:ext uri="{28A0092B-C50C-407E-A947-70E740481C1C}">
-                <a14:useLocalDpi xmlns:a14="http://schemas.microsoft.com/office/drawing/2010/main" val="0"/>
-              </a:ext>
-            </a:extLst>
-          </a:blip>
-          <a:stretch>
-            <a:fillRect/>
-          </a:stretch>
-        </p:blipFill>
-        <p:spPr>
-          <a:xfrm>
-            <a:off x="2941320" y="1497330"/>
-            <a:ext cx="6309360" cy="3863340"/>
-          </a:xfrm>
-          <a:prstGeom prst="rect">
-            <a:avLst/>
-          </a:prstGeom>
-        </p:spPr>
-      </p:pic>
+            <a:endParaRPr lang="en-GB"/>
+          </a:p>
+        </p:txBody>
+      </p:sp>
     </p:spTree>
     <p:extLst>
       <p:ext uri="{BB962C8B-B14F-4D97-AF65-F5344CB8AC3E}">
-        <p14:creationId xmlns:p14="http://schemas.microsoft.com/office/powerpoint/2010/main" val="1050643754"/>
+        <p14:creationId xmlns:p14="http://schemas.microsoft.com/office/powerpoint/2010/main" val="2456818696"/>
       </p:ext>
     </p:extLst>
   </p:cSld>
@@ -8468,6 +10524,35 @@
           </a:p>
         </p:txBody>
       </p:sp>
+      <p:sp>
+        <p:nvSpPr>
+          <p:cNvPr id="4" name="Slide Number Placeholder 3">
+            <a:extLst>
+              <a:ext uri="{FF2B5EF4-FFF2-40B4-BE49-F238E27FC236}">
+                <a16:creationId xmlns:a16="http://schemas.microsoft.com/office/drawing/2014/main" id="{D168E903-BA74-B52A-2E23-C0A4643DDF91}"/>
+              </a:ext>
+            </a:extLst>
+          </p:cNvPr>
+          <p:cNvSpPr>
+            <a:spLocks noGrp="1"/>
+          </p:cNvSpPr>
+          <p:nvPr>
+            <p:ph type="sldNum" sz="quarter" idx="12"/>
+          </p:nvPr>
+        </p:nvSpPr>
+        <p:spPr/>
+        <p:txBody>
+          <a:bodyPr/>
+          <a:lstStyle/>
+          <a:p>
+            <a:fld id="{D3726DCB-FEA5-4222-BB45-1CC90DF962E6}" type="slidenum">
+              <a:rPr lang="en-GB" smtClean="0"/>
+              <a:t>8</a:t>
+            </a:fld>
+            <a:endParaRPr lang="en-GB"/>
+          </a:p>
+        </p:txBody>
+      </p:sp>
     </p:spTree>
     <p:extLst>
       <p:ext uri="{BB962C8B-B14F-4D97-AF65-F5344CB8AC3E}">
@@ -8486,7 +10571,13 @@
   <p:cSld>
     <p:spTree>
       <p:nvGrpSpPr>
-        <p:cNvPr id="1" name=""/>
+        <p:cNvPr id="1" name="">
+          <a:extLst>
+            <a:ext uri="{FF2B5EF4-FFF2-40B4-BE49-F238E27FC236}">
+              <a16:creationId xmlns:a16="http://schemas.microsoft.com/office/drawing/2014/main" id="{203D0C4B-A992-CF29-0D76-3FD472D9BB09}"/>
+            </a:ext>
+          </a:extLst>
+        </p:cNvPr>
         <p:cNvGrpSpPr/>
         <p:nvPr/>
       </p:nvGrpSpPr>
@@ -8503,7 +10594,7 @@
           <p:cNvPr id="2" name="Title 1">
             <a:extLst>
               <a:ext uri="{FF2B5EF4-FFF2-40B4-BE49-F238E27FC236}">
-                <a16:creationId xmlns:a16="http://schemas.microsoft.com/office/drawing/2014/main" id="{17058185-E9E4-FA65-C4BE-A187A1D7107B}"/>
+                <a16:creationId xmlns:a16="http://schemas.microsoft.com/office/drawing/2014/main" id="{EFA2B810-0995-1A82-9E84-28A0F1BAD8FD}"/>
               </a:ext>
             </a:extLst>
           </p:cNvPr>
@@ -8514,14 +10605,21 @@
             <p:ph type="title"/>
           </p:nvPr>
         </p:nvSpPr>
-        <p:spPr/>
-        <p:txBody>
-          <a:bodyPr/>
+        <p:spPr>
+          <a:xfrm>
+            <a:off x="1171852" y="310718"/>
+            <a:ext cx="6782539" cy="827618"/>
+          </a:xfrm>
+        </p:spPr>
+        <p:txBody>
+          <a:bodyPr>
+            <a:normAutofit fontScale="90000"/>
+          </a:bodyPr>
           <a:lstStyle/>
           <a:p>
             <a:r>
               <a:rPr lang="en-US" dirty="0"/>
-              <a:t>Backup</a:t>
+              <a:t>Federated Learning Diagram</a:t>
             </a:r>
             <a:endParaRPr lang="en-GB" dirty="0"/>
           </a:p>
@@ -8529,10 +10627,10 @@
       </p:sp>
       <p:sp>
         <p:nvSpPr>
-          <p:cNvPr id="3" name="Content Placeholder 2">
+          <p:cNvPr id="4" name="Slide Number Placeholder 3">
             <a:extLst>
               <a:ext uri="{FF2B5EF4-FFF2-40B4-BE49-F238E27FC236}">
-                <a16:creationId xmlns:a16="http://schemas.microsoft.com/office/drawing/2014/main" id="{DF79C7AA-017F-7A8A-7B4C-892611F7684C}"/>
+                <a16:creationId xmlns:a16="http://schemas.microsoft.com/office/drawing/2014/main" id="{B6D0EA3D-6C35-D9FE-C2D3-FF079CBF0AB9}"/>
               </a:ext>
             </a:extLst>
           </p:cNvPr>
@@ -8540,7 +10638,7 @@
             <a:spLocks noGrp="1"/>
           </p:cNvSpPr>
           <p:nvPr>
-            <p:ph idx="1"/>
+            <p:ph type="sldNum" sz="quarter" idx="12"/>
           </p:nvPr>
         </p:nvSpPr>
         <p:spPr/>
@@ -8548,14 +10646,54 @@
           <a:bodyPr/>
           <a:lstStyle/>
           <a:p>
+            <a:fld id="{D3726DCB-FEA5-4222-BB45-1CC90DF962E6}" type="slidenum">
+              <a:rPr lang="en-GB" smtClean="0"/>
+              <a:t>9</a:t>
+            </a:fld>
             <a:endParaRPr lang="en-GB"/>
           </a:p>
         </p:txBody>
       </p:sp>
+      <p:pic>
+        <p:nvPicPr>
+          <p:cNvPr id="11" name="Picture 10" descr="A diagram of a schematic diagram&#10;&#10;Description automatically generated">
+            <a:extLst>
+              <a:ext uri="{FF2B5EF4-FFF2-40B4-BE49-F238E27FC236}">
+                <a16:creationId xmlns:a16="http://schemas.microsoft.com/office/drawing/2014/main" id="{3561B25C-7FAB-0B23-A884-D09827853F02}"/>
+              </a:ext>
+            </a:extLst>
+          </p:cNvPr>
+          <p:cNvPicPr>
+            <a:picLocks noChangeAspect="1"/>
+          </p:cNvPicPr>
+          <p:nvPr/>
+        </p:nvPicPr>
+        <p:blipFill>
+          <a:blip r:embed="rId2">
+            <a:extLst>
+              <a:ext uri="{28A0092B-C50C-407E-A947-70E740481C1C}">
+                <a14:useLocalDpi xmlns:a14="http://schemas.microsoft.com/office/drawing/2010/main" val="0"/>
+              </a:ext>
+            </a:extLst>
+          </a:blip>
+          <a:stretch>
+            <a:fillRect/>
+          </a:stretch>
+        </p:blipFill>
+        <p:spPr>
+          <a:xfrm>
+            <a:off x="1935333" y="1322773"/>
+            <a:ext cx="8321334" cy="5024761"/>
+          </a:xfrm>
+          <a:prstGeom prst="rect">
+            <a:avLst/>
+          </a:prstGeom>
+        </p:spPr>
+      </p:pic>
     </p:spTree>
     <p:extLst>
       <p:ext uri="{BB962C8B-B14F-4D97-AF65-F5344CB8AC3E}">
-        <p14:creationId xmlns:p14="http://schemas.microsoft.com/office/powerpoint/2010/main" val="2550028783"/>
+        <p14:creationId xmlns:p14="http://schemas.microsoft.com/office/powerpoint/2010/main" val="3914633024"/>
       </p:ext>
     </p:extLst>
   </p:cSld>
@@ -8846,4 +10984,319 @@
     </a:ext>
   </a:extLst>
 </a:theme>
+</file>
+
+<file path=ppt/theme/theme2.xml><?xml version="1.0" encoding="utf-8"?>
+<a:theme xmlns:a="http://schemas.openxmlformats.org/drawingml/2006/main" name="Office Theme">
+  <a:themeElements>
+    <a:clrScheme name="Office">
+      <a:dk1>
+        <a:sysClr val="windowText" lastClr="000000"/>
+      </a:dk1>
+      <a:lt1>
+        <a:sysClr val="window" lastClr="FFFFFF"/>
+      </a:lt1>
+      <a:dk2>
+        <a:srgbClr val="0E2841"/>
+      </a:dk2>
+      <a:lt2>
+        <a:srgbClr val="E8E8E8"/>
+      </a:lt2>
+      <a:accent1>
+        <a:srgbClr val="156082"/>
+      </a:accent1>
+      <a:accent2>
+        <a:srgbClr val="E97132"/>
+      </a:accent2>
+      <a:accent3>
+        <a:srgbClr val="196B24"/>
+      </a:accent3>
+      <a:accent4>
+        <a:srgbClr val="0F9ED5"/>
+      </a:accent4>
+      <a:accent5>
+        <a:srgbClr val="A02B93"/>
+      </a:accent5>
+      <a:accent6>
+        <a:srgbClr val="4EA72E"/>
+      </a:accent6>
+      <a:hlink>
+        <a:srgbClr val="467886"/>
+      </a:hlink>
+      <a:folHlink>
+        <a:srgbClr val="96607D"/>
+      </a:folHlink>
+    </a:clrScheme>
+    <a:fontScheme name="Office">
+      <a:majorFont>
+        <a:latin typeface="Aptos Display" panose="02110004020202020204"/>
+        <a:ea typeface=""/>
+        <a:cs typeface=""/>
+        <a:font script="Jpan" typeface="游ゴシック Light"/>
+        <a:font script="Hang" typeface="맑은 고딕"/>
+        <a:font script="Hans" typeface="等线 Light"/>
+        <a:font script="Hant" typeface="新細明體"/>
+        <a:font script="Arab" typeface="Times New Roman"/>
+        <a:font script="Hebr" typeface="Times New Roman"/>
+        <a:font script="Thai" typeface="Angsana New"/>
+        <a:font script="Ethi" typeface="Nyala"/>
+        <a:font script="Beng" typeface="Vrinda"/>
+        <a:font script="Gujr" typeface="Shruti"/>
+        <a:font script="Khmr" typeface="MoolBoran"/>
+        <a:font script="Knda" typeface="Tunga"/>
+        <a:font script="Guru" typeface="Raavi"/>
+        <a:font script="Cans" typeface="Euphemia"/>
+        <a:font script="Cher" typeface="Plantagenet Cherokee"/>
+        <a:font script="Yiii" typeface="Microsoft Yi Baiti"/>
+        <a:font script="Tibt" typeface="Microsoft Himalaya"/>
+        <a:font script="Thaa" typeface="MV Boli"/>
+        <a:font script="Deva" typeface="Mangal"/>
+        <a:font script="Telu" typeface="Gautami"/>
+        <a:font script="Taml" typeface="Latha"/>
+        <a:font script="Syrc" typeface="Estrangelo Edessa"/>
+        <a:font script="Orya" typeface="Kalinga"/>
+        <a:font script="Mlym" typeface="Kartika"/>
+        <a:font script="Laoo" typeface="DokChampa"/>
+        <a:font script="Sinh" typeface="Iskoola Pota"/>
+        <a:font script="Mong" typeface="Mongolian Baiti"/>
+        <a:font script="Viet" typeface="Times New Roman"/>
+        <a:font script="Uigh" typeface="Microsoft Uighur"/>
+        <a:font script="Geor" typeface="Sylfaen"/>
+        <a:font script="Armn" typeface="Arial"/>
+        <a:font script="Bugi" typeface="Leelawadee UI"/>
+        <a:font script="Bopo" typeface="Microsoft JhengHei"/>
+        <a:font script="Java" typeface="Javanese Text"/>
+        <a:font script="Lisu" typeface="Segoe UI"/>
+        <a:font script="Mymr" typeface="Myanmar Text"/>
+        <a:font script="Nkoo" typeface="Ebrima"/>
+        <a:font script="Olck" typeface="Nirmala UI"/>
+        <a:font script="Osma" typeface="Ebrima"/>
+        <a:font script="Phag" typeface="Phagspa"/>
+        <a:font script="Syrn" typeface="Estrangelo Edessa"/>
+        <a:font script="Syrj" typeface="Estrangelo Edessa"/>
+        <a:font script="Syre" typeface="Estrangelo Edessa"/>
+        <a:font script="Sora" typeface="Nirmala UI"/>
+        <a:font script="Tale" typeface="Microsoft Tai Le"/>
+        <a:font script="Talu" typeface="Microsoft New Tai Lue"/>
+        <a:font script="Tfng" typeface="Ebrima"/>
+      </a:majorFont>
+      <a:minorFont>
+        <a:latin typeface="Aptos" panose="02110004020202020204"/>
+        <a:ea typeface=""/>
+        <a:cs typeface=""/>
+        <a:font script="Jpan" typeface="游ゴシック"/>
+        <a:font script="Hang" typeface="맑은 고딕"/>
+        <a:font script="Hans" typeface="等线"/>
+        <a:font script="Hant" typeface="新細明體"/>
+        <a:font script="Arab" typeface="Arial"/>
+        <a:font script="Hebr" typeface="Arial"/>
+        <a:font script="Thai" typeface="Cordia New"/>
+        <a:font script="Ethi" typeface="Nyala"/>
+        <a:font script="Beng" typeface="Vrinda"/>
+        <a:font script="Gujr" typeface="Shruti"/>
+        <a:font script="Khmr" typeface="DaunPenh"/>
+        <a:font script="Knda" typeface="Tunga"/>
+        <a:font script="Guru" typeface="Raavi"/>
+        <a:font script="Cans" typeface="Euphemia"/>
+        <a:font script="Cher" typeface="Plantagenet Cherokee"/>
+        <a:font script="Yiii" typeface="Microsoft Yi Baiti"/>
+        <a:font script="Tibt" typeface="Microsoft Himalaya"/>
+        <a:font script="Thaa" typeface="MV Boli"/>
+        <a:font script="Deva" typeface="Mangal"/>
+        <a:font script="Telu" typeface="Gautami"/>
+        <a:font script="Taml" typeface="Latha"/>
+        <a:font script="Syrc" typeface="Estrangelo Edessa"/>
+        <a:font script="Orya" typeface="Kalinga"/>
+        <a:font script="Mlym" typeface="Kartika"/>
+        <a:font script="Laoo" typeface="DokChampa"/>
+        <a:font script="Sinh" typeface="Iskoola Pota"/>
+        <a:font script="Mong" typeface="Mongolian Baiti"/>
+        <a:font script="Viet" typeface="Arial"/>
+        <a:font script="Uigh" typeface="Microsoft Uighur"/>
+        <a:font script="Geor" typeface="Sylfaen"/>
+        <a:font script="Armn" typeface="Arial"/>
+        <a:font script="Bugi" typeface="Leelawadee UI"/>
+        <a:font script="Bopo" typeface="Microsoft JhengHei"/>
+        <a:font script="Java" typeface="Javanese Text"/>
+        <a:font script="Lisu" typeface="Segoe UI"/>
+        <a:font script="Mymr" typeface="Myanmar Text"/>
+        <a:font script="Nkoo" typeface="Ebrima"/>
+        <a:font script="Olck" typeface="Nirmala UI"/>
+        <a:font script="Osma" typeface="Ebrima"/>
+        <a:font script="Phag" typeface="Phagspa"/>
+        <a:font script="Syrn" typeface="Estrangelo Edessa"/>
+        <a:font script="Syrj" typeface="Estrangelo Edessa"/>
+        <a:font script="Syre" typeface="Estrangelo Edessa"/>
+        <a:font script="Sora" typeface="Nirmala UI"/>
+        <a:font script="Tale" typeface="Microsoft Tai Le"/>
+        <a:font script="Talu" typeface="Microsoft New Tai Lue"/>
+        <a:font script="Tfng" typeface="Ebrima"/>
+      </a:minorFont>
+    </a:fontScheme>
+    <a:fmtScheme name="Office">
+      <a:fillStyleLst>
+        <a:solidFill>
+          <a:schemeClr val="phClr"/>
+        </a:solidFill>
+        <a:gradFill rotWithShape="1">
+          <a:gsLst>
+            <a:gs pos="0">
+              <a:schemeClr val="phClr">
+                <a:lumMod val="110000"/>
+                <a:satMod val="105000"/>
+                <a:tint val="67000"/>
+              </a:schemeClr>
+            </a:gs>
+            <a:gs pos="50000">
+              <a:schemeClr val="phClr">
+                <a:lumMod val="105000"/>
+                <a:satMod val="103000"/>
+                <a:tint val="73000"/>
+              </a:schemeClr>
+            </a:gs>
+            <a:gs pos="100000">
+              <a:schemeClr val="phClr">
+                <a:lumMod val="105000"/>
+                <a:satMod val="109000"/>
+                <a:tint val="81000"/>
+              </a:schemeClr>
+            </a:gs>
+          </a:gsLst>
+          <a:lin ang="5400000" scaled="0"/>
+        </a:gradFill>
+        <a:gradFill rotWithShape="1">
+          <a:gsLst>
+            <a:gs pos="0">
+              <a:schemeClr val="phClr">
+                <a:satMod val="103000"/>
+                <a:lumMod val="102000"/>
+                <a:tint val="94000"/>
+              </a:schemeClr>
+            </a:gs>
+            <a:gs pos="50000">
+              <a:schemeClr val="phClr">
+                <a:satMod val="110000"/>
+                <a:lumMod val="100000"/>
+                <a:shade val="100000"/>
+              </a:schemeClr>
+            </a:gs>
+            <a:gs pos="100000">
+              <a:schemeClr val="phClr">
+                <a:lumMod val="99000"/>
+                <a:satMod val="120000"/>
+                <a:shade val="78000"/>
+              </a:schemeClr>
+            </a:gs>
+          </a:gsLst>
+          <a:lin ang="5400000" scaled="0"/>
+        </a:gradFill>
+      </a:fillStyleLst>
+      <a:lnStyleLst>
+        <a:ln w="12700" cap="flat" cmpd="sng" algn="ctr">
+          <a:solidFill>
+            <a:schemeClr val="phClr"/>
+          </a:solidFill>
+          <a:prstDash val="solid"/>
+          <a:miter lim="800000"/>
+        </a:ln>
+        <a:ln w="19050" cap="flat" cmpd="sng" algn="ctr">
+          <a:solidFill>
+            <a:schemeClr val="phClr"/>
+          </a:solidFill>
+          <a:prstDash val="solid"/>
+          <a:miter lim="800000"/>
+        </a:ln>
+        <a:ln w="25400" cap="flat" cmpd="sng" algn="ctr">
+          <a:solidFill>
+            <a:schemeClr val="phClr"/>
+          </a:solidFill>
+          <a:prstDash val="solid"/>
+          <a:miter lim="800000"/>
+        </a:ln>
+      </a:lnStyleLst>
+      <a:effectStyleLst>
+        <a:effectStyle>
+          <a:effectLst/>
+        </a:effectStyle>
+        <a:effectStyle>
+          <a:effectLst/>
+        </a:effectStyle>
+        <a:effectStyle>
+          <a:effectLst>
+            <a:outerShdw blurRad="57150" dist="19050" dir="5400000" algn="ctr" rotWithShape="0">
+              <a:srgbClr val="000000">
+                <a:alpha val="63000"/>
+              </a:srgbClr>
+            </a:outerShdw>
+          </a:effectLst>
+        </a:effectStyle>
+      </a:effectStyleLst>
+      <a:bgFillStyleLst>
+        <a:solidFill>
+          <a:schemeClr val="phClr"/>
+        </a:solidFill>
+        <a:solidFill>
+          <a:schemeClr val="phClr">
+            <a:tint val="95000"/>
+            <a:satMod val="170000"/>
+          </a:schemeClr>
+        </a:solidFill>
+        <a:gradFill rotWithShape="1">
+          <a:gsLst>
+            <a:gs pos="0">
+              <a:schemeClr val="phClr">
+                <a:tint val="93000"/>
+                <a:satMod val="150000"/>
+                <a:shade val="98000"/>
+                <a:lumMod val="102000"/>
+              </a:schemeClr>
+            </a:gs>
+            <a:gs pos="50000">
+              <a:schemeClr val="phClr">
+                <a:tint val="98000"/>
+                <a:satMod val="130000"/>
+                <a:shade val="90000"/>
+                <a:lumMod val="103000"/>
+              </a:schemeClr>
+            </a:gs>
+            <a:gs pos="100000">
+              <a:schemeClr val="phClr">
+                <a:shade val="63000"/>
+                <a:satMod val="120000"/>
+              </a:schemeClr>
+            </a:gs>
+          </a:gsLst>
+          <a:lin ang="5400000" scaled="0"/>
+        </a:gradFill>
+      </a:bgFillStyleLst>
+    </a:fmtScheme>
+  </a:themeElements>
+  <a:objectDefaults>
+    <a:lnDef>
+      <a:spPr/>
+      <a:bodyPr/>
+      <a:lstStyle/>
+      <a:style>
+        <a:lnRef idx="2">
+          <a:schemeClr val="accent1"/>
+        </a:lnRef>
+        <a:fillRef idx="0">
+          <a:schemeClr val="accent1"/>
+        </a:fillRef>
+        <a:effectRef idx="1">
+          <a:schemeClr val="accent1"/>
+        </a:effectRef>
+        <a:fontRef idx="minor">
+          <a:schemeClr val="tx1"/>
+        </a:fontRef>
+      </a:style>
+    </a:lnDef>
+  </a:objectDefaults>
+  <a:extraClrSchemeLst/>
+  <a:extLst>
+    <a:ext uri="{05A4C25C-085E-4340-85A3-A5531E510DB2}">
+      <thm15:themeFamily xmlns:thm15="http://schemas.microsoft.com/office/thememl/2012/main" name="Office Theme" id="{2E142A2C-CD16-42D6-873A-C26D2A0506FA}" vid="{1BDDFF52-6CD6-40A5-AB3C-68EB2F1E4D0A}"/>
+    </a:ext>
+  </a:extLst>
+</a:theme>
 </file>
</xml_diff>